<commit_message>
After successful deploy to azure
</commit_message>
<xml_diff>
--- a/Prez/Service Fabric Hackathon.pptx
+++ b/Prez/Service Fabric Hackathon.pptx
@@ -13,6 +13,14 @@
     <p:sldId id="260" r:id="rId7"/>
     <p:sldId id="262" r:id="rId8"/>
     <p:sldId id="263" r:id="rId9"/>
+    <p:sldId id="264" r:id="rId10"/>
+    <p:sldId id="265" r:id="rId11"/>
+    <p:sldId id="266" r:id="rId12"/>
+    <p:sldId id="267" r:id="rId13"/>
+    <p:sldId id="268" r:id="rId14"/>
+    <p:sldId id="269" r:id="rId15"/>
+    <p:sldId id="270" r:id="rId16"/>
+    <p:sldId id="271" r:id="rId17"/>
   </p:sldIdLst>
   <p:sldSz cx="12192000" cy="6858000"/>
   <p:notesSz cx="6858000" cy="9144000"/>
@@ -248,7 +256,7 @@
           <a:p>
             <a:fld id="{9E192CE5-DCDA-414F-932D-9165609A3877}" type="datetimeFigureOut">
               <a:rPr lang="en-US" smtClean="0"/>
-              <a:t>2/11/17</a:t>
+              <a:t>2/12/17</a:t>
             </a:fld>
             <a:endParaRPr lang="en-US"/>
           </a:p>
@@ -416,7 +424,7 @@
           <a:p>
             <a:fld id="{9E192CE5-DCDA-414F-932D-9165609A3877}" type="datetimeFigureOut">
               <a:rPr lang="en-US" smtClean="0"/>
-              <a:t>2/11/17</a:t>
+              <a:t>2/12/17</a:t>
             </a:fld>
             <a:endParaRPr lang="en-US"/>
           </a:p>
@@ -594,7 +602,7 @@
           <a:p>
             <a:fld id="{9E192CE5-DCDA-414F-932D-9165609A3877}" type="datetimeFigureOut">
               <a:rPr lang="en-US" smtClean="0"/>
-              <a:t>2/11/17</a:t>
+              <a:t>2/12/17</a:t>
             </a:fld>
             <a:endParaRPr lang="en-US"/>
           </a:p>
@@ -762,7 +770,7 @@
           <a:p>
             <a:fld id="{9E192CE5-DCDA-414F-932D-9165609A3877}" type="datetimeFigureOut">
               <a:rPr lang="en-US" smtClean="0"/>
-              <a:t>2/11/17</a:t>
+              <a:t>2/12/17</a:t>
             </a:fld>
             <a:endParaRPr lang="en-US"/>
           </a:p>
@@ -1007,7 +1015,7 @@
           <a:p>
             <a:fld id="{9E192CE5-DCDA-414F-932D-9165609A3877}" type="datetimeFigureOut">
               <a:rPr lang="en-US" smtClean="0"/>
-              <a:t>2/11/17</a:t>
+              <a:t>2/12/17</a:t>
             </a:fld>
             <a:endParaRPr lang="en-US"/>
           </a:p>
@@ -1236,7 +1244,7 @@
           <a:p>
             <a:fld id="{9E192CE5-DCDA-414F-932D-9165609A3877}" type="datetimeFigureOut">
               <a:rPr lang="en-US" smtClean="0"/>
-              <a:t>2/11/17</a:t>
+              <a:t>2/12/17</a:t>
             </a:fld>
             <a:endParaRPr lang="en-US"/>
           </a:p>
@@ -1600,7 +1608,7 @@
           <a:p>
             <a:fld id="{9E192CE5-DCDA-414F-932D-9165609A3877}" type="datetimeFigureOut">
               <a:rPr lang="en-US" smtClean="0"/>
-              <a:t>2/11/17</a:t>
+              <a:t>2/12/17</a:t>
             </a:fld>
             <a:endParaRPr lang="en-US"/>
           </a:p>
@@ -1717,7 +1725,7 @@
           <a:p>
             <a:fld id="{9E192CE5-DCDA-414F-932D-9165609A3877}" type="datetimeFigureOut">
               <a:rPr lang="en-US" smtClean="0"/>
-              <a:t>2/11/17</a:t>
+              <a:t>2/12/17</a:t>
             </a:fld>
             <a:endParaRPr lang="en-US"/>
           </a:p>
@@ -1812,7 +1820,7 @@
           <a:p>
             <a:fld id="{9E192CE5-DCDA-414F-932D-9165609A3877}" type="datetimeFigureOut">
               <a:rPr lang="en-US" smtClean="0"/>
-              <a:t>2/11/17</a:t>
+              <a:t>2/12/17</a:t>
             </a:fld>
             <a:endParaRPr lang="en-US"/>
           </a:p>
@@ -2087,7 +2095,7 @@
           <a:p>
             <a:fld id="{9E192CE5-DCDA-414F-932D-9165609A3877}" type="datetimeFigureOut">
               <a:rPr lang="en-US" smtClean="0"/>
-              <a:t>2/11/17</a:t>
+              <a:t>2/12/17</a:t>
             </a:fld>
             <a:endParaRPr lang="en-US"/>
           </a:p>
@@ -2339,7 +2347,7 @@
           <a:p>
             <a:fld id="{9E192CE5-DCDA-414F-932D-9165609A3877}" type="datetimeFigureOut">
               <a:rPr lang="en-US" smtClean="0"/>
-              <a:t>2/11/17</a:t>
+              <a:t>2/12/17</a:t>
             </a:fld>
             <a:endParaRPr lang="en-US"/>
           </a:p>
@@ -2550,7 +2558,7 @@
           <a:p>
             <a:fld id="{9E192CE5-DCDA-414F-932D-9165609A3877}" type="datetimeFigureOut">
               <a:rPr lang="en-US" smtClean="0"/>
-              <a:t>2/11/17</a:t>
+              <a:t>2/12/17</a:t>
             </a:fld>
             <a:endParaRPr lang="en-US"/>
           </a:p>
@@ -3009,6 +3017,685 @@
 </p:sld>
 </file>
 
+<file path=ppt/slides/slide10.xml><?xml version="1.0" encoding="utf-8"?>
+<p:sld xmlns:a="http://schemas.openxmlformats.org/drawingml/2006/main" xmlns:r="http://schemas.openxmlformats.org/officeDocument/2006/relationships" xmlns:p="http://schemas.openxmlformats.org/presentationml/2006/main">
+  <p:cSld>
+    <p:spTree>
+      <p:nvGrpSpPr>
+        <p:cNvPr id="1" name=""/>
+        <p:cNvGrpSpPr/>
+        <p:nvPr/>
+      </p:nvGrpSpPr>
+      <p:grpSpPr>
+        <a:xfrm>
+          <a:off x="0" y="0"/>
+          <a:ext cx="0" cy="0"/>
+          <a:chOff x="0" y="0"/>
+          <a:chExt cx="0" cy="0"/>
+        </a:xfrm>
+      </p:grpSpPr>
+      <p:sp>
+        <p:nvSpPr>
+          <p:cNvPr id="2" name="Title 1"/>
+          <p:cNvSpPr>
+            <a:spLocks noGrp="1"/>
+          </p:cNvSpPr>
+          <p:nvPr>
+            <p:ph type="title"/>
+          </p:nvPr>
+        </p:nvSpPr>
+        <p:spPr/>
+        <p:txBody>
+          <a:bodyPr/>
+          <a:lstStyle/>
+          <a:p>
+            <a:endParaRPr lang="en-US"/>
+          </a:p>
+        </p:txBody>
+      </p:sp>
+      <p:sp>
+        <p:nvSpPr>
+          <p:cNvPr id="3" name="Content Placeholder 2"/>
+          <p:cNvSpPr>
+            <a:spLocks noGrp="1"/>
+          </p:cNvSpPr>
+          <p:nvPr>
+            <p:ph idx="1"/>
+          </p:nvPr>
+        </p:nvSpPr>
+        <p:spPr>
+          <a:xfrm>
+            <a:off x="838200" y="1825625"/>
+            <a:ext cx="3616354" cy="4351338"/>
+          </a:xfrm>
+        </p:spPr>
+        <p:txBody>
+          <a:bodyPr/>
+          <a:lstStyle/>
+          <a:p>
+            <a:endParaRPr lang="en-US" dirty="0"/>
+          </a:p>
+        </p:txBody>
+      </p:sp>
+      <p:pic>
+        <p:nvPicPr>
+          <p:cNvPr id="5" name="Picture 4"/>
+          <p:cNvPicPr>
+            <a:picLocks noChangeAspect="1"/>
+          </p:cNvPicPr>
+          <p:nvPr/>
+        </p:nvPicPr>
+        <p:blipFill>
+          <a:blip r:embed="rId2"/>
+          <a:stretch>
+            <a:fillRect/>
+          </a:stretch>
+        </p:blipFill>
+        <p:spPr>
+          <a:xfrm>
+            <a:off x="6172531" y="1027906"/>
+            <a:ext cx="3624935" cy="5255288"/>
+          </a:xfrm>
+          <a:prstGeom prst="rect">
+            <a:avLst/>
+          </a:prstGeom>
+        </p:spPr>
+      </p:pic>
+    </p:spTree>
+    <p:extLst>
+      <p:ext uri="{BB962C8B-B14F-4D97-AF65-F5344CB8AC3E}">
+        <p14:creationId xmlns:p14="http://schemas.microsoft.com/office/powerpoint/2010/main" val="3650640873"/>
+      </p:ext>
+    </p:extLst>
+  </p:cSld>
+  <p:clrMapOvr>
+    <a:masterClrMapping/>
+  </p:clrMapOvr>
+</p:sld>
+</file>
+
+<file path=ppt/slides/slide11.xml><?xml version="1.0" encoding="utf-8"?>
+<p:sld xmlns:a="http://schemas.openxmlformats.org/drawingml/2006/main" xmlns:r="http://schemas.openxmlformats.org/officeDocument/2006/relationships" xmlns:p="http://schemas.openxmlformats.org/presentationml/2006/main">
+  <p:cSld>
+    <p:spTree>
+      <p:nvGrpSpPr>
+        <p:cNvPr id="1" name=""/>
+        <p:cNvGrpSpPr/>
+        <p:nvPr/>
+      </p:nvGrpSpPr>
+      <p:grpSpPr>
+        <a:xfrm>
+          <a:off x="0" y="0"/>
+          <a:ext cx="0" cy="0"/>
+          <a:chOff x="0" y="0"/>
+          <a:chExt cx="0" cy="0"/>
+        </a:xfrm>
+      </p:grpSpPr>
+      <p:sp>
+        <p:nvSpPr>
+          <p:cNvPr id="2" name="Title 1"/>
+          <p:cNvSpPr>
+            <a:spLocks noGrp="1"/>
+          </p:cNvSpPr>
+          <p:nvPr>
+            <p:ph type="title"/>
+          </p:nvPr>
+        </p:nvSpPr>
+        <p:spPr/>
+        <p:txBody>
+          <a:bodyPr/>
+          <a:lstStyle/>
+          <a:p>
+            <a:endParaRPr lang="en-US"/>
+          </a:p>
+        </p:txBody>
+      </p:sp>
+      <p:sp>
+        <p:nvSpPr>
+          <p:cNvPr id="3" name="Content Placeholder 2"/>
+          <p:cNvSpPr>
+            <a:spLocks noGrp="1"/>
+          </p:cNvSpPr>
+          <p:nvPr>
+            <p:ph idx="1"/>
+          </p:nvPr>
+        </p:nvSpPr>
+        <p:spPr>
+          <a:xfrm>
+            <a:off x="838200" y="1825625"/>
+            <a:ext cx="3322739" cy="4351338"/>
+          </a:xfrm>
+        </p:spPr>
+        <p:txBody>
+          <a:bodyPr/>
+          <a:lstStyle/>
+          <a:p>
+            <a:endParaRPr lang="en-US" dirty="0"/>
+          </a:p>
+        </p:txBody>
+      </p:sp>
+      <p:pic>
+        <p:nvPicPr>
+          <p:cNvPr id="4" name="Picture 3"/>
+          <p:cNvPicPr>
+            <a:picLocks noChangeAspect="1"/>
+          </p:cNvPicPr>
+          <p:nvPr/>
+        </p:nvPicPr>
+        <p:blipFill>
+          <a:blip r:embed="rId2"/>
+          <a:stretch>
+            <a:fillRect/>
+          </a:stretch>
+        </p:blipFill>
+        <p:spPr>
+          <a:xfrm>
+            <a:off x="4160939" y="1655004"/>
+            <a:ext cx="7739179" cy="4692580"/>
+          </a:xfrm>
+          <a:prstGeom prst="rect">
+            <a:avLst/>
+          </a:prstGeom>
+        </p:spPr>
+      </p:pic>
+    </p:spTree>
+    <p:extLst>
+      <p:ext uri="{BB962C8B-B14F-4D97-AF65-F5344CB8AC3E}">
+        <p14:creationId xmlns:p14="http://schemas.microsoft.com/office/powerpoint/2010/main" val="3444056454"/>
+      </p:ext>
+    </p:extLst>
+  </p:cSld>
+  <p:clrMapOvr>
+    <a:masterClrMapping/>
+  </p:clrMapOvr>
+</p:sld>
+</file>
+
+<file path=ppt/slides/slide12.xml><?xml version="1.0" encoding="utf-8"?>
+<p:sld xmlns:a="http://schemas.openxmlformats.org/drawingml/2006/main" xmlns:r="http://schemas.openxmlformats.org/officeDocument/2006/relationships" xmlns:p="http://schemas.openxmlformats.org/presentationml/2006/main">
+  <p:cSld>
+    <p:spTree>
+      <p:nvGrpSpPr>
+        <p:cNvPr id="1" name=""/>
+        <p:cNvGrpSpPr/>
+        <p:nvPr/>
+      </p:nvGrpSpPr>
+      <p:grpSpPr>
+        <a:xfrm>
+          <a:off x="0" y="0"/>
+          <a:ext cx="0" cy="0"/>
+          <a:chOff x="0" y="0"/>
+          <a:chExt cx="0" cy="0"/>
+        </a:xfrm>
+      </p:grpSpPr>
+      <p:sp>
+        <p:nvSpPr>
+          <p:cNvPr id="2" name="Title 1"/>
+          <p:cNvSpPr>
+            <a:spLocks noGrp="1"/>
+          </p:cNvSpPr>
+          <p:nvPr>
+            <p:ph type="title"/>
+          </p:nvPr>
+        </p:nvSpPr>
+        <p:spPr/>
+        <p:txBody>
+          <a:bodyPr/>
+          <a:lstStyle/>
+          <a:p>
+            <a:endParaRPr lang="en-US"/>
+          </a:p>
+        </p:txBody>
+      </p:sp>
+      <p:sp>
+        <p:nvSpPr>
+          <p:cNvPr id="3" name="Content Placeholder 2"/>
+          <p:cNvSpPr>
+            <a:spLocks noGrp="1"/>
+          </p:cNvSpPr>
+          <p:nvPr>
+            <p:ph idx="1"/>
+          </p:nvPr>
+        </p:nvSpPr>
+        <p:spPr>
+          <a:xfrm>
+            <a:off x="838200" y="1825625"/>
+            <a:ext cx="3222072" cy="4351338"/>
+          </a:xfrm>
+        </p:spPr>
+        <p:txBody>
+          <a:bodyPr/>
+          <a:lstStyle/>
+          <a:p>
+            <a:endParaRPr lang="en-US" dirty="0"/>
+          </a:p>
+        </p:txBody>
+      </p:sp>
+      <p:pic>
+        <p:nvPicPr>
+          <p:cNvPr id="5" name="Picture 4"/>
+          <p:cNvPicPr>
+            <a:picLocks noChangeAspect="1"/>
+          </p:cNvPicPr>
+          <p:nvPr/>
+        </p:nvPicPr>
+        <p:blipFill>
+          <a:blip r:embed="rId2"/>
+          <a:stretch>
+            <a:fillRect/>
+          </a:stretch>
+        </p:blipFill>
+        <p:spPr>
+          <a:xfrm>
+            <a:off x="5436891" y="2186781"/>
+            <a:ext cx="6000750" cy="3629025"/>
+          </a:xfrm>
+          <a:prstGeom prst="rect">
+            <a:avLst/>
+          </a:prstGeom>
+        </p:spPr>
+      </p:pic>
+    </p:spTree>
+    <p:extLst>
+      <p:ext uri="{BB962C8B-B14F-4D97-AF65-F5344CB8AC3E}">
+        <p14:creationId xmlns:p14="http://schemas.microsoft.com/office/powerpoint/2010/main" val="1495177570"/>
+      </p:ext>
+    </p:extLst>
+  </p:cSld>
+  <p:clrMapOvr>
+    <a:masterClrMapping/>
+  </p:clrMapOvr>
+</p:sld>
+</file>
+
+<file path=ppt/slides/slide13.xml><?xml version="1.0" encoding="utf-8"?>
+<p:sld xmlns:a="http://schemas.openxmlformats.org/drawingml/2006/main" xmlns:r="http://schemas.openxmlformats.org/officeDocument/2006/relationships" xmlns:p="http://schemas.openxmlformats.org/presentationml/2006/main">
+  <p:cSld>
+    <p:spTree>
+      <p:nvGrpSpPr>
+        <p:cNvPr id="1" name=""/>
+        <p:cNvGrpSpPr/>
+        <p:nvPr/>
+      </p:nvGrpSpPr>
+      <p:grpSpPr>
+        <a:xfrm>
+          <a:off x="0" y="0"/>
+          <a:ext cx="0" cy="0"/>
+          <a:chOff x="0" y="0"/>
+          <a:chExt cx="0" cy="0"/>
+        </a:xfrm>
+      </p:grpSpPr>
+      <p:sp>
+        <p:nvSpPr>
+          <p:cNvPr id="2" name="Title 1"/>
+          <p:cNvSpPr>
+            <a:spLocks noGrp="1"/>
+          </p:cNvSpPr>
+          <p:nvPr>
+            <p:ph type="title"/>
+          </p:nvPr>
+        </p:nvSpPr>
+        <p:spPr/>
+        <p:txBody>
+          <a:bodyPr/>
+          <a:lstStyle/>
+          <a:p>
+            <a:endParaRPr lang="en-US"/>
+          </a:p>
+        </p:txBody>
+      </p:sp>
+      <p:sp>
+        <p:nvSpPr>
+          <p:cNvPr id="3" name="Content Placeholder 2"/>
+          <p:cNvSpPr>
+            <a:spLocks noGrp="1"/>
+          </p:cNvSpPr>
+          <p:nvPr>
+            <p:ph idx="1"/>
+          </p:nvPr>
+        </p:nvSpPr>
+        <p:spPr>
+          <a:xfrm>
+            <a:off x="838200" y="1825625"/>
+            <a:ext cx="3037514" cy="4351338"/>
+          </a:xfrm>
+        </p:spPr>
+        <p:txBody>
+          <a:bodyPr/>
+          <a:lstStyle/>
+          <a:p>
+            <a:endParaRPr lang="en-US" dirty="0"/>
+          </a:p>
+        </p:txBody>
+      </p:sp>
+      <p:pic>
+        <p:nvPicPr>
+          <p:cNvPr id="4" name="Picture 3"/>
+          <p:cNvPicPr>
+            <a:picLocks noChangeAspect="1"/>
+          </p:cNvPicPr>
+          <p:nvPr/>
+        </p:nvPicPr>
+        <p:blipFill>
+          <a:blip r:embed="rId2"/>
+          <a:stretch>
+            <a:fillRect/>
+          </a:stretch>
+        </p:blipFill>
+        <p:spPr>
+          <a:xfrm>
+            <a:off x="5080061" y="1262422"/>
+            <a:ext cx="5118793" cy="5269006"/>
+          </a:xfrm>
+          <a:prstGeom prst="rect">
+            <a:avLst/>
+          </a:prstGeom>
+        </p:spPr>
+      </p:pic>
+    </p:spTree>
+    <p:extLst>
+      <p:ext uri="{BB962C8B-B14F-4D97-AF65-F5344CB8AC3E}">
+        <p14:creationId xmlns:p14="http://schemas.microsoft.com/office/powerpoint/2010/main" val="4208967160"/>
+      </p:ext>
+    </p:extLst>
+  </p:cSld>
+  <p:clrMapOvr>
+    <a:masterClrMapping/>
+  </p:clrMapOvr>
+</p:sld>
+</file>
+
+<file path=ppt/slides/slide14.xml><?xml version="1.0" encoding="utf-8"?>
+<p:sld xmlns:a="http://schemas.openxmlformats.org/drawingml/2006/main" xmlns:r="http://schemas.openxmlformats.org/officeDocument/2006/relationships" xmlns:p="http://schemas.openxmlformats.org/presentationml/2006/main">
+  <p:cSld>
+    <p:spTree>
+      <p:nvGrpSpPr>
+        <p:cNvPr id="1" name=""/>
+        <p:cNvGrpSpPr/>
+        <p:nvPr/>
+      </p:nvGrpSpPr>
+      <p:grpSpPr>
+        <a:xfrm>
+          <a:off x="0" y="0"/>
+          <a:ext cx="0" cy="0"/>
+          <a:chOff x="0" y="0"/>
+          <a:chExt cx="0" cy="0"/>
+        </a:xfrm>
+      </p:grpSpPr>
+      <p:sp>
+        <p:nvSpPr>
+          <p:cNvPr id="2" name="Title 1"/>
+          <p:cNvSpPr>
+            <a:spLocks noGrp="1"/>
+          </p:cNvSpPr>
+          <p:nvPr>
+            <p:ph type="title"/>
+          </p:nvPr>
+        </p:nvSpPr>
+        <p:spPr/>
+        <p:txBody>
+          <a:bodyPr/>
+          <a:lstStyle/>
+          <a:p>
+            <a:endParaRPr lang="en-US"/>
+          </a:p>
+        </p:txBody>
+      </p:sp>
+      <p:sp>
+        <p:nvSpPr>
+          <p:cNvPr id="3" name="Content Placeholder 2"/>
+          <p:cNvSpPr>
+            <a:spLocks noGrp="1"/>
+          </p:cNvSpPr>
+          <p:nvPr>
+            <p:ph idx="1"/>
+          </p:nvPr>
+        </p:nvSpPr>
+        <p:spPr>
+          <a:xfrm>
+            <a:off x="838200" y="1825625"/>
+            <a:ext cx="3465352" cy="4351338"/>
+          </a:xfrm>
+        </p:spPr>
+        <p:txBody>
+          <a:bodyPr/>
+          <a:lstStyle/>
+          <a:p>
+            <a:endParaRPr lang="en-US" dirty="0"/>
+          </a:p>
+        </p:txBody>
+      </p:sp>
+      <p:pic>
+        <p:nvPicPr>
+          <p:cNvPr id="5" name="Picture 4"/>
+          <p:cNvPicPr>
+            <a:picLocks noChangeAspect="1"/>
+          </p:cNvPicPr>
+          <p:nvPr/>
+        </p:nvPicPr>
+        <p:blipFill>
+          <a:blip r:embed="rId2"/>
+          <a:stretch>
+            <a:fillRect/>
+          </a:stretch>
+        </p:blipFill>
+        <p:spPr>
+          <a:xfrm>
+            <a:off x="5224462" y="2552700"/>
+            <a:ext cx="1743075" cy="1752600"/>
+          </a:xfrm>
+          <a:prstGeom prst="rect">
+            <a:avLst/>
+          </a:prstGeom>
+        </p:spPr>
+      </p:pic>
+    </p:spTree>
+    <p:extLst>
+      <p:ext uri="{BB962C8B-B14F-4D97-AF65-F5344CB8AC3E}">
+        <p14:creationId xmlns:p14="http://schemas.microsoft.com/office/powerpoint/2010/main" val="112618455"/>
+      </p:ext>
+    </p:extLst>
+  </p:cSld>
+  <p:clrMapOvr>
+    <a:masterClrMapping/>
+  </p:clrMapOvr>
+</p:sld>
+</file>
+
+<file path=ppt/slides/slide15.xml><?xml version="1.0" encoding="utf-8"?>
+<p:sld xmlns:a="http://schemas.openxmlformats.org/drawingml/2006/main" xmlns:r="http://schemas.openxmlformats.org/officeDocument/2006/relationships" xmlns:p="http://schemas.openxmlformats.org/presentationml/2006/main">
+  <p:cSld>
+    <p:spTree>
+      <p:nvGrpSpPr>
+        <p:cNvPr id="1" name=""/>
+        <p:cNvGrpSpPr/>
+        <p:nvPr/>
+      </p:nvGrpSpPr>
+      <p:grpSpPr>
+        <a:xfrm>
+          <a:off x="0" y="0"/>
+          <a:ext cx="0" cy="0"/>
+          <a:chOff x="0" y="0"/>
+          <a:chExt cx="0" cy="0"/>
+        </a:xfrm>
+      </p:grpSpPr>
+      <p:sp>
+        <p:nvSpPr>
+          <p:cNvPr id="2" name="Title 1"/>
+          <p:cNvSpPr>
+            <a:spLocks noGrp="1"/>
+          </p:cNvSpPr>
+          <p:nvPr>
+            <p:ph type="title"/>
+          </p:nvPr>
+        </p:nvSpPr>
+        <p:spPr/>
+        <p:txBody>
+          <a:bodyPr/>
+          <a:lstStyle/>
+          <a:p>
+            <a:endParaRPr lang="en-US"/>
+          </a:p>
+        </p:txBody>
+      </p:sp>
+      <p:sp>
+        <p:nvSpPr>
+          <p:cNvPr id="3" name="Content Placeholder 2"/>
+          <p:cNvSpPr>
+            <a:spLocks noGrp="1"/>
+          </p:cNvSpPr>
+          <p:nvPr>
+            <p:ph idx="1"/>
+          </p:nvPr>
+        </p:nvSpPr>
+        <p:spPr>
+          <a:xfrm>
+            <a:off x="838200" y="1825625"/>
+            <a:ext cx="3389851" cy="4351338"/>
+          </a:xfrm>
+        </p:spPr>
+        <p:txBody>
+          <a:bodyPr/>
+          <a:lstStyle/>
+          <a:p>
+            <a:endParaRPr lang="en-US"/>
+          </a:p>
+        </p:txBody>
+      </p:sp>
+      <p:pic>
+        <p:nvPicPr>
+          <p:cNvPr id="4" name="Picture 3"/>
+          <p:cNvPicPr>
+            <a:picLocks noChangeAspect="1"/>
+          </p:cNvPicPr>
+          <p:nvPr/>
+        </p:nvPicPr>
+        <p:blipFill>
+          <a:blip r:embed="rId2"/>
+          <a:stretch>
+            <a:fillRect/>
+          </a:stretch>
+        </p:blipFill>
+        <p:spPr>
+          <a:xfrm>
+            <a:off x="5499519" y="1027906"/>
+            <a:ext cx="5576538" cy="5416062"/>
+          </a:xfrm>
+          <a:prstGeom prst="rect">
+            <a:avLst/>
+          </a:prstGeom>
+        </p:spPr>
+      </p:pic>
+    </p:spTree>
+    <p:extLst>
+      <p:ext uri="{BB962C8B-B14F-4D97-AF65-F5344CB8AC3E}">
+        <p14:creationId xmlns:p14="http://schemas.microsoft.com/office/powerpoint/2010/main" val="50117964"/>
+      </p:ext>
+    </p:extLst>
+  </p:cSld>
+  <p:clrMapOvr>
+    <a:masterClrMapping/>
+  </p:clrMapOvr>
+</p:sld>
+</file>
+
+<file path=ppt/slides/slide16.xml><?xml version="1.0" encoding="utf-8"?>
+<p:sld xmlns:a="http://schemas.openxmlformats.org/drawingml/2006/main" xmlns:r="http://schemas.openxmlformats.org/officeDocument/2006/relationships" xmlns:p="http://schemas.openxmlformats.org/presentationml/2006/main">
+  <p:cSld>
+    <p:spTree>
+      <p:nvGrpSpPr>
+        <p:cNvPr id="1" name=""/>
+        <p:cNvGrpSpPr/>
+        <p:nvPr/>
+      </p:nvGrpSpPr>
+      <p:grpSpPr>
+        <a:xfrm>
+          <a:off x="0" y="0"/>
+          <a:ext cx="0" cy="0"/>
+          <a:chOff x="0" y="0"/>
+          <a:chExt cx="0" cy="0"/>
+        </a:xfrm>
+      </p:grpSpPr>
+      <p:sp>
+        <p:nvSpPr>
+          <p:cNvPr id="2" name="Title 1"/>
+          <p:cNvSpPr>
+            <a:spLocks noGrp="1"/>
+          </p:cNvSpPr>
+          <p:nvPr>
+            <p:ph type="title"/>
+          </p:nvPr>
+        </p:nvSpPr>
+        <p:spPr/>
+        <p:txBody>
+          <a:bodyPr/>
+          <a:lstStyle/>
+          <a:p>
+            <a:endParaRPr lang="en-US"/>
+          </a:p>
+        </p:txBody>
+      </p:sp>
+      <p:sp>
+        <p:nvSpPr>
+          <p:cNvPr id="3" name="Content Placeholder 2"/>
+          <p:cNvSpPr>
+            <a:spLocks noGrp="1"/>
+          </p:cNvSpPr>
+          <p:nvPr>
+            <p:ph idx="1"/>
+          </p:nvPr>
+        </p:nvSpPr>
+        <p:spPr>
+          <a:xfrm>
+            <a:off x="838200" y="1825625"/>
+            <a:ext cx="3675077" cy="4351338"/>
+          </a:xfrm>
+        </p:spPr>
+        <p:txBody>
+          <a:bodyPr/>
+          <a:lstStyle/>
+          <a:p>
+            <a:endParaRPr lang="en-US" dirty="0"/>
+          </a:p>
+        </p:txBody>
+      </p:sp>
+      <p:pic>
+        <p:nvPicPr>
+          <p:cNvPr id="4" name="Picture 3"/>
+          <p:cNvPicPr>
+            <a:picLocks noChangeAspect="1"/>
+          </p:cNvPicPr>
+          <p:nvPr/>
+        </p:nvPicPr>
+        <p:blipFill>
+          <a:blip r:embed="rId2"/>
+          <a:stretch>
+            <a:fillRect/>
+          </a:stretch>
+        </p:blipFill>
+        <p:spPr>
+          <a:xfrm>
+            <a:off x="5435976" y="1303512"/>
+            <a:ext cx="5650844" cy="4873451"/>
+          </a:xfrm>
+          <a:prstGeom prst="rect">
+            <a:avLst/>
+          </a:prstGeom>
+        </p:spPr>
+      </p:pic>
+    </p:spTree>
+    <p:extLst>
+      <p:ext uri="{BB962C8B-B14F-4D97-AF65-F5344CB8AC3E}">
+        <p14:creationId xmlns:p14="http://schemas.microsoft.com/office/powerpoint/2010/main" val="74315773"/>
+      </p:ext>
+    </p:extLst>
+  </p:cSld>
+  <p:clrMapOvr>
+    <a:masterClrMapping/>
+  </p:clrMapOvr>
+</p:sld>
+</file>
+
 <file path=ppt/slides/slide2.xml><?xml version="1.0" encoding="utf-8"?>
 <p:sld xmlns:a="http://schemas.openxmlformats.org/drawingml/2006/main" xmlns:r="http://schemas.openxmlformats.org/officeDocument/2006/relationships" xmlns:p="http://schemas.openxmlformats.org/presentationml/2006/main">
   <p:cSld>
@@ -5232,6 +5919,103 @@
     <p:extLst>
       <p:ext uri="{BB962C8B-B14F-4D97-AF65-F5344CB8AC3E}">
         <p14:creationId xmlns:p14="http://schemas.microsoft.com/office/powerpoint/2010/main" val="3907402609"/>
+      </p:ext>
+    </p:extLst>
+  </p:cSld>
+  <p:clrMapOvr>
+    <a:masterClrMapping/>
+  </p:clrMapOvr>
+</p:sld>
+</file>
+
+<file path=ppt/slides/slide9.xml><?xml version="1.0" encoding="utf-8"?>
+<p:sld xmlns:a="http://schemas.openxmlformats.org/drawingml/2006/main" xmlns:r="http://schemas.openxmlformats.org/officeDocument/2006/relationships" xmlns:p="http://schemas.openxmlformats.org/presentationml/2006/main">
+  <p:cSld>
+    <p:spTree>
+      <p:nvGrpSpPr>
+        <p:cNvPr id="1" name=""/>
+        <p:cNvGrpSpPr/>
+        <p:nvPr/>
+      </p:nvGrpSpPr>
+      <p:grpSpPr>
+        <a:xfrm>
+          <a:off x="0" y="0"/>
+          <a:ext cx="0" cy="0"/>
+          <a:chOff x="0" y="0"/>
+          <a:chExt cx="0" cy="0"/>
+        </a:xfrm>
+      </p:grpSpPr>
+      <p:sp>
+        <p:nvSpPr>
+          <p:cNvPr id="2" name="Title 1"/>
+          <p:cNvSpPr>
+            <a:spLocks noGrp="1"/>
+          </p:cNvSpPr>
+          <p:nvPr>
+            <p:ph type="title"/>
+          </p:nvPr>
+        </p:nvSpPr>
+        <p:spPr/>
+        <p:txBody>
+          <a:bodyPr/>
+          <a:lstStyle/>
+          <a:p>
+            <a:endParaRPr lang="en-US"/>
+          </a:p>
+        </p:txBody>
+      </p:sp>
+      <p:sp>
+        <p:nvSpPr>
+          <p:cNvPr id="3" name="Content Placeholder 2"/>
+          <p:cNvSpPr>
+            <a:spLocks noGrp="1"/>
+          </p:cNvSpPr>
+          <p:nvPr>
+            <p:ph idx="1"/>
+          </p:nvPr>
+        </p:nvSpPr>
+        <p:spPr>
+          <a:xfrm>
+            <a:off x="838200" y="1825625"/>
+            <a:ext cx="3683466" cy="4351338"/>
+          </a:xfrm>
+        </p:spPr>
+        <p:txBody>
+          <a:bodyPr/>
+          <a:lstStyle/>
+          <a:p>
+            <a:endParaRPr lang="en-US" dirty="0"/>
+          </a:p>
+        </p:txBody>
+      </p:sp>
+      <p:pic>
+        <p:nvPicPr>
+          <p:cNvPr id="6" name="Picture 5"/>
+          <p:cNvPicPr>
+            <a:picLocks noChangeAspect="1"/>
+          </p:cNvPicPr>
+          <p:nvPr/>
+        </p:nvPicPr>
+        <p:blipFill>
+          <a:blip r:embed="rId2"/>
+          <a:stretch>
+            <a:fillRect/>
+          </a:stretch>
+        </p:blipFill>
+        <p:spPr>
+          <a:xfrm>
+            <a:off x="6025780" y="1909186"/>
+            <a:ext cx="4626309" cy="4777991"/>
+          </a:xfrm>
+          <a:prstGeom prst="rect">
+            <a:avLst/>
+          </a:prstGeom>
+        </p:spPr>
+      </p:pic>
+    </p:spTree>
+    <p:extLst>
+      <p:ext uri="{BB962C8B-B14F-4D97-AF65-F5344CB8AC3E}">
+        <p14:creationId xmlns:p14="http://schemas.microsoft.com/office/powerpoint/2010/main" val="2804591246"/>
       </p:ext>
     </p:extLst>
   </p:cSld>

</xml_diff>

<commit_message>
Quick change to test CI
</commit_message>
<xml_diff>
--- a/Prez/Service Fabric Hackathon.pptx
+++ b/Prez/Service Fabric Hackathon.pptx
@@ -21,6 +21,18 @@
     <p:sldId id="269" r:id="rId15"/>
     <p:sldId id="270" r:id="rId16"/>
     <p:sldId id="271" r:id="rId17"/>
+    <p:sldId id="272" r:id="rId18"/>
+    <p:sldId id="273" r:id="rId19"/>
+    <p:sldId id="274" r:id="rId20"/>
+    <p:sldId id="275" r:id="rId21"/>
+    <p:sldId id="276" r:id="rId22"/>
+    <p:sldId id="277" r:id="rId23"/>
+    <p:sldId id="278" r:id="rId24"/>
+    <p:sldId id="279" r:id="rId25"/>
+    <p:sldId id="280" r:id="rId26"/>
+    <p:sldId id="281" r:id="rId27"/>
+    <p:sldId id="282" r:id="rId28"/>
+    <p:sldId id="283" r:id="rId29"/>
   </p:sldIdLst>
   <p:sldSz cx="12192000" cy="6858000"/>
   <p:notesSz cx="6858000" cy="9144000"/>
@@ -3696,6 +3708,297 @@
 </p:sld>
 </file>
 
+<file path=ppt/slides/slide17.xml><?xml version="1.0" encoding="utf-8"?>
+<p:sld xmlns:a="http://schemas.openxmlformats.org/drawingml/2006/main" xmlns:r="http://schemas.openxmlformats.org/officeDocument/2006/relationships" xmlns:p="http://schemas.openxmlformats.org/presentationml/2006/main">
+  <p:cSld>
+    <p:spTree>
+      <p:nvGrpSpPr>
+        <p:cNvPr id="1" name=""/>
+        <p:cNvGrpSpPr/>
+        <p:nvPr/>
+      </p:nvGrpSpPr>
+      <p:grpSpPr>
+        <a:xfrm>
+          <a:off x="0" y="0"/>
+          <a:ext cx="0" cy="0"/>
+          <a:chOff x="0" y="0"/>
+          <a:chExt cx="0" cy="0"/>
+        </a:xfrm>
+      </p:grpSpPr>
+      <p:sp>
+        <p:nvSpPr>
+          <p:cNvPr id="2" name="Title 1"/>
+          <p:cNvSpPr>
+            <a:spLocks noGrp="1"/>
+          </p:cNvSpPr>
+          <p:nvPr>
+            <p:ph type="title"/>
+          </p:nvPr>
+        </p:nvSpPr>
+        <p:spPr/>
+        <p:txBody>
+          <a:bodyPr/>
+          <a:lstStyle/>
+          <a:p>
+            <a:endParaRPr lang="en-US"/>
+          </a:p>
+        </p:txBody>
+      </p:sp>
+      <p:sp>
+        <p:nvSpPr>
+          <p:cNvPr id="3" name="Content Placeholder 2"/>
+          <p:cNvSpPr>
+            <a:spLocks noGrp="1"/>
+          </p:cNvSpPr>
+          <p:nvPr>
+            <p:ph idx="1"/>
+          </p:nvPr>
+        </p:nvSpPr>
+        <p:spPr>
+          <a:xfrm>
+            <a:off x="838200" y="1825625"/>
+            <a:ext cx="3415018" cy="4351338"/>
+          </a:xfrm>
+        </p:spPr>
+        <p:txBody>
+          <a:bodyPr/>
+          <a:lstStyle/>
+          <a:p>
+            <a:endParaRPr lang="en-US" dirty="0"/>
+          </a:p>
+        </p:txBody>
+      </p:sp>
+      <p:pic>
+        <p:nvPicPr>
+          <p:cNvPr id="5" name="Picture 4"/>
+          <p:cNvPicPr>
+            <a:picLocks noChangeAspect="1"/>
+          </p:cNvPicPr>
+          <p:nvPr/>
+        </p:nvPicPr>
+        <p:blipFill>
+          <a:blip r:embed="rId2"/>
+          <a:stretch>
+            <a:fillRect/>
+          </a:stretch>
+        </p:blipFill>
+        <p:spPr>
+          <a:xfrm>
+            <a:off x="5351278" y="1899139"/>
+            <a:ext cx="5015821" cy="4612193"/>
+          </a:xfrm>
+          <a:prstGeom prst="rect">
+            <a:avLst/>
+          </a:prstGeom>
+        </p:spPr>
+      </p:pic>
+    </p:spTree>
+    <p:extLst>
+      <p:ext uri="{BB962C8B-B14F-4D97-AF65-F5344CB8AC3E}">
+        <p14:creationId xmlns:p14="http://schemas.microsoft.com/office/powerpoint/2010/main" val="3011231851"/>
+      </p:ext>
+    </p:extLst>
+  </p:cSld>
+  <p:clrMapOvr>
+    <a:masterClrMapping/>
+  </p:clrMapOvr>
+</p:sld>
+</file>
+
+<file path=ppt/slides/slide18.xml><?xml version="1.0" encoding="utf-8"?>
+<p:sld xmlns:a="http://schemas.openxmlformats.org/drawingml/2006/main" xmlns:r="http://schemas.openxmlformats.org/officeDocument/2006/relationships" xmlns:p="http://schemas.openxmlformats.org/presentationml/2006/main">
+  <p:cSld>
+    <p:spTree>
+      <p:nvGrpSpPr>
+        <p:cNvPr id="1" name=""/>
+        <p:cNvGrpSpPr/>
+        <p:nvPr/>
+      </p:nvGrpSpPr>
+      <p:grpSpPr>
+        <a:xfrm>
+          <a:off x="0" y="0"/>
+          <a:ext cx="0" cy="0"/>
+          <a:chOff x="0" y="0"/>
+          <a:chExt cx="0" cy="0"/>
+        </a:xfrm>
+      </p:grpSpPr>
+      <p:sp>
+        <p:nvSpPr>
+          <p:cNvPr id="2" name="Title 1"/>
+          <p:cNvSpPr>
+            <a:spLocks noGrp="1"/>
+          </p:cNvSpPr>
+          <p:nvPr>
+            <p:ph type="title"/>
+          </p:nvPr>
+        </p:nvSpPr>
+        <p:spPr/>
+        <p:txBody>
+          <a:bodyPr/>
+          <a:lstStyle/>
+          <a:p>
+            <a:endParaRPr lang="en-US"/>
+          </a:p>
+        </p:txBody>
+      </p:sp>
+      <p:sp>
+        <p:nvSpPr>
+          <p:cNvPr id="3" name="Content Placeholder 2"/>
+          <p:cNvSpPr>
+            <a:spLocks noGrp="1"/>
+          </p:cNvSpPr>
+          <p:nvPr>
+            <p:ph idx="1"/>
+          </p:nvPr>
+        </p:nvSpPr>
+        <p:spPr>
+          <a:xfrm>
+            <a:off x="838200" y="1825625"/>
+            <a:ext cx="3113015" cy="4351338"/>
+          </a:xfrm>
+        </p:spPr>
+        <p:txBody>
+          <a:bodyPr/>
+          <a:lstStyle/>
+          <a:p>
+            <a:endParaRPr lang="en-US"/>
+          </a:p>
+        </p:txBody>
+      </p:sp>
+      <p:pic>
+        <p:nvPicPr>
+          <p:cNvPr id="4" name="Picture 3"/>
+          <p:cNvPicPr>
+            <a:picLocks noChangeAspect="1"/>
+          </p:cNvPicPr>
+          <p:nvPr/>
+        </p:nvPicPr>
+        <p:blipFill>
+          <a:blip r:embed="rId2"/>
+          <a:stretch>
+            <a:fillRect/>
+          </a:stretch>
+        </p:blipFill>
+        <p:spPr>
+          <a:xfrm>
+            <a:off x="1860201" y="2502510"/>
+            <a:ext cx="9677400" cy="3400425"/>
+          </a:xfrm>
+          <a:prstGeom prst="rect">
+            <a:avLst/>
+          </a:prstGeom>
+        </p:spPr>
+      </p:pic>
+    </p:spTree>
+    <p:extLst>
+      <p:ext uri="{BB962C8B-B14F-4D97-AF65-F5344CB8AC3E}">
+        <p14:creationId xmlns:p14="http://schemas.microsoft.com/office/powerpoint/2010/main" val="932237445"/>
+      </p:ext>
+    </p:extLst>
+  </p:cSld>
+  <p:clrMapOvr>
+    <a:masterClrMapping/>
+  </p:clrMapOvr>
+</p:sld>
+</file>
+
+<file path=ppt/slides/slide19.xml><?xml version="1.0" encoding="utf-8"?>
+<p:sld xmlns:a="http://schemas.openxmlformats.org/drawingml/2006/main" xmlns:r="http://schemas.openxmlformats.org/officeDocument/2006/relationships" xmlns:p="http://schemas.openxmlformats.org/presentationml/2006/main">
+  <p:cSld>
+    <p:spTree>
+      <p:nvGrpSpPr>
+        <p:cNvPr id="1" name=""/>
+        <p:cNvGrpSpPr/>
+        <p:nvPr/>
+      </p:nvGrpSpPr>
+      <p:grpSpPr>
+        <a:xfrm>
+          <a:off x="0" y="0"/>
+          <a:ext cx="0" cy="0"/>
+          <a:chOff x="0" y="0"/>
+          <a:chExt cx="0" cy="0"/>
+        </a:xfrm>
+      </p:grpSpPr>
+      <p:sp>
+        <p:nvSpPr>
+          <p:cNvPr id="2" name="Title 1"/>
+          <p:cNvSpPr>
+            <a:spLocks noGrp="1"/>
+          </p:cNvSpPr>
+          <p:nvPr>
+            <p:ph type="title"/>
+          </p:nvPr>
+        </p:nvSpPr>
+        <p:spPr/>
+        <p:txBody>
+          <a:bodyPr/>
+          <a:lstStyle/>
+          <a:p>
+            <a:endParaRPr lang="en-US"/>
+          </a:p>
+        </p:txBody>
+      </p:sp>
+      <p:sp>
+        <p:nvSpPr>
+          <p:cNvPr id="3" name="Content Placeholder 2"/>
+          <p:cNvSpPr>
+            <a:spLocks noGrp="1"/>
+          </p:cNvSpPr>
+          <p:nvPr>
+            <p:ph idx="1"/>
+          </p:nvPr>
+        </p:nvSpPr>
+        <p:spPr>
+          <a:xfrm>
+            <a:off x="838200" y="1825625"/>
+            <a:ext cx="2584508" cy="4351338"/>
+          </a:xfrm>
+        </p:spPr>
+        <p:txBody>
+          <a:bodyPr/>
+          <a:lstStyle/>
+          <a:p>
+            <a:endParaRPr lang="en-US" dirty="0"/>
+          </a:p>
+        </p:txBody>
+      </p:sp>
+      <p:pic>
+        <p:nvPicPr>
+          <p:cNvPr id="4" name="Picture 3"/>
+          <p:cNvPicPr>
+            <a:picLocks noChangeAspect="1"/>
+          </p:cNvPicPr>
+          <p:nvPr/>
+        </p:nvPicPr>
+        <p:blipFill>
+          <a:blip r:embed="rId2"/>
+          <a:stretch>
+            <a:fillRect/>
+          </a:stretch>
+        </p:blipFill>
+        <p:spPr>
+          <a:xfrm>
+            <a:off x="5709871" y="1283153"/>
+            <a:ext cx="4495943" cy="5037260"/>
+          </a:xfrm>
+          <a:prstGeom prst="rect">
+            <a:avLst/>
+          </a:prstGeom>
+        </p:spPr>
+      </p:pic>
+    </p:spTree>
+    <p:extLst>
+      <p:ext uri="{BB962C8B-B14F-4D97-AF65-F5344CB8AC3E}">
+        <p14:creationId xmlns:p14="http://schemas.microsoft.com/office/powerpoint/2010/main" val="169848487"/>
+      </p:ext>
+    </p:extLst>
+  </p:cSld>
+  <p:clrMapOvr>
+    <a:masterClrMapping/>
+  </p:clrMapOvr>
+</p:sld>
+</file>
+
 <file path=ppt/slides/slide2.xml><?xml version="1.0" encoding="utf-8"?>
 <p:sld xmlns:a="http://schemas.openxmlformats.org/drawingml/2006/main" xmlns:r="http://schemas.openxmlformats.org/officeDocument/2006/relationships" xmlns:p="http://schemas.openxmlformats.org/presentationml/2006/main">
   <p:cSld>
@@ -4228,6 +4531,849 @@
     <p:extLst>
       <p:ext uri="{BB962C8B-B14F-4D97-AF65-F5344CB8AC3E}">
         <p14:creationId xmlns:p14="http://schemas.microsoft.com/office/powerpoint/2010/main" val="3195207331"/>
+      </p:ext>
+    </p:extLst>
+  </p:cSld>
+  <p:clrMapOvr>
+    <a:masterClrMapping/>
+  </p:clrMapOvr>
+</p:sld>
+</file>
+
+<file path=ppt/slides/slide20.xml><?xml version="1.0" encoding="utf-8"?>
+<p:sld xmlns:a="http://schemas.openxmlformats.org/drawingml/2006/main" xmlns:r="http://schemas.openxmlformats.org/officeDocument/2006/relationships" xmlns:p="http://schemas.openxmlformats.org/presentationml/2006/main">
+  <p:cSld>
+    <p:spTree>
+      <p:nvGrpSpPr>
+        <p:cNvPr id="1" name=""/>
+        <p:cNvGrpSpPr/>
+        <p:nvPr/>
+      </p:nvGrpSpPr>
+      <p:grpSpPr>
+        <a:xfrm>
+          <a:off x="0" y="0"/>
+          <a:ext cx="0" cy="0"/>
+          <a:chOff x="0" y="0"/>
+          <a:chExt cx="0" cy="0"/>
+        </a:xfrm>
+      </p:grpSpPr>
+      <p:sp>
+        <p:nvSpPr>
+          <p:cNvPr id="2" name="Title 1"/>
+          <p:cNvSpPr>
+            <a:spLocks noGrp="1"/>
+          </p:cNvSpPr>
+          <p:nvPr>
+            <p:ph type="title"/>
+          </p:nvPr>
+        </p:nvSpPr>
+        <p:spPr/>
+        <p:txBody>
+          <a:bodyPr/>
+          <a:lstStyle/>
+          <a:p>
+            <a:endParaRPr lang="en-US"/>
+          </a:p>
+        </p:txBody>
+      </p:sp>
+      <p:sp>
+        <p:nvSpPr>
+          <p:cNvPr id="3" name="Content Placeholder 2"/>
+          <p:cNvSpPr>
+            <a:spLocks noGrp="1"/>
+          </p:cNvSpPr>
+          <p:nvPr>
+            <p:ph idx="1"/>
+          </p:nvPr>
+        </p:nvSpPr>
+        <p:spPr>
+          <a:xfrm>
+            <a:off x="838200" y="1825625"/>
+            <a:ext cx="3607966" cy="4351338"/>
+          </a:xfrm>
+        </p:spPr>
+        <p:txBody>
+          <a:bodyPr/>
+          <a:lstStyle/>
+          <a:p>
+            <a:endParaRPr lang="en-US" dirty="0"/>
+          </a:p>
+        </p:txBody>
+      </p:sp>
+      <p:pic>
+        <p:nvPicPr>
+          <p:cNvPr id="4" name="Picture 3"/>
+          <p:cNvPicPr>
+            <a:picLocks noChangeAspect="1"/>
+          </p:cNvPicPr>
+          <p:nvPr/>
+        </p:nvPicPr>
+        <p:blipFill>
+          <a:blip r:embed="rId2"/>
+          <a:stretch>
+            <a:fillRect/>
+          </a:stretch>
+        </p:blipFill>
+        <p:spPr>
+          <a:xfrm>
+            <a:off x="5670201" y="1288511"/>
+            <a:ext cx="4880568" cy="5425565"/>
+          </a:xfrm>
+          <a:prstGeom prst="rect">
+            <a:avLst/>
+          </a:prstGeom>
+        </p:spPr>
+      </p:pic>
+    </p:spTree>
+    <p:extLst>
+      <p:ext uri="{BB962C8B-B14F-4D97-AF65-F5344CB8AC3E}">
+        <p14:creationId xmlns:p14="http://schemas.microsoft.com/office/powerpoint/2010/main" val="843739479"/>
+      </p:ext>
+    </p:extLst>
+  </p:cSld>
+  <p:clrMapOvr>
+    <a:masterClrMapping/>
+  </p:clrMapOvr>
+</p:sld>
+</file>
+
+<file path=ppt/slides/slide21.xml><?xml version="1.0" encoding="utf-8"?>
+<p:sld xmlns:a="http://schemas.openxmlformats.org/drawingml/2006/main" xmlns:r="http://schemas.openxmlformats.org/officeDocument/2006/relationships" xmlns:p="http://schemas.openxmlformats.org/presentationml/2006/main">
+  <p:cSld>
+    <p:spTree>
+      <p:nvGrpSpPr>
+        <p:cNvPr id="1" name=""/>
+        <p:cNvGrpSpPr/>
+        <p:nvPr/>
+      </p:nvGrpSpPr>
+      <p:grpSpPr>
+        <a:xfrm>
+          <a:off x="0" y="0"/>
+          <a:ext cx="0" cy="0"/>
+          <a:chOff x="0" y="0"/>
+          <a:chExt cx="0" cy="0"/>
+        </a:xfrm>
+      </p:grpSpPr>
+      <p:sp>
+        <p:nvSpPr>
+          <p:cNvPr id="2" name="Title 1"/>
+          <p:cNvSpPr>
+            <a:spLocks noGrp="1"/>
+          </p:cNvSpPr>
+          <p:nvPr>
+            <p:ph type="title"/>
+          </p:nvPr>
+        </p:nvSpPr>
+        <p:spPr/>
+        <p:txBody>
+          <a:bodyPr/>
+          <a:lstStyle/>
+          <a:p>
+            <a:endParaRPr lang="en-US"/>
+          </a:p>
+        </p:txBody>
+      </p:sp>
+      <p:sp>
+        <p:nvSpPr>
+          <p:cNvPr id="3" name="Content Placeholder 2"/>
+          <p:cNvSpPr>
+            <a:spLocks noGrp="1"/>
+          </p:cNvSpPr>
+          <p:nvPr>
+            <p:ph idx="1"/>
+          </p:nvPr>
+        </p:nvSpPr>
+        <p:spPr>
+          <a:xfrm>
+            <a:off x="838200" y="1825625"/>
+            <a:ext cx="3993859" cy="4351338"/>
+          </a:xfrm>
+        </p:spPr>
+        <p:txBody>
+          <a:bodyPr/>
+          <a:lstStyle/>
+          <a:p>
+            <a:endParaRPr lang="en-US"/>
+          </a:p>
+        </p:txBody>
+      </p:sp>
+      <p:pic>
+        <p:nvPicPr>
+          <p:cNvPr id="4" name="Picture 3"/>
+          <p:cNvPicPr>
+            <a:picLocks noChangeAspect="1"/>
+          </p:cNvPicPr>
+          <p:nvPr/>
+        </p:nvPicPr>
+        <p:blipFill>
+          <a:blip r:embed="rId2"/>
+          <a:stretch>
+            <a:fillRect/>
+          </a:stretch>
+        </p:blipFill>
+        <p:spPr>
+          <a:xfrm>
+            <a:off x="3238500" y="252412"/>
+            <a:ext cx="5715000" cy="6353175"/>
+          </a:xfrm>
+          <a:prstGeom prst="rect">
+            <a:avLst/>
+          </a:prstGeom>
+        </p:spPr>
+      </p:pic>
+    </p:spTree>
+    <p:extLst>
+      <p:ext uri="{BB962C8B-B14F-4D97-AF65-F5344CB8AC3E}">
+        <p14:creationId xmlns:p14="http://schemas.microsoft.com/office/powerpoint/2010/main" val="268891948"/>
+      </p:ext>
+    </p:extLst>
+  </p:cSld>
+  <p:clrMapOvr>
+    <a:masterClrMapping/>
+  </p:clrMapOvr>
+</p:sld>
+</file>
+
+<file path=ppt/slides/slide22.xml><?xml version="1.0" encoding="utf-8"?>
+<p:sld xmlns:a="http://schemas.openxmlformats.org/drawingml/2006/main" xmlns:r="http://schemas.openxmlformats.org/officeDocument/2006/relationships" xmlns:p="http://schemas.openxmlformats.org/presentationml/2006/main">
+  <p:cSld>
+    <p:spTree>
+      <p:nvGrpSpPr>
+        <p:cNvPr id="1" name=""/>
+        <p:cNvGrpSpPr/>
+        <p:nvPr/>
+      </p:nvGrpSpPr>
+      <p:grpSpPr>
+        <a:xfrm>
+          <a:off x="0" y="0"/>
+          <a:ext cx="0" cy="0"/>
+          <a:chOff x="0" y="0"/>
+          <a:chExt cx="0" cy="0"/>
+        </a:xfrm>
+      </p:grpSpPr>
+      <p:sp>
+        <p:nvSpPr>
+          <p:cNvPr id="2" name="Title 1"/>
+          <p:cNvSpPr>
+            <a:spLocks noGrp="1"/>
+          </p:cNvSpPr>
+          <p:nvPr>
+            <p:ph type="title"/>
+          </p:nvPr>
+        </p:nvSpPr>
+        <p:spPr/>
+        <p:txBody>
+          <a:bodyPr/>
+          <a:lstStyle/>
+          <a:p>
+            <a:endParaRPr lang="en-US"/>
+          </a:p>
+        </p:txBody>
+      </p:sp>
+      <p:sp>
+        <p:nvSpPr>
+          <p:cNvPr id="3" name="Content Placeholder 2"/>
+          <p:cNvSpPr>
+            <a:spLocks noGrp="1"/>
+          </p:cNvSpPr>
+          <p:nvPr>
+            <p:ph idx="1"/>
+          </p:nvPr>
+        </p:nvSpPr>
+        <p:spPr>
+          <a:xfrm>
+            <a:off x="838200" y="1825625"/>
+            <a:ext cx="4069360" cy="4351338"/>
+          </a:xfrm>
+        </p:spPr>
+        <p:txBody>
+          <a:bodyPr/>
+          <a:lstStyle/>
+          <a:p>
+            <a:endParaRPr lang="en-US" dirty="0"/>
+          </a:p>
+        </p:txBody>
+      </p:sp>
+      <p:pic>
+        <p:nvPicPr>
+          <p:cNvPr id="4" name="Picture 3"/>
+          <p:cNvPicPr>
+            <a:picLocks noChangeAspect="1"/>
+          </p:cNvPicPr>
+          <p:nvPr/>
+        </p:nvPicPr>
+        <p:blipFill>
+          <a:blip r:embed="rId2"/>
+          <a:stretch>
+            <a:fillRect/>
+          </a:stretch>
+        </p:blipFill>
+        <p:spPr>
+          <a:xfrm>
+            <a:off x="1871296" y="1690688"/>
+            <a:ext cx="9715500" cy="4676775"/>
+          </a:xfrm>
+          <a:prstGeom prst="rect">
+            <a:avLst/>
+          </a:prstGeom>
+        </p:spPr>
+      </p:pic>
+    </p:spTree>
+    <p:extLst>
+      <p:ext uri="{BB962C8B-B14F-4D97-AF65-F5344CB8AC3E}">
+        <p14:creationId xmlns:p14="http://schemas.microsoft.com/office/powerpoint/2010/main" val="1606493875"/>
+      </p:ext>
+    </p:extLst>
+  </p:cSld>
+  <p:clrMapOvr>
+    <a:masterClrMapping/>
+  </p:clrMapOvr>
+</p:sld>
+</file>
+
+<file path=ppt/slides/slide23.xml><?xml version="1.0" encoding="utf-8"?>
+<p:sld xmlns:a="http://schemas.openxmlformats.org/drawingml/2006/main" xmlns:r="http://schemas.openxmlformats.org/officeDocument/2006/relationships" xmlns:p="http://schemas.openxmlformats.org/presentationml/2006/main">
+  <p:cSld>
+    <p:spTree>
+      <p:nvGrpSpPr>
+        <p:cNvPr id="1" name=""/>
+        <p:cNvGrpSpPr/>
+        <p:nvPr/>
+      </p:nvGrpSpPr>
+      <p:grpSpPr>
+        <a:xfrm>
+          <a:off x="0" y="0"/>
+          <a:ext cx="0" cy="0"/>
+          <a:chOff x="0" y="0"/>
+          <a:chExt cx="0" cy="0"/>
+        </a:xfrm>
+      </p:grpSpPr>
+      <p:sp>
+        <p:nvSpPr>
+          <p:cNvPr id="2" name="Title 1"/>
+          <p:cNvSpPr>
+            <a:spLocks noGrp="1"/>
+          </p:cNvSpPr>
+          <p:nvPr>
+            <p:ph type="title"/>
+          </p:nvPr>
+        </p:nvSpPr>
+        <p:spPr/>
+        <p:txBody>
+          <a:bodyPr/>
+          <a:lstStyle/>
+          <a:p>
+            <a:endParaRPr lang="en-US"/>
+          </a:p>
+        </p:txBody>
+      </p:sp>
+      <p:sp>
+        <p:nvSpPr>
+          <p:cNvPr id="3" name="Content Placeholder 2"/>
+          <p:cNvSpPr>
+            <a:spLocks noGrp="1"/>
+          </p:cNvSpPr>
+          <p:nvPr>
+            <p:ph idx="1"/>
+          </p:nvPr>
+        </p:nvSpPr>
+        <p:spPr/>
+        <p:txBody>
+          <a:bodyPr/>
+          <a:lstStyle/>
+          <a:p>
+            <a:endParaRPr lang="en-US"/>
+          </a:p>
+        </p:txBody>
+      </p:sp>
+      <p:pic>
+        <p:nvPicPr>
+          <p:cNvPr id="4" name="Picture 3"/>
+          <p:cNvPicPr>
+            <a:picLocks noChangeAspect="1"/>
+          </p:cNvPicPr>
+          <p:nvPr/>
+        </p:nvPicPr>
+        <p:blipFill>
+          <a:blip r:embed="rId2"/>
+          <a:stretch>
+            <a:fillRect/>
+          </a:stretch>
+        </p:blipFill>
+        <p:spPr>
+          <a:xfrm>
+            <a:off x="1238250" y="2152650"/>
+            <a:ext cx="9715500" cy="2552700"/>
+          </a:xfrm>
+          <a:prstGeom prst="rect">
+            <a:avLst/>
+          </a:prstGeom>
+        </p:spPr>
+      </p:pic>
+    </p:spTree>
+    <p:extLst>
+      <p:ext uri="{BB962C8B-B14F-4D97-AF65-F5344CB8AC3E}">
+        <p14:creationId xmlns:p14="http://schemas.microsoft.com/office/powerpoint/2010/main" val="2685838392"/>
+      </p:ext>
+    </p:extLst>
+  </p:cSld>
+  <p:clrMapOvr>
+    <a:masterClrMapping/>
+  </p:clrMapOvr>
+</p:sld>
+</file>
+
+<file path=ppt/slides/slide24.xml><?xml version="1.0" encoding="utf-8"?>
+<p:sld xmlns:a="http://schemas.openxmlformats.org/drawingml/2006/main" xmlns:r="http://schemas.openxmlformats.org/officeDocument/2006/relationships" xmlns:p="http://schemas.openxmlformats.org/presentationml/2006/main">
+  <p:cSld>
+    <p:spTree>
+      <p:nvGrpSpPr>
+        <p:cNvPr id="1" name=""/>
+        <p:cNvGrpSpPr/>
+        <p:nvPr/>
+      </p:nvGrpSpPr>
+      <p:grpSpPr>
+        <a:xfrm>
+          <a:off x="0" y="0"/>
+          <a:ext cx="0" cy="0"/>
+          <a:chOff x="0" y="0"/>
+          <a:chExt cx="0" cy="0"/>
+        </a:xfrm>
+      </p:grpSpPr>
+      <p:sp>
+        <p:nvSpPr>
+          <p:cNvPr id="2" name="Title 1"/>
+          <p:cNvSpPr>
+            <a:spLocks noGrp="1"/>
+          </p:cNvSpPr>
+          <p:nvPr>
+            <p:ph type="title"/>
+          </p:nvPr>
+        </p:nvSpPr>
+        <p:spPr/>
+        <p:txBody>
+          <a:bodyPr/>
+          <a:lstStyle/>
+          <a:p>
+            <a:endParaRPr lang="en-US"/>
+          </a:p>
+        </p:txBody>
+      </p:sp>
+      <p:sp>
+        <p:nvSpPr>
+          <p:cNvPr id="3" name="Content Placeholder 2"/>
+          <p:cNvSpPr>
+            <a:spLocks noGrp="1"/>
+          </p:cNvSpPr>
+          <p:nvPr>
+            <p:ph idx="1"/>
+          </p:nvPr>
+        </p:nvSpPr>
+        <p:spPr/>
+        <p:txBody>
+          <a:bodyPr/>
+          <a:lstStyle/>
+          <a:p>
+            <a:endParaRPr lang="en-US" dirty="0"/>
+          </a:p>
+        </p:txBody>
+      </p:sp>
+      <p:pic>
+        <p:nvPicPr>
+          <p:cNvPr id="5" name="Picture 4"/>
+          <p:cNvPicPr>
+            <a:picLocks noChangeAspect="1"/>
+          </p:cNvPicPr>
+          <p:nvPr/>
+        </p:nvPicPr>
+        <p:blipFill>
+          <a:blip r:embed="rId2"/>
+          <a:stretch>
+            <a:fillRect/>
+          </a:stretch>
+        </p:blipFill>
+        <p:spPr>
+          <a:xfrm>
+            <a:off x="3252787" y="1738312"/>
+            <a:ext cx="5686425" cy="3381375"/>
+          </a:xfrm>
+          <a:prstGeom prst="rect">
+            <a:avLst/>
+          </a:prstGeom>
+        </p:spPr>
+      </p:pic>
+    </p:spTree>
+    <p:extLst>
+      <p:ext uri="{BB962C8B-B14F-4D97-AF65-F5344CB8AC3E}">
+        <p14:creationId xmlns:p14="http://schemas.microsoft.com/office/powerpoint/2010/main" val="928821187"/>
+      </p:ext>
+    </p:extLst>
+  </p:cSld>
+  <p:clrMapOvr>
+    <a:masterClrMapping/>
+  </p:clrMapOvr>
+</p:sld>
+</file>
+
+<file path=ppt/slides/slide25.xml><?xml version="1.0" encoding="utf-8"?>
+<p:sld xmlns:a="http://schemas.openxmlformats.org/drawingml/2006/main" xmlns:r="http://schemas.openxmlformats.org/officeDocument/2006/relationships" xmlns:p="http://schemas.openxmlformats.org/presentationml/2006/main">
+  <p:cSld>
+    <p:spTree>
+      <p:nvGrpSpPr>
+        <p:cNvPr id="1" name=""/>
+        <p:cNvGrpSpPr/>
+        <p:nvPr/>
+      </p:nvGrpSpPr>
+      <p:grpSpPr>
+        <a:xfrm>
+          <a:off x="0" y="0"/>
+          <a:ext cx="0" cy="0"/>
+          <a:chOff x="0" y="0"/>
+          <a:chExt cx="0" cy="0"/>
+        </a:xfrm>
+      </p:grpSpPr>
+      <p:sp>
+        <p:nvSpPr>
+          <p:cNvPr id="2" name="Title 1"/>
+          <p:cNvSpPr>
+            <a:spLocks noGrp="1"/>
+          </p:cNvSpPr>
+          <p:nvPr>
+            <p:ph type="title"/>
+          </p:nvPr>
+        </p:nvSpPr>
+        <p:spPr/>
+        <p:txBody>
+          <a:bodyPr/>
+          <a:lstStyle/>
+          <a:p>
+            <a:endParaRPr lang="en-US"/>
+          </a:p>
+        </p:txBody>
+      </p:sp>
+      <p:sp>
+        <p:nvSpPr>
+          <p:cNvPr id="3" name="Content Placeholder 2"/>
+          <p:cNvSpPr>
+            <a:spLocks noGrp="1"/>
+          </p:cNvSpPr>
+          <p:nvPr>
+            <p:ph idx="1"/>
+          </p:nvPr>
+        </p:nvSpPr>
+        <p:spPr/>
+        <p:txBody>
+          <a:bodyPr/>
+          <a:lstStyle/>
+          <a:p>
+            <a:endParaRPr lang="en-US"/>
+          </a:p>
+        </p:txBody>
+      </p:sp>
+      <p:pic>
+        <p:nvPicPr>
+          <p:cNvPr id="5" name="Picture 4"/>
+          <p:cNvPicPr>
+            <a:picLocks noChangeAspect="1"/>
+          </p:cNvPicPr>
+          <p:nvPr/>
+        </p:nvPicPr>
+        <p:blipFill>
+          <a:blip r:embed="rId2"/>
+          <a:stretch>
+            <a:fillRect/>
+          </a:stretch>
+        </p:blipFill>
+        <p:spPr>
+          <a:xfrm>
+            <a:off x="1524000" y="447675"/>
+            <a:ext cx="9144000" cy="5962650"/>
+          </a:xfrm>
+          <a:prstGeom prst="rect">
+            <a:avLst/>
+          </a:prstGeom>
+        </p:spPr>
+      </p:pic>
+    </p:spTree>
+    <p:extLst>
+      <p:ext uri="{BB962C8B-B14F-4D97-AF65-F5344CB8AC3E}">
+        <p14:creationId xmlns:p14="http://schemas.microsoft.com/office/powerpoint/2010/main" val="3531727076"/>
+      </p:ext>
+    </p:extLst>
+  </p:cSld>
+  <p:clrMapOvr>
+    <a:masterClrMapping/>
+  </p:clrMapOvr>
+</p:sld>
+</file>
+
+<file path=ppt/slides/slide26.xml><?xml version="1.0" encoding="utf-8"?>
+<p:sld xmlns:a="http://schemas.openxmlformats.org/drawingml/2006/main" xmlns:r="http://schemas.openxmlformats.org/officeDocument/2006/relationships" xmlns:p="http://schemas.openxmlformats.org/presentationml/2006/main">
+  <p:cSld>
+    <p:spTree>
+      <p:nvGrpSpPr>
+        <p:cNvPr id="1" name=""/>
+        <p:cNvGrpSpPr/>
+        <p:nvPr/>
+      </p:nvGrpSpPr>
+      <p:grpSpPr>
+        <a:xfrm>
+          <a:off x="0" y="0"/>
+          <a:ext cx="0" cy="0"/>
+          <a:chOff x="0" y="0"/>
+          <a:chExt cx="0" cy="0"/>
+        </a:xfrm>
+      </p:grpSpPr>
+      <p:sp>
+        <p:nvSpPr>
+          <p:cNvPr id="2" name="Title 1"/>
+          <p:cNvSpPr>
+            <a:spLocks noGrp="1"/>
+          </p:cNvSpPr>
+          <p:nvPr>
+            <p:ph type="title"/>
+          </p:nvPr>
+        </p:nvSpPr>
+        <p:spPr/>
+        <p:txBody>
+          <a:bodyPr/>
+          <a:lstStyle/>
+          <a:p>
+            <a:endParaRPr lang="en-US"/>
+          </a:p>
+        </p:txBody>
+      </p:sp>
+      <p:sp>
+        <p:nvSpPr>
+          <p:cNvPr id="3" name="Content Placeholder 2"/>
+          <p:cNvSpPr>
+            <a:spLocks noGrp="1"/>
+          </p:cNvSpPr>
+          <p:nvPr>
+            <p:ph idx="1"/>
+          </p:nvPr>
+        </p:nvSpPr>
+        <p:spPr/>
+        <p:txBody>
+          <a:bodyPr/>
+          <a:lstStyle/>
+          <a:p>
+            <a:endParaRPr lang="en-US"/>
+          </a:p>
+        </p:txBody>
+      </p:sp>
+      <p:pic>
+        <p:nvPicPr>
+          <p:cNvPr id="4" name="Picture 3"/>
+          <p:cNvPicPr>
+            <a:picLocks noChangeAspect="1"/>
+          </p:cNvPicPr>
+          <p:nvPr/>
+        </p:nvPicPr>
+        <p:blipFill>
+          <a:blip r:embed="rId2"/>
+          <a:stretch>
+            <a:fillRect/>
+          </a:stretch>
+        </p:blipFill>
+        <p:spPr>
+          <a:xfrm>
+            <a:off x="1247775" y="1023937"/>
+            <a:ext cx="9696450" cy="4810125"/>
+          </a:xfrm>
+          <a:prstGeom prst="rect">
+            <a:avLst/>
+          </a:prstGeom>
+        </p:spPr>
+      </p:pic>
+    </p:spTree>
+    <p:extLst>
+      <p:ext uri="{BB962C8B-B14F-4D97-AF65-F5344CB8AC3E}">
+        <p14:creationId xmlns:p14="http://schemas.microsoft.com/office/powerpoint/2010/main" val="235155747"/>
+      </p:ext>
+    </p:extLst>
+  </p:cSld>
+  <p:clrMapOvr>
+    <a:masterClrMapping/>
+  </p:clrMapOvr>
+</p:sld>
+</file>
+
+<file path=ppt/slides/slide27.xml><?xml version="1.0" encoding="utf-8"?>
+<p:sld xmlns:a="http://schemas.openxmlformats.org/drawingml/2006/main" xmlns:r="http://schemas.openxmlformats.org/officeDocument/2006/relationships" xmlns:p="http://schemas.openxmlformats.org/presentationml/2006/main">
+  <p:cSld>
+    <p:spTree>
+      <p:nvGrpSpPr>
+        <p:cNvPr id="1" name=""/>
+        <p:cNvGrpSpPr/>
+        <p:nvPr/>
+      </p:nvGrpSpPr>
+      <p:grpSpPr>
+        <a:xfrm>
+          <a:off x="0" y="0"/>
+          <a:ext cx="0" cy="0"/>
+          <a:chOff x="0" y="0"/>
+          <a:chExt cx="0" cy="0"/>
+        </a:xfrm>
+      </p:grpSpPr>
+      <p:sp>
+        <p:nvSpPr>
+          <p:cNvPr id="2" name="Title 1"/>
+          <p:cNvSpPr>
+            <a:spLocks noGrp="1"/>
+          </p:cNvSpPr>
+          <p:nvPr>
+            <p:ph type="title"/>
+          </p:nvPr>
+        </p:nvSpPr>
+        <p:spPr/>
+        <p:txBody>
+          <a:bodyPr/>
+          <a:lstStyle/>
+          <a:p>
+            <a:endParaRPr lang="en-US"/>
+          </a:p>
+        </p:txBody>
+      </p:sp>
+      <p:sp>
+        <p:nvSpPr>
+          <p:cNvPr id="3" name="Content Placeholder 2"/>
+          <p:cNvSpPr>
+            <a:spLocks noGrp="1"/>
+          </p:cNvSpPr>
+          <p:nvPr>
+            <p:ph idx="1"/>
+          </p:nvPr>
+        </p:nvSpPr>
+        <p:spPr/>
+        <p:txBody>
+          <a:bodyPr/>
+          <a:lstStyle/>
+          <a:p>
+            <a:endParaRPr lang="en-US"/>
+          </a:p>
+        </p:txBody>
+      </p:sp>
+      <p:pic>
+        <p:nvPicPr>
+          <p:cNvPr id="4" name="Picture 3"/>
+          <p:cNvPicPr>
+            <a:picLocks noChangeAspect="1"/>
+          </p:cNvPicPr>
+          <p:nvPr/>
+        </p:nvPicPr>
+        <p:blipFill>
+          <a:blip r:embed="rId2"/>
+          <a:stretch>
+            <a:fillRect/>
+          </a:stretch>
+        </p:blipFill>
+        <p:spPr>
+          <a:xfrm>
+            <a:off x="5179531" y="1690688"/>
+            <a:ext cx="6358946" cy="5032375"/>
+          </a:xfrm>
+          <a:prstGeom prst="rect">
+            <a:avLst/>
+          </a:prstGeom>
+        </p:spPr>
+      </p:pic>
+    </p:spTree>
+    <p:extLst>
+      <p:ext uri="{BB962C8B-B14F-4D97-AF65-F5344CB8AC3E}">
+        <p14:creationId xmlns:p14="http://schemas.microsoft.com/office/powerpoint/2010/main" val="665462225"/>
+      </p:ext>
+    </p:extLst>
+  </p:cSld>
+  <p:clrMapOvr>
+    <a:masterClrMapping/>
+  </p:clrMapOvr>
+</p:sld>
+</file>
+
+<file path=ppt/slides/slide28.xml><?xml version="1.0" encoding="utf-8"?>
+<p:sld xmlns:a="http://schemas.openxmlformats.org/drawingml/2006/main" xmlns:r="http://schemas.openxmlformats.org/officeDocument/2006/relationships" xmlns:p="http://schemas.openxmlformats.org/presentationml/2006/main">
+  <p:cSld>
+    <p:spTree>
+      <p:nvGrpSpPr>
+        <p:cNvPr id="1" name=""/>
+        <p:cNvGrpSpPr/>
+        <p:nvPr/>
+      </p:nvGrpSpPr>
+      <p:grpSpPr>
+        <a:xfrm>
+          <a:off x="0" y="0"/>
+          <a:ext cx="0" cy="0"/>
+          <a:chOff x="0" y="0"/>
+          <a:chExt cx="0" cy="0"/>
+        </a:xfrm>
+      </p:grpSpPr>
+      <p:sp>
+        <p:nvSpPr>
+          <p:cNvPr id="2" name="Title 1"/>
+          <p:cNvSpPr>
+            <a:spLocks noGrp="1"/>
+          </p:cNvSpPr>
+          <p:nvPr>
+            <p:ph type="title"/>
+          </p:nvPr>
+        </p:nvSpPr>
+        <p:spPr/>
+        <p:txBody>
+          <a:bodyPr/>
+          <a:lstStyle/>
+          <a:p>
+            <a:endParaRPr lang="en-US"/>
+          </a:p>
+        </p:txBody>
+      </p:sp>
+      <p:sp>
+        <p:nvSpPr>
+          <p:cNvPr id="3" name="Content Placeholder 2"/>
+          <p:cNvSpPr>
+            <a:spLocks noGrp="1"/>
+          </p:cNvSpPr>
+          <p:nvPr>
+            <p:ph idx="1"/>
+          </p:nvPr>
+        </p:nvSpPr>
+        <p:spPr/>
+        <p:txBody>
+          <a:bodyPr/>
+          <a:lstStyle/>
+          <a:p>
+            <a:endParaRPr lang="en-US"/>
+          </a:p>
+        </p:txBody>
+      </p:sp>
+      <p:pic>
+        <p:nvPicPr>
+          <p:cNvPr id="4" name="Picture 3"/>
+          <p:cNvPicPr>
+            <a:picLocks noChangeAspect="1"/>
+          </p:cNvPicPr>
+          <p:nvPr/>
+        </p:nvPicPr>
+        <p:blipFill>
+          <a:blip r:embed="rId2"/>
+          <a:stretch>
+            <a:fillRect/>
+          </a:stretch>
+        </p:blipFill>
+        <p:spPr>
+          <a:xfrm>
+            <a:off x="466725" y="509587"/>
+            <a:ext cx="11258550" cy="5838825"/>
+          </a:xfrm>
+          <a:prstGeom prst="rect">
+            <a:avLst/>
+          </a:prstGeom>
+        </p:spPr>
+      </p:pic>
+    </p:spTree>
+    <p:extLst>
+      <p:ext uri="{BB962C8B-B14F-4D97-AF65-F5344CB8AC3E}">
+        <p14:creationId xmlns:p14="http://schemas.microsoft.com/office/powerpoint/2010/main" val="1290345578"/>
       </p:ext>
     </p:extLst>
   </p:cSld>

</xml_diff>

<commit_message>
Minor updates for hackathon
</commit_message>
<xml_diff>
--- a/Prez/Service Fabric Hackathon.pptx
+++ b/Prez/Service Fabric Hackathon.pptx
@@ -6,33 +6,10 @@
   </p:sldMasterIdLst>
   <p:sldIdLst>
     <p:sldId id="256" r:id="rId2"/>
-    <p:sldId id="257" r:id="rId3"/>
-    <p:sldId id="258" r:id="rId4"/>
-    <p:sldId id="259" r:id="rId5"/>
-    <p:sldId id="261" r:id="rId6"/>
-    <p:sldId id="260" r:id="rId7"/>
-    <p:sldId id="262" r:id="rId8"/>
-    <p:sldId id="263" r:id="rId9"/>
-    <p:sldId id="264" r:id="rId10"/>
-    <p:sldId id="265" r:id="rId11"/>
-    <p:sldId id="266" r:id="rId12"/>
-    <p:sldId id="267" r:id="rId13"/>
-    <p:sldId id="268" r:id="rId14"/>
-    <p:sldId id="269" r:id="rId15"/>
-    <p:sldId id="270" r:id="rId16"/>
-    <p:sldId id="271" r:id="rId17"/>
-    <p:sldId id="272" r:id="rId18"/>
-    <p:sldId id="273" r:id="rId19"/>
-    <p:sldId id="274" r:id="rId20"/>
-    <p:sldId id="275" r:id="rId21"/>
-    <p:sldId id="276" r:id="rId22"/>
-    <p:sldId id="277" r:id="rId23"/>
-    <p:sldId id="278" r:id="rId24"/>
-    <p:sldId id="279" r:id="rId25"/>
-    <p:sldId id="280" r:id="rId26"/>
-    <p:sldId id="281" r:id="rId27"/>
-    <p:sldId id="282" r:id="rId28"/>
-    <p:sldId id="283" r:id="rId29"/>
+    <p:sldId id="284" r:id="rId3"/>
+    <p:sldId id="259" r:id="rId4"/>
+    <p:sldId id="261" r:id="rId5"/>
+    <p:sldId id="260" r:id="rId6"/>
   </p:sldIdLst>
   <p:sldSz cx="12192000" cy="6858000"/>
   <p:notesSz cx="6858000" cy="9144000"/>
@@ -268,7 +245,7 @@
           <a:p>
             <a:fld id="{9E192CE5-DCDA-414F-932D-9165609A3877}" type="datetimeFigureOut">
               <a:rPr lang="en-US" smtClean="0"/>
-              <a:t>2/12/17</a:t>
+              <a:t>2/13/2017</a:t>
             </a:fld>
             <a:endParaRPr lang="en-US"/>
           </a:p>
@@ -436,7 +413,7 @@
           <a:p>
             <a:fld id="{9E192CE5-DCDA-414F-932D-9165609A3877}" type="datetimeFigureOut">
               <a:rPr lang="en-US" smtClean="0"/>
-              <a:t>2/12/17</a:t>
+              <a:t>2/13/2017</a:t>
             </a:fld>
             <a:endParaRPr lang="en-US"/>
           </a:p>
@@ -614,7 +591,7 @@
           <a:p>
             <a:fld id="{9E192CE5-DCDA-414F-932D-9165609A3877}" type="datetimeFigureOut">
               <a:rPr lang="en-US" smtClean="0"/>
-              <a:t>2/12/17</a:t>
+              <a:t>2/13/2017</a:t>
             </a:fld>
             <a:endParaRPr lang="en-US"/>
           </a:p>
@@ -782,7 +759,7 @@
           <a:p>
             <a:fld id="{9E192CE5-DCDA-414F-932D-9165609A3877}" type="datetimeFigureOut">
               <a:rPr lang="en-US" smtClean="0"/>
-              <a:t>2/12/17</a:t>
+              <a:t>2/13/2017</a:t>
             </a:fld>
             <a:endParaRPr lang="en-US"/>
           </a:p>
@@ -1027,7 +1004,7 @@
           <a:p>
             <a:fld id="{9E192CE5-DCDA-414F-932D-9165609A3877}" type="datetimeFigureOut">
               <a:rPr lang="en-US" smtClean="0"/>
-              <a:t>2/12/17</a:t>
+              <a:t>2/13/2017</a:t>
             </a:fld>
             <a:endParaRPr lang="en-US"/>
           </a:p>
@@ -1256,7 +1233,7 @@
           <a:p>
             <a:fld id="{9E192CE5-DCDA-414F-932D-9165609A3877}" type="datetimeFigureOut">
               <a:rPr lang="en-US" smtClean="0"/>
-              <a:t>2/12/17</a:t>
+              <a:t>2/13/2017</a:t>
             </a:fld>
             <a:endParaRPr lang="en-US"/>
           </a:p>
@@ -1620,7 +1597,7 @@
           <a:p>
             <a:fld id="{9E192CE5-DCDA-414F-932D-9165609A3877}" type="datetimeFigureOut">
               <a:rPr lang="en-US" smtClean="0"/>
-              <a:t>2/12/17</a:t>
+              <a:t>2/13/2017</a:t>
             </a:fld>
             <a:endParaRPr lang="en-US"/>
           </a:p>
@@ -1737,7 +1714,7 @@
           <a:p>
             <a:fld id="{9E192CE5-DCDA-414F-932D-9165609A3877}" type="datetimeFigureOut">
               <a:rPr lang="en-US" smtClean="0"/>
-              <a:t>2/12/17</a:t>
+              <a:t>2/13/2017</a:t>
             </a:fld>
             <a:endParaRPr lang="en-US"/>
           </a:p>
@@ -1832,7 +1809,7 @@
           <a:p>
             <a:fld id="{9E192CE5-DCDA-414F-932D-9165609A3877}" type="datetimeFigureOut">
               <a:rPr lang="en-US" smtClean="0"/>
-              <a:t>2/12/17</a:t>
+              <a:t>2/13/2017</a:t>
             </a:fld>
             <a:endParaRPr lang="en-US"/>
           </a:p>
@@ -2107,7 +2084,7 @@
           <a:p>
             <a:fld id="{9E192CE5-DCDA-414F-932D-9165609A3877}" type="datetimeFigureOut">
               <a:rPr lang="en-US" smtClean="0"/>
-              <a:t>2/12/17</a:t>
+              <a:t>2/13/2017</a:t>
             </a:fld>
             <a:endParaRPr lang="en-US"/>
           </a:p>
@@ -2359,7 +2336,7 @@
           <a:p>
             <a:fld id="{9E192CE5-DCDA-414F-932D-9165609A3877}" type="datetimeFigureOut">
               <a:rPr lang="en-US" smtClean="0"/>
-              <a:t>2/12/17</a:t>
+              <a:t>2/13/2017</a:t>
             </a:fld>
             <a:endParaRPr lang="en-US"/>
           </a:p>
@@ -2570,7 +2547,7 @@
           <a:p>
             <a:fld id="{9E192CE5-DCDA-414F-932D-9165609A3877}" type="datetimeFigureOut">
               <a:rPr lang="en-US" smtClean="0"/>
-              <a:t>2/12/17</a:t>
+              <a:t>2/13/2017</a:t>
             </a:fld>
             <a:endParaRPr lang="en-US"/>
           </a:p>
@@ -3029,976 +3006,6 @@
 </p:sld>
 </file>
 
-<file path=ppt/slides/slide10.xml><?xml version="1.0" encoding="utf-8"?>
-<p:sld xmlns:a="http://schemas.openxmlformats.org/drawingml/2006/main" xmlns:r="http://schemas.openxmlformats.org/officeDocument/2006/relationships" xmlns:p="http://schemas.openxmlformats.org/presentationml/2006/main">
-  <p:cSld>
-    <p:spTree>
-      <p:nvGrpSpPr>
-        <p:cNvPr id="1" name=""/>
-        <p:cNvGrpSpPr/>
-        <p:nvPr/>
-      </p:nvGrpSpPr>
-      <p:grpSpPr>
-        <a:xfrm>
-          <a:off x="0" y="0"/>
-          <a:ext cx="0" cy="0"/>
-          <a:chOff x="0" y="0"/>
-          <a:chExt cx="0" cy="0"/>
-        </a:xfrm>
-      </p:grpSpPr>
-      <p:sp>
-        <p:nvSpPr>
-          <p:cNvPr id="2" name="Title 1"/>
-          <p:cNvSpPr>
-            <a:spLocks noGrp="1"/>
-          </p:cNvSpPr>
-          <p:nvPr>
-            <p:ph type="title"/>
-          </p:nvPr>
-        </p:nvSpPr>
-        <p:spPr/>
-        <p:txBody>
-          <a:bodyPr/>
-          <a:lstStyle/>
-          <a:p>
-            <a:endParaRPr lang="en-US"/>
-          </a:p>
-        </p:txBody>
-      </p:sp>
-      <p:sp>
-        <p:nvSpPr>
-          <p:cNvPr id="3" name="Content Placeholder 2"/>
-          <p:cNvSpPr>
-            <a:spLocks noGrp="1"/>
-          </p:cNvSpPr>
-          <p:nvPr>
-            <p:ph idx="1"/>
-          </p:nvPr>
-        </p:nvSpPr>
-        <p:spPr>
-          <a:xfrm>
-            <a:off x="838200" y="1825625"/>
-            <a:ext cx="3616354" cy="4351338"/>
-          </a:xfrm>
-        </p:spPr>
-        <p:txBody>
-          <a:bodyPr/>
-          <a:lstStyle/>
-          <a:p>
-            <a:endParaRPr lang="en-US" dirty="0"/>
-          </a:p>
-        </p:txBody>
-      </p:sp>
-      <p:pic>
-        <p:nvPicPr>
-          <p:cNvPr id="5" name="Picture 4"/>
-          <p:cNvPicPr>
-            <a:picLocks noChangeAspect="1"/>
-          </p:cNvPicPr>
-          <p:nvPr/>
-        </p:nvPicPr>
-        <p:blipFill>
-          <a:blip r:embed="rId2"/>
-          <a:stretch>
-            <a:fillRect/>
-          </a:stretch>
-        </p:blipFill>
-        <p:spPr>
-          <a:xfrm>
-            <a:off x="6172531" y="1027906"/>
-            <a:ext cx="3624935" cy="5255288"/>
-          </a:xfrm>
-          <a:prstGeom prst="rect">
-            <a:avLst/>
-          </a:prstGeom>
-        </p:spPr>
-      </p:pic>
-    </p:spTree>
-    <p:extLst>
-      <p:ext uri="{BB962C8B-B14F-4D97-AF65-F5344CB8AC3E}">
-        <p14:creationId xmlns:p14="http://schemas.microsoft.com/office/powerpoint/2010/main" val="3650640873"/>
-      </p:ext>
-    </p:extLst>
-  </p:cSld>
-  <p:clrMapOvr>
-    <a:masterClrMapping/>
-  </p:clrMapOvr>
-</p:sld>
-</file>
-
-<file path=ppt/slides/slide11.xml><?xml version="1.0" encoding="utf-8"?>
-<p:sld xmlns:a="http://schemas.openxmlformats.org/drawingml/2006/main" xmlns:r="http://schemas.openxmlformats.org/officeDocument/2006/relationships" xmlns:p="http://schemas.openxmlformats.org/presentationml/2006/main">
-  <p:cSld>
-    <p:spTree>
-      <p:nvGrpSpPr>
-        <p:cNvPr id="1" name=""/>
-        <p:cNvGrpSpPr/>
-        <p:nvPr/>
-      </p:nvGrpSpPr>
-      <p:grpSpPr>
-        <a:xfrm>
-          <a:off x="0" y="0"/>
-          <a:ext cx="0" cy="0"/>
-          <a:chOff x="0" y="0"/>
-          <a:chExt cx="0" cy="0"/>
-        </a:xfrm>
-      </p:grpSpPr>
-      <p:sp>
-        <p:nvSpPr>
-          <p:cNvPr id="2" name="Title 1"/>
-          <p:cNvSpPr>
-            <a:spLocks noGrp="1"/>
-          </p:cNvSpPr>
-          <p:nvPr>
-            <p:ph type="title"/>
-          </p:nvPr>
-        </p:nvSpPr>
-        <p:spPr/>
-        <p:txBody>
-          <a:bodyPr/>
-          <a:lstStyle/>
-          <a:p>
-            <a:endParaRPr lang="en-US"/>
-          </a:p>
-        </p:txBody>
-      </p:sp>
-      <p:sp>
-        <p:nvSpPr>
-          <p:cNvPr id="3" name="Content Placeholder 2"/>
-          <p:cNvSpPr>
-            <a:spLocks noGrp="1"/>
-          </p:cNvSpPr>
-          <p:nvPr>
-            <p:ph idx="1"/>
-          </p:nvPr>
-        </p:nvSpPr>
-        <p:spPr>
-          <a:xfrm>
-            <a:off x="838200" y="1825625"/>
-            <a:ext cx="3322739" cy="4351338"/>
-          </a:xfrm>
-        </p:spPr>
-        <p:txBody>
-          <a:bodyPr/>
-          <a:lstStyle/>
-          <a:p>
-            <a:endParaRPr lang="en-US" dirty="0"/>
-          </a:p>
-        </p:txBody>
-      </p:sp>
-      <p:pic>
-        <p:nvPicPr>
-          <p:cNvPr id="4" name="Picture 3"/>
-          <p:cNvPicPr>
-            <a:picLocks noChangeAspect="1"/>
-          </p:cNvPicPr>
-          <p:nvPr/>
-        </p:nvPicPr>
-        <p:blipFill>
-          <a:blip r:embed="rId2"/>
-          <a:stretch>
-            <a:fillRect/>
-          </a:stretch>
-        </p:blipFill>
-        <p:spPr>
-          <a:xfrm>
-            <a:off x="4160939" y="1655004"/>
-            <a:ext cx="7739179" cy="4692580"/>
-          </a:xfrm>
-          <a:prstGeom prst="rect">
-            <a:avLst/>
-          </a:prstGeom>
-        </p:spPr>
-      </p:pic>
-    </p:spTree>
-    <p:extLst>
-      <p:ext uri="{BB962C8B-B14F-4D97-AF65-F5344CB8AC3E}">
-        <p14:creationId xmlns:p14="http://schemas.microsoft.com/office/powerpoint/2010/main" val="3444056454"/>
-      </p:ext>
-    </p:extLst>
-  </p:cSld>
-  <p:clrMapOvr>
-    <a:masterClrMapping/>
-  </p:clrMapOvr>
-</p:sld>
-</file>
-
-<file path=ppt/slides/slide12.xml><?xml version="1.0" encoding="utf-8"?>
-<p:sld xmlns:a="http://schemas.openxmlformats.org/drawingml/2006/main" xmlns:r="http://schemas.openxmlformats.org/officeDocument/2006/relationships" xmlns:p="http://schemas.openxmlformats.org/presentationml/2006/main">
-  <p:cSld>
-    <p:spTree>
-      <p:nvGrpSpPr>
-        <p:cNvPr id="1" name=""/>
-        <p:cNvGrpSpPr/>
-        <p:nvPr/>
-      </p:nvGrpSpPr>
-      <p:grpSpPr>
-        <a:xfrm>
-          <a:off x="0" y="0"/>
-          <a:ext cx="0" cy="0"/>
-          <a:chOff x="0" y="0"/>
-          <a:chExt cx="0" cy="0"/>
-        </a:xfrm>
-      </p:grpSpPr>
-      <p:sp>
-        <p:nvSpPr>
-          <p:cNvPr id="2" name="Title 1"/>
-          <p:cNvSpPr>
-            <a:spLocks noGrp="1"/>
-          </p:cNvSpPr>
-          <p:nvPr>
-            <p:ph type="title"/>
-          </p:nvPr>
-        </p:nvSpPr>
-        <p:spPr/>
-        <p:txBody>
-          <a:bodyPr/>
-          <a:lstStyle/>
-          <a:p>
-            <a:endParaRPr lang="en-US"/>
-          </a:p>
-        </p:txBody>
-      </p:sp>
-      <p:sp>
-        <p:nvSpPr>
-          <p:cNvPr id="3" name="Content Placeholder 2"/>
-          <p:cNvSpPr>
-            <a:spLocks noGrp="1"/>
-          </p:cNvSpPr>
-          <p:nvPr>
-            <p:ph idx="1"/>
-          </p:nvPr>
-        </p:nvSpPr>
-        <p:spPr>
-          <a:xfrm>
-            <a:off x="838200" y="1825625"/>
-            <a:ext cx="3222072" cy="4351338"/>
-          </a:xfrm>
-        </p:spPr>
-        <p:txBody>
-          <a:bodyPr/>
-          <a:lstStyle/>
-          <a:p>
-            <a:endParaRPr lang="en-US" dirty="0"/>
-          </a:p>
-        </p:txBody>
-      </p:sp>
-      <p:pic>
-        <p:nvPicPr>
-          <p:cNvPr id="5" name="Picture 4"/>
-          <p:cNvPicPr>
-            <a:picLocks noChangeAspect="1"/>
-          </p:cNvPicPr>
-          <p:nvPr/>
-        </p:nvPicPr>
-        <p:blipFill>
-          <a:blip r:embed="rId2"/>
-          <a:stretch>
-            <a:fillRect/>
-          </a:stretch>
-        </p:blipFill>
-        <p:spPr>
-          <a:xfrm>
-            <a:off x="5436891" y="2186781"/>
-            <a:ext cx="6000750" cy="3629025"/>
-          </a:xfrm>
-          <a:prstGeom prst="rect">
-            <a:avLst/>
-          </a:prstGeom>
-        </p:spPr>
-      </p:pic>
-    </p:spTree>
-    <p:extLst>
-      <p:ext uri="{BB962C8B-B14F-4D97-AF65-F5344CB8AC3E}">
-        <p14:creationId xmlns:p14="http://schemas.microsoft.com/office/powerpoint/2010/main" val="1495177570"/>
-      </p:ext>
-    </p:extLst>
-  </p:cSld>
-  <p:clrMapOvr>
-    <a:masterClrMapping/>
-  </p:clrMapOvr>
-</p:sld>
-</file>
-
-<file path=ppt/slides/slide13.xml><?xml version="1.0" encoding="utf-8"?>
-<p:sld xmlns:a="http://schemas.openxmlformats.org/drawingml/2006/main" xmlns:r="http://schemas.openxmlformats.org/officeDocument/2006/relationships" xmlns:p="http://schemas.openxmlformats.org/presentationml/2006/main">
-  <p:cSld>
-    <p:spTree>
-      <p:nvGrpSpPr>
-        <p:cNvPr id="1" name=""/>
-        <p:cNvGrpSpPr/>
-        <p:nvPr/>
-      </p:nvGrpSpPr>
-      <p:grpSpPr>
-        <a:xfrm>
-          <a:off x="0" y="0"/>
-          <a:ext cx="0" cy="0"/>
-          <a:chOff x="0" y="0"/>
-          <a:chExt cx="0" cy="0"/>
-        </a:xfrm>
-      </p:grpSpPr>
-      <p:sp>
-        <p:nvSpPr>
-          <p:cNvPr id="2" name="Title 1"/>
-          <p:cNvSpPr>
-            <a:spLocks noGrp="1"/>
-          </p:cNvSpPr>
-          <p:nvPr>
-            <p:ph type="title"/>
-          </p:nvPr>
-        </p:nvSpPr>
-        <p:spPr/>
-        <p:txBody>
-          <a:bodyPr/>
-          <a:lstStyle/>
-          <a:p>
-            <a:endParaRPr lang="en-US"/>
-          </a:p>
-        </p:txBody>
-      </p:sp>
-      <p:sp>
-        <p:nvSpPr>
-          <p:cNvPr id="3" name="Content Placeholder 2"/>
-          <p:cNvSpPr>
-            <a:spLocks noGrp="1"/>
-          </p:cNvSpPr>
-          <p:nvPr>
-            <p:ph idx="1"/>
-          </p:nvPr>
-        </p:nvSpPr>
-        <p:spPr>
-          <a:xfrm>
-            <a:off x="838200" y="1825625"/>
-            <a:ext cx="3037514" cy="4351338"/>
-          </a:xfrm>
-        </p:spPr>
-        <p:txBody>
-          <a:bodyPr/>
-          <a:lstStyle/>
-          <a:p>
-            <a:endParaRPr lang="en-US" dirty="0"/>
-          </a:p>
-        </p:txBody>
-      </p:sp>
-      <p:pic>
-        <p:nvPicPr>
-          <p:cNvPr id="4" name="Picture 3"/>
-          <p:cNvPicPr>
-            <a:picLocks noChangeAspect="1"/>
-          </p:cNvPicPr>
-          <p:nvPr/>
-        </p:nvPicPr>
-        <p:blipFill>
-          <a:blip r:embed="rId2"/>
-          <a:stretch>
-            <a:fillRect/>
-          </a:stretch>
-        </p:blipFill>
-        <p:spPr>
-          <a:xfrm>
-            <a:off x="5080061" y="1262422"/>
-            <a:ext cx="5118793" cy="5269006"/>
-          </a:xfrm>
-          <a:prstGeom prst="rect">
-            <a:avLst/>
-          </a:prstGeom>
-        </p:spPr>
-      </p:pic>
-    </p:spTree>
-    <p:extLst>
-      <p:ext uri="{BB962C8B-B14F-4D97-AF65-F5344CB8AC3E}">
-        <p14:creationId xmlns:p14="http://schemas.microsoft.com/office/powerpoint/2010/main" val="4208967160"/>
-      </p:ext>
-    </p:extLst>
-  </p:cSld>
-  <p:clrMapOvr>
-    <a:masterClrMapping/>
-  </p:clrMapOvr>
-</p:sld>
-</file>
-
-<file path=ppt/slides/slide14.xml><?xml version="1.0" encoding="utf-8"?>
-<p:sld xmlns:a="http://schemas.openxmlformats.org/drawingml/2006/main" xmlns:r="http://schemas.openxmlformats.org/officeDocument/2006/relationships" xmlns:p="http://schemas.openxmlformats.org/presentationml/2006/main">
-  <p:cSld>
-    <p:spTree>
-      <p:nvGrpSpPr>
-        <p:cNvPr id="1" name=""/>
-        <p:cNvGrpSpPr/>
-        <p:nvPr/>
-      </p:nvGrpSpPr>
-      <p:grpSpPr>
-        <a:xfrm>
-          <a:off x="0" y="0"/>
-          <a:ext cx="0" cy="0"/>
-          <a:chOff x="0" y="0"/>
-          <a:chExt cx="0" cy="0"/>
-        </a:xfrm>
-      </p:grpSpPr>
-      <p:sp>
-        <p:nvSpPr>
-          <p:cNvPr id="2" name="Title 1"/>
-          <p:cNvSpPr>
-            <a:spLocks noGrp="1"/>
-          </p:cNvSpPr>
-          <p:nvPr>
-            <p:ph type="title"/>
-          </p:nvPr>
-        </p:nvSpPr>
-        <p:spPr/>
-        <p:txBody>
-          <a:bodyPr/>
-          <a:lstStyle/>
-          <a:p>
-            <a:endParaRPr lang="en-US"/>
-          </a:p>
-        </p:txBody>
-      </p:sp>
-      <p:sp>
-        <p:nvSpPr>
-          <p:cNvPr id="3" name="Content Placeholder 2"/>
-          <p:cNvSpPr>
-            <a:spLocks noGrp="1"/>
-          </p:cNvSpPr>
-          <p:nvPr>
-            <p:ph idx="1"/>
-          </p:nvPr>
-        </p:nvSpPr>
-        <p:spPr>
-          <a:xfrm>
-            <a:off x="838200" y="1825625"/>
-            <a:ext cx="3465352" cy="4351338"/>
-          </a:xfrm>
-        </p:spPr>
-        <p:txBody>
-          <a:bodyPr/>
-          <a:lstStyle/>
-          <a:p>
-            <a:endParaRPr lang="en-US" dirty="0"/>
-          </a:p>
-        </p:txBody>
-      </p:sp>
-      <p:pic>
-        <p:nvPicPr>
-          <p:cNvPr id="5" name="Picture 4"/>
-          <p:cNvPicPr>
-            <a:picLocks noChangeAspect="1"/>
-          </p:cNvPicPr>
-          <p:nvPr/>
-        </p:nvPicPr>
-        <p:blipFill>
-          <a:blip r:embed="rId2"/>
-          <a:stretch>
-            <a:fillRect/>
-          </a:stretch>
-        </p:blipFill>
-        <p:spPr>
-          <a:xfrm>
-            <a:off x="5224462" y="2552700"/>
-            <a:ext cx="1743075" cy="1752600"/>
-          </a:xfrm>
-          <a:prstGeom prst="rect">
-            <a:avLst/>
-          </a:prstGeom>
-        </p:spPr>
-      </p:pic>
-    </p:spTree>
-    <p:extLst>
-      <p:ext uri="{BB962C8B-B14F-4D97-AF65-F5344CB8AC3E}">
-        <p14:creationId xmlns:p14="http://schemas.microsoft.com/office/powerpoint/2010/main" val="112618455"/>
-      </p:ext>
-    </p:extLst>
-  </p:cSld>
-  <p:clrMapOvr>
-    <a:masterClrMapping/>
-  </p:clrMapOvr>
-</p:sld>
-</file>
-
-<file path=ppt/slides/slide15.xml><?xml version="1.0" encoding="utf-8"?>
-<p:sld xmlns:a="http://schemas.openxmlformats.org/drawingml/2006/main" xmlns:r="http://schemas.openxmlformats.org/officeDocument/2006/relationships" xmlns:p="http://schemas.openxmlformats.org/presentationml/2006/main">
-  <p:cSld>
-    <p:spTree>
-      <p:nvGrpSpPr>
-        <p:cNvPr id="1" name=""/>
-        <p:cNvGrpSpPr/>
-        <p:nvPr/>
-      </p:nvGrpSpPr>
-      <p:grpSpPr>
-        <a:xfrm>
-          <a:off x="0" y="0"/>
-          <a:ext cx="0" cy="0"/>
-          <a:chOff x="0" y="0"/>
-          <a:chExt cx="0" cy="0"/>
-        </a:xfrm>
-      </p:grpSpPr>
-      <p:sp>
-        <p:nvSpPr>
-          <p:cNvPr id="2" name="Title 1"/>
-          <p:cNvSpPr>
-            <a:spLocks noGrp="1"/>
-          </p:cNvSpPr>
-          <p:nvPr>
-            <p:ph type="title"/>
-          </p:nvPr>
-        </p:nvSpPr>
-        <p:spPr/>
-        <p:txBody>
-          <a:bodyPr/>
-          <a:lstStyle/>
-          <a:p>
-            <a:endParaRPr lang="en-US"/>
-          </a:p>
-        </p:txBody>
-      </p:sp>
-      <p:sp>
-        <p:nvSpPr>
-          <p:cNvPr id="3" name="Content Placeholder 2"/>
-          <p:cNvSpPr>
-            <a:spLocks noGrp="1"/>
-          </p:cNvSpPr>
-          <p:nvPr>
-            <p:ph idx="1"/>
-          </p:nvPr>
-        </p:nvSpPr>
-        <p:spPr>
-          <a:xfrm>
-            <a:off x="838200" y="1825625"/>
-            <a:ext cx="3389851" cy="4351338"/>
-          </a:xfrm>
-        </p:spPr>
-        <p:txBody>
-          <a:bodyPr/>
-          <a:lstStyle/>
-          <a:p>
-            <a:endParaRPr lang="en-US"/>
-          </a:p>
-        </p:txBody>
-      </p:sp>
-      <p:pic>
-        <p:nvPicPr>
-          <p:cNvPr id="4" name="Picture 3"/>
-          <p:cNvPicPr>
-            <a:picLocks noChangeAspect="1"/>
-          </p:cNvPicPr>
-          <p:nvPr/>
-        </p:nvPicPr>
-        <p:blipFill>
-          <a:blip r:embed="rId2"/>
-          <a:stretch>
-            <a:fillRect/>
-          </a:stretch>
-        </p:blipFill>
-        <p:spPr>
-          <a:xfrm>
-            <a:off x="5499519" y="1027906"/>
-            <a:ext cx="5576538" cy="5416062"/>
-          </a:xfrm>
-          <a:prstGeom prst="rect">
-            <a:avLst/>
-          </a:prstGeom>
-        </p:spPr>
-      </p:pic>
-    </p:spTree>
-    <p:extLst>
-      <p:ext uri="{BB962C8B-B14F-4D97-AF65-F5344CB8AC3E}">
-        <p14:creationId xmlns:p14="http://schemas.microsoft.com/office/powerpoint/2010/main" val="50117964"/>
-      </p:ext>
-    </p:extLst>
-  </p:cSld>
-  <p:clrMapOvr>
-    <a:masterClrMapping/>
-  </p:clrMapOvr>
-</p:sld>
-</file>
-
-<file path=ppt/slides/slide16.xml><?xml version="1.0" encoding="utf-8"?>
-<p:sld xmlns:a="http://schemas.openxmlformats.org/drawingml/2006/main" xmlns:r="http://schemas.openxmlformats.org/officeDocument/2006/relationships" xmlns:p="http://schemas.openxmlformats.org/presentationml/2006/main">
-  <p:cSld>
-    <p:spTree>
-      <p:nvGrpSpPr>
-        <p:cNvPr id="1" name=""/>
-        <p:cNvGrpSpPr/>
-        <p:nvPr/>
-      </p:nvGrpSpPr>
-      <p:grpSpPr>
-        <a:xfrm>
-          <a:off x="0" y="0"/>
-          <a:ext cx="0" cy="0"/>
-          <a:chOff x="0" y="0"/>
-          <a:chExt cx="0" cy="0"/>
-        </a:xfrm>
-      </p:grpSpPr>
-      <p:sp>
-        <p:nvSpPr>
-          <p:cNvPr id="2" name="Title 1"/>
-          <p:cNvSpPr>
-            <a:spLocks noGrp="1"/>
-          </p:cNvSpPr>
-          <p:nvPr>
-            <p:ph type="title"/>
-          </p:nvPr>
-        </p:nvSpPr>
-        <p:spPr/>
-        <p:txBody>
-          <a:bodyPr/>
-          <a:lstStyle/>
-          <a:p>
-            <a:endParaRPr lang="en-US"/>
-          </a:p>
-        </p:txBody>
-      </p:sp>
-      <p:sp>
-        <p:nvSpPr>
-          <p:cNvPr id="3" name="Content Placeholder 2"/>
-          <p:cNvSpPr>
-            <a:spLocks noGrp="1"/>
-          </p:cNvSpPr>
-          <p:nvPr>
-            <p:ph idx="1"/>
-          </p:nvPr>
-        </p:nvSpPr>
-        <p:spPr>
-          <a:xfrm>
-            <a:off x="838200" y="1825625"/>
-            <a:ext cx="3675077" cy="4351338"/>
-          </a:xfrm>
-        </p:spPr>
-        <p:txBody>
-          <a:bodyPr/>
-          <a:lstStyle/>
-          <a:p>
-            <a:endParaRPr lang="en-US" dirty="0"/>
-          </a:p>
-        </p:txBody>
-      </p:sp>
-      <p:pic>
-        <p:nvPicPr>
-          <p:cNvPr id="4" name="Picture 3"/>
-          <p:cNvPicPr>
-            <a:picLocks noChangeAspect="1"/>
-          </p:cNvPicPr>
-          <p:nvPr/>
-        </p:nvPicPr>
-        <p:blipFill>
-          <a:blip r:embed="rId2"/>
-          <a:stretch>
-            <a:fillRect/>
-          </a:stretch>
-        </p:blipFill>
-        <p:spPr>
-          <a:xfrm>
-            <a:off x="5435976" y="1303512"/>
-            <a:ext cx="5650844" cy="4873451"/>
-          </a:xfrm>
-          <a:prstGeom prst="rect">
-            <a:avLst/>
-          </a:prstGeom>
-        </p:spPr>
-      </p:pic>
-    </p:spTree>
-    <p:extLst>
-      <p:ext uri="{BB962C8B-B14F-4D97-AF65-F5344CB8AC3E}">
-        <p14:creationId xmlns:p14="http://schemas.microsoft.com/office/powerpoint/2010/main" val="74315773"/>
-      </p:ext>
-    </p:extLst>
-  </p:cSld>
-  <p:clrMapOvr>
-    <a:masterClrMapping/>
-  </p:clrMapOvr>
-</p:sld>
-</file>
-
-<file path=ppt/slides/slide17.xml><?xml version="1.0" encoding="utf-8"?>
-<p:sld xmlns:a="http://schemas.openxmlformats.org/drawingml/2006/main" xmlns:r="http://schemas.openxmlformats.org/officeDocument/2006/relationships" xmlns:p="http://schemas.openxmlformats.org/presentationml/2006/main">
-  <p:cSld>
-    <p:spTree>
-      <p:nvGrpSpPr>
-        <p:cNvPr id="1" name=""/>
-        <p:cNvGrpSpPr/>
-        <p:nvPr/>
-      </p:nvGrpSpPr>
-      <p:grpSpPr>
-        <a:xfrm>
-          <a:off x="0" y="0"/>
-          <a:ext cx="0" cy="0"/>
-          <a:chOff x="0" y="0"/>
-          <a:chExt cx="0" cy="0"/>
-        </a:xfrm>
-      </p:grpSpPr>
-      <p:sp>
-        <p:nvSpPr>
-          <p:cNvPr id="2" name="Title 1"/>
-          <p:cNvSpPr>
-            <a:spLocks noGrp="1"/>
-          </p:cNvSpPr>
-          <p:nvPr>
-            <p:ph type="title"/>
-          </p:nvPr>
-        </p:nvSpPr>
-        <p:spPr/>
-        <p:txBody>
-          <a:bodyPr/>
-          <a:lstStyle/>
-          <a:p>
-            <a:endParaRPr lang="en-US"/>
-          </a:p>
-        </p:txBody>
-      </p:sp>
-      <p:sp>
-        <p:nvSpPr>
-          <p:cNvPr id="3" name="Content Placeholder 2"/>
-          <p:cNvSpPr>
-            <a:spLocks noGrp="1"/>
-          </p:cNvSpPr>
-          <p:nvPr>
-            <p:ph idx="1"/>
-          </p:nvPr>
-        </p:nvSpPr>
-        <p:spPr>
-          <a:xfrm>
-            <a:off x="838200" y="1825625"/>
-            <a:ext cx="3415018" cy="4351338"/>
-          </a:xfrm>
-        </p:spPr>
-        <p:txBody>
-          <a:bodyPr/>
-          <a:lstStyle/>
-          <a:p>
-            <a:endParaRPr lang="en-US" dirty="0"/>
-          </a:p>
-        </p:txBody>
-      </p:sp>
-      <p:pic>
-        <p:nvPicPr>
-          <p:cNvPr id="5" name="Picture 4"/>
-          <p:cNvPicPr>
-            <a:picLocks noChangeAspect="1"/>
-          </p:cNvPicPr>
-          <p:nvPr/>
-        </p:nvPicPr>
-        <p:blipFill>
-          <a:blip r:embed="rId2"/>
-          <a:stretch>
-            <a:fillRect/>
-          </a:stretch>
-        </p:blipFill>
-        <p:spPr>
-          <a:xfrm>
-            <a:off x="5351278" y="1899139"/>
-            <a:ext cx="5015821" cy="4612193"/>
-          </a:xfrm>
-          <a:prstGeom prst="rect">
-            <a:avLst/>
-          </a:prstGeom>
-        </p:spPr>
-      </p:pic>
-    </p:spTree>
-    <p:extLst>
-      <p:ext uri="{BB962C8B-B14F-4D97-AF65-F5344CB8AC3E}">
-        <p14:creationId xmlns:p14="http://schemas.microsoft.com/office/powerpoint/2010/main" val="3011231851"/>
-      </p:ext>
-    </p:extLst>
-  </p:cSld>
-  <p:clrMapOvr>
-    <a:masterClrMapping/>
-  </p:clrMapOvr>
-</p:sld>
-</file>
-
-<file path=ppt/slides/slide18.xml><?xml version="1.0" encoding="utf-8"?>
-<p:sld xmlns:a="http://schemas.openxmlformats.org/drawingml/2006/main" xmlns:r="http://schemas.openxmlformats.org/officeDocument/2006/relationships" xmlns:p="http://schemas.openxmlformats.org/presentationml/2006/main">
-  <p:cSld>
-    <p:spTree>
-      <p:nvGrpSpPr>
-        <p:cNvPr id="1" name=""/>
-        <p:cNvGrpSpPr/>
-        <p:nvPr/>
-      </p:nvGrpSpPr>
-      <p:grpSpPr>
-        <a:xfrm>
-          <a:off x="0" y="0"/>
-          <a:ext cx="0" cy="0"/>
-          <a:chOff x="0" y="0"/>
-          <a:chExt cx="0" cy="0"/>
-        </a:xfrm>
-      </p:grpSpPr>
-      <p:sp>
-        <p:nvSpPr>
-          <p:cNvPr id="2" name="Title 1"/>
-          <p:cNvSpPr>
-            <a:spLocks noGrp="1"/>
-          </p:cNvSpPr>
-          <p:nvPr>
-            <p:ph type="title"/>
-          </p:nvPr>
-        </p:nvSpPr>
-        <p:spPr/>
-        <p:txBody>
-          <a:bodyPr/>
-          <a:lstStyle/>
-          <a:p>
-            <a:endParaRPr lang="en-US"/>
-          </a:p>
-        </p:txBody>
-      </p:sp>
-      <p:sp>
-        <p:nvSpPr>
-          <p:cNvPr id="3" name="Content Placeholder 2"/>
-          <p:cNvSpPr>
-            <a:spLocks noGrp="1"/>
-          </p:cNvSpPr>
-          <p:nvPr>
-            <p:ph idx="1"/>
-          </p:nvPr>
-        </p:nvSpPr>
-        <p:spPr>
-          <a:xfrm>
-            <a:off x="838200" y="1825625"/>
-            <a:ext cx="3113015" cy="4351338"/>
-          </a:xfrm>
-        </p:spPr>
-        <p:txBody>
-          <a:bodyPr/>
-          <a:lstStyle/>
-          <a:p>
-            <a:endParaRPr lang="en-US"/>
-          </a:p>
-        </p:txBody>
-      </p:sp>
-      <p:pic>
-        <p:nvPicPr>
-          <p:cNvPr id="4" name="Picture 3"/>
-          <p:cNvPicPr>
-            <a:picLocks noChangeAspect="1"/>
-          </p:cNvPicPr>
-          <p:nvPr/>
-        </p:nvPicPr>
-        <p:blipFill>
-          <a:blip r:embed="rId2"/>
-          <a:stretch>
-            <a:fillRect/>
-          </a:stretch>
-        </p:blipFill>
-        <p:spPr>
-          <a:xfrm>
-            <a:off x="1860201" y="2502510"/>
-            <a:ext cx="9677400" cy="3400425"/>
-          </a:xfrm>
-          <a:prstGeom prst="rect">
-            <a:avLst/>
-          </a:prstGeom>
-        </p:spPr>
-      </p:pic>
-    </p:spTree>
-    <p:extLst>
-      <p:ext uri="{BB962C8B-B14F-4D97-AF65-F5344CB8AC3E}">
-        <p14:creationId xmlns:p14="http://schemas.microsoft.com/office/powerpoint/2010/main" val="932237445"/>
-      </p:ext>
-    </p:extLst>
-  </p:cSld>
-  <p:clrMapOvr>
-    <a:masterClrMapping/>
-  </p:clrMapOvr>
-</p:sld>
-</file>
-
-<file path=ppt/slides/slide19.xml><?xml version="1.0" encoding="utf-8"?>
-<p:sld xmlns:a="http://schemas.openxmlformats.org/drawingml/2006/main" xmlns:r="http://schemas.openxmlformats.org/officeDocument/2006/relationships" xmlns:p="http://schemas.openxmlformats.org/presentationml/2006/main">
-  <p:cSld>
-    <p:spTree>
-      <p:nvGrpSpPr>
-        <p:cNvPr id="1" name=""/>
-        <p:cNvGrpSpPr/>
-        <p:nvPr/>
-      </p:nvGrpSpPr>
-      <p:grpSpPr>
-        <a:xfrm>
-          <a:off x="0" y="0"/>
-          <a:ext cx="0" cy="0"/>
-          <a:chOff x="0" y="0"/>
-          <a:chExt cx="0" cy="0"/>
-        </a:xfrm>
-      </p:grpSpPr>
-      <p:sp>
-        <p:nvSpPr>
-          <p:cNvPr id="2" name="Title 1"/>
-          <p:cNvSpPr>
-            <a:spLocks noGrp="1"/>
-          </p:cNvSpPr>
-          <p:nvPr>
-            <p:ph type="title"/>
-          </p:nvPr>
-        </p:nvSpPr>
-        <p:spPr/>
-        <p:txBody>
-          <a:bodyPr/>
-          <a:lstStyle/>
-          <a:p>
-            <a:endParaRPr lang="en-US"/>
-          </a:p>
-        </p:txBody>
-      </p:sp>
-      <p:sp>
-        <p:nvSpPr>
-          <p:cNvPr id="3" name="Content Placeholder 2"/>
-          <p:cNvSpPr>
-            <a:spLocks noGrp="1"/>
-          </p:cNvSpPr>
-          <p:nvPr>
-            <p:ph idx="1"/>
-          </p:nvPr>
-        </p:nvSpPr>
-        <p:spPr>
-          <a:xfrm>
-            <a:off x="838200" y="1825625"/>
-            <a:ext cx="2584508" cy="4351338"/>
-          </a:xfrm>
-        </p:spPr>
-        <p:txBody>
-          <a:bodyPr/>
-          <a:lstStyle/>
-          <a:p>
-            <a:endParaRPr lang="en-US" dirty="0"/>
-          </a:p>
-        </p:txBody>
-      </p:sp>
-      <p:pic>
-        <p:nvPicPr>
-          <p:cNvPr id="4" name="Picture 3"/>
-          <p:cNvPicPr>
-            <a:picLocks noChangeAspect="1"/>
-          </p:cNvPicPr>
-          <p:nvPr/>
-        </p:nvPicPr>
-        <p:blipFill>
-          <a:blip r:embed="rId2"/>
-          <a:stretch>
-            <a:fillRect/>
-          </a:stretch>
-        </p:blipFill>
-        <p:spPr>
-          <a:xfrm>
-            <a:off x="5709871" y="1283153"/>
-            <a:ext cx="4495943" cy="5037260"/>
-          </a:xfrm>
-          <a:prstGeom prst="rect">
-            <a:avLst/>
-          </a:prstGeom>
-        </p:spPr>
-      </p:pic>
-    </p:spTree>
-    <p:extLst>
-      <p:ext uri="{BB962C8B-B14F-4D97-AF65-F5344CB8AC3E}">
-        <p14:creationId xmlns:p14="http://schemas.microsoft.com/office/powerpoint/2010/main" val="169848487"/>
-      </p:ext>
-    </p:extLst>
-  </p:cSld>
-  <p:clrMapOvr>
-    <a:masterClrMapping/>
-  </p:clrMapOvr>
-</p:sld>
-</file>
-
 <file path=ppt/slides/slide2.xml><?xml version="1.0" encoding="utf-8"?>
 <p:sld xmlns:a="http://schemas.openxmlformats.org/drawingml/2006/main" xmlns:r="http://schemas.openxmlformats.org/officeDocument/2006/relationships" xmlns:p="http://schemas.openxmlformats.org/presentationml/2006/main">
   <p:cSld>
@@ -4033,1347 +3040,168 @@
           <a:p>
             <a:r>
               <a:rPr lang="en-US" dirty="0"/>
-              <a:t>Outline</a:t>
-            </a:r>
-          </a:p>
-        </p:txBody>
-      </p:sp>
-      <p:graphicFrame>
-        <p:nvGraphicFramePr>
-          <p:cNvPr id="4" name="Content Placeholder 3"/>
-          <p:cNvGraphicFramePr>
-            <a:graphicFrameLocks noGrp="1"/>
-          </p:cNvGraphicFramePr>
+              <a:t>Tasks in the Hack-a-thon	</a:t>
+            </a:r>
+          </a:p>
+        </p:txBody>
+      </p:sp>
+      <p:sp>
+        <p:nvSpPr>
+          <p:cNvPr id="3" name="Content Placeholder 2"/>
+          <p:cNvSpPr>
+            <a:spLocks noGrp="1"/>
+          </p:cNvSpPr>
           <p:nvPr>
             <p:ph idx="1"/>
-            <p:extLst>
-              <p:ext uri="{D42A27DB-BD31-4B8C-83A1-F6EECF244321}">
-                <p14:modId xmlns:p14="http://schemas.microsoft.com/office/powerpoint/2010/main" val="2080028327"/>
-              </p:ext>
-            </p:extLst>
-          </p:nvPr>
-        </p:nvGraphicFramePr>
-        <p:xfrm>
-          <a:off x="896923" y="1758513"/>
-          <a:ext cx="10515600" cy="4739640"/>
-        </p:xfrm>
-        <a:graphic>
-          <a:graphicData uri="http://schemas.openxmlformats.org/drawingml/2006/table">
-            <a:tbl>
-              <a:tblPr firstRow="1" bandRow="1">
-                <a:tableStyleId>{5C22544A-7EE6-4342-B048-85BDC9FD1C3A}</a:tableStyleId>
-              </a:tblPr>
-              <a:tblGrid>
-                <a:gridCol w="5257800">
-                  <a:extLst>
-                    <a:ext uri="{9D8B030D-6E8A-4147-A177-3AD203B41FA5}">
-                      <a16:colId xmlns:a16="http://schemas.microsoft.com/office/drawing/2014/main" val="4236770165"/>
-                    </a:ext>
-                  </a:extLst>
-                </a:gridCol>
-                <a:gridCol w="5257800">
-                  <a:extLst>
-                    <a:ext uri="{9D8B030D-6E8A-4147-A177-3AD203B41FA5}">
-                      <a16:colId xmlns:a16="http://schemas.microsoft.com/office/drawing/2014/main" val="1566452901"/>
-                    </a:ext>
-                  </a:extLst>
-                </a:gridCol>
-              </a:tblGrid>
-              <a:tr h="370840">
-                <a:tc>
-                  <a:txBody>
-                    <a:bodyPr/>
-                    <a:lstStyle/>
-                    <a:p>
-                      <a:endParaRPr lang="en-US" dirty="0"/>
-                    </a:p>
-                  </a:txBody>
-                  <a:tcPr/>
-                </a:tc>
-                <a:tc>
-                  <a:txBody>
-                    <a:bodyPr/>
-                    <a:lstStyle/>
-                    <a:p>
-                      <a:endParaRPr lang="en-US" dirty="0"/>
-                    </a:p>
-                  </a:txBody>
-                  <a:tcPr/>
-                </a:tc>
-                <a:extLst>
-                  <a:ext uri="{0D108BD9-81ED-4DB2-BD59-A6C34878D82A}">
-                    <a16:rowId xmlns:a16="http://schemas.microsoft.com/office/drawing/2014/main" val="4151070971"/>
-                  </a:ext>
-                </a:extLst>
-              </a:tr>
-              <a:tr h="185420">
-                <a:tc>
-                  <a:txBody>
-                    <a:bodyPr/>
-                    <a:lstStyle/>
-                    <a:p>
-                      <a:r>
-                        <a:rPr lang="en-US" sz="1400" dirty="0"/>
-                        <a:t>Introductions</a:t>
-                      </a:r>
-                    </a:p>
-                  </a:txBody>
-                  <a:tcPr/>
-                </a:tc>
-                <a:tc>
-                  <a:txBody>
-                    <a:bodyPr/>
-                    <a:lstStyle/>
-                    <a:p>
-                      <a:endParaRPr lang="en-US" sz="1400" dirty="0"/>
-                    </a:p>
-                  </a:txBody>
-                  <a:tcPr/>
-                </a:tc>
-                <a:extLst>
-                  <a:ext uri="{0D108BD9-81ED-4DB2-BD59-A6C34878D82A}">
-                    <a16:rowId xmlns:a16="http://schemas.microsoft.com/office/drawing/2014/main" val="136059992"/>
-                  </a:ext>
-                </a:extLst>
-              </a:tr>
-              <a:tr h="152400">
-                <a:tc>
-                  <a:txBody>
-                    <a:bodyPr/>
-                    <a:lstStyle/>
-                    <a:p>
-                      <a:r>
-                        <a:rPr lang="en-US" sz="1400" dirty="0"/>
-                        <a:t>Overview</a:t>
-                      </a:r>
-                    </a:p>
-                  </a:txBody>
-                  <a:tcPr/>
-                </a:tc>
-                <a:tc>
-                  <a:txBody>
-                    <a:bodyPr/>
-                    <a:lstStyle/>
-                    <a:p>
-                      <a:r>
-                        <a:rPr lang="en-US" sz="1400" dirty="0"/>
-                        <a:t>Walkthrough of </a:t>
-                      </a:r>
-                      <a:r>
-                        <a:rPr lang="en-US" sz="1400"/>
-                        <a:t>the goals</a:t>
-                      </a:r>
-                      <a:endParaRPr lang="en-US" sz="1400" dirty="0"/>
-                    </a:p>
-                  </a:txBody>
-                  <a:tcPr/>
-                </a:tc>
-                <a:extLst>
-                  <a:ext uri="{0D108BD9-81ED-4DB2-BD59-A6C34878D82A}">
-                    <a16:rowId xmlns:a16="http://schemas.microsoft.com/office/drawing/2014/main" val="1467534062"/>
-                  </a:ext>
-                </a:extLst>
-              </a:tr>
-              <a:tr h="152400">
-                <a:tc>
-                  <a:txBody>
-                    <a:bodyPr/>
-                    <a:lstStyle/>
-                    <a:p>
-                      <a:r>
-                        <a:rPr lang="en-US" sz="1400" dirty="0"/>
-                        <a:t>Installations</a:t>
-                      </a:r>
-                    </a:p>
-                  </a:txBody>
-                  <a:tcPr/>
-                </a:tc>
-                <a:tc>
-                  <a:txBody>
-                    <a:bodyPr/>
-                    <a:lstStyle/>
-                    <a:p>
-                      <a:r>
-                        <a:rPr lang="en-US" sz="1400" dirty="0"/>
-                        <a:t>VS.NET, </a:t>
-                      </a:r>
-                      <a:r>
-                        <a:rPr lang="en-US" sz="1400" dirty="0" err="1"/>
-                        <a:t>Powershell</a:t>
-                      </a:r>
-                      <a:r>
-                        <a:rPr lang="en-US" sz="1400" dirty="0"/>
-                        <a:t>, Service fabric SDK</a:t>
-                      </a:r>
-                    </a:p>
-                  </a:txBody>
-                  <a:tcPr/>
-                </a:tc>
-                <a:extLst>
-                  <a:ext uri="{0D108BD9-81ED-4DB2-BD59-A6C34878D82A}">
-                    <a16:rowId xmlns:a16="http://schemas.microsoft.com/office/drawing/2014/main" val="4040888646"/>
-                  </a:ext>
-                </a:extLst>
-              </a:tr>
-              <a:tr h="370840">
-                <a:tc>
-                  <a:txBody>
-                    <a:bodyPr/>
-                    <a:lstStyle/>
-                    <a:p>
-                      <a:r>
-                        <a:rPr lang="en-US" sz="1400" dirty="0"/>
-                        <a:t>Service Fabric</a:t>
-                      </a:r>
-                    </a:p>
-                  </a:txBody>
-                  <a:tcPr/>
-                </a:tc>
-                <a:tc>
-                  <a:txBody>
-                    <a:bodyPr/>
-                    <a:lstStyle/>
-                    <a:p>
-                      <a:r>
-                        <a:rPr lang="en-US" sz="1400" dirty="0"/>
-                        <a:t>Create local SF agent app in vs.net</a:t>
-                      </a:r>
-                    </a:p>
-                    <a:p>
-                      <a:r>
-                        <a:rPr lang="en-US" sz="1400" dirty="0"/>
-                        <a:t>Create local cluster</a:t>
-                      </a:r>
-                    </a:p>
-                    <a:p>
-                      <a:r>
-                        <a:rPr lang="en-US" sz="1400" dirty="0"/>
-                        <a:t>Run locally</a:t>
-                      </a:r>
-                    </a:p>
-                  </a:txBody>
-                  <a:tcPr/>
-                </a:tc>
-                <a:extLst>
-                  <a:ext uri="{0D108BD9-81ED-4DB2-BD59-A6C34878D82A}">
-                    <a16:rowId xmlns:a16="http://schemas.microsoft.com/office/drawing/2014/main" val="1574982638"/>
-                  </a:ext>
-                </a:extLst>
-              </a:tr>
-              <a:tr h="370840">
-                <a:tc>
-                  <a:txBody>
-                    <a:bodyPr/>
-                    <a:lstStyle/>
-                    <a:p>
-                      <a:pPr marL="0" marR="0" lvl="0" indent="0" algn="l" defTabSz="914400" rtl="0" eaLnBrk="1" fontAlgn="auto" latinLnBrk="0" hangingPunct="1">
-                        <a:lnSpc>
-                          <a:spcPct val="100000"/>
-                        </a:lnSpc>
-                        <a:spcBef>
-                          <a:spcPts val="0"/>
-                        </a:spcBef>
-                        <a:spcAft>
-                          <a:spcPts val="0"/>
-                        </a:spcAft>
-                        <a:buClrTx/>
-                        <a:buSzTx/>
-                        <a:buFontTx/>
-                        <a:buNone/>
-                        <a:tabLst/>
-                        <a:defRPr/>
-                      </a:pPr>
-                      <a:r>
-                        <a:rPr lang="en-US" sz="1400" dirty="0"/>
-                        <a:t>Deploy</a:t>
-                      </a:r>
-                    </a:p>
-                  </a:txBody>
-                  <a:tcPr/>
-                </a:tc>
-                <a:tc>
-                  <a:txBody>
-                    <a:bodyPr/>
-                    <a:lstStyle/>
-                    <a:p>
-                      <a:r>
-                        <a:rPr lang="en-US" sz="1400" dirty="0"/>
-                        <a:t>Deploy app to azure with portal</a:t>
-                      </a:r>
-                    </a:p>
-                  </a:txBody>
-                  <a:tcPr/>
-                </a:tc>
-                <a:extLst>
-                  <a:ext uri="{0D108BD9-81ED-4DB2-BD59-A6C34878D82A}">
-                    <a16:rowId xmlns:a16="http://schemas.microsoft.com/office/drawing/2014/main" val="1543262257"/>
-                  </a:ext>
-                </a:extLst>
-              </a:tr>
-              <a:tr h="370840">
-                <a:tc>
-                  <a:txBody>
-                    <a:bodyPr/>
-                    <a:lstStyle/>
-                    <a:p>
-                      <a:pPr marL="0" marR="0" lvl="0" indent="0" algn="l" defTabSz="914400" rtl="0" eaLnBrk="1" fontAlgn="auto" latinLnBrk="0" hangingPunct="1">
-                        <a:lnSpc>
-                          <a:spcPct val="100000"/>
-                        </a:lnSpc>
-                        <a:spcBef>
-                          <a:spcPts val="0"/>
-                        </a:spcBef>
-                        <a:spcAft>
-                          <a:spcPts val="0"/>
-                        </a:spcAft>
-                        <a:buClrTx/>
-                        <a:buSzTx/>
-                        <a:buFontTx/>
-                        <a:buNone/>
-                        <a:tabLst/>
-                        <a:defRPr/>
-                      </a:pPr>
-                      <a:r>
-                        <a:rPr lang="en-US" sz="1400" dirty="0"/>
-                        <a:t>CI</a:t>
-                      </a:r>
-                    </a:p>
-                  </a:txBody>
-                  <a:tcPr/>
-                </a:tc>
-                <a:tc>
-                  <a:txBody>
-                    <a:bodyPr/>
-                    <a:lstStyle/>
-                    <a:p>
-                      <a:r>
-                        <a:rPr lang="en-US" sz="1400" dirty="0"/>
-                        <a:t>Create TS project</a:t>
-                      </a:r>
-                    </a:p>
-                    <a:p>
-                      <a:r>
-                        <a:rPr lang="en-US" sz="1400" dirty="0"/>
-                        <a:t>Add code to TS</a:t>
-                      </a:r>
-                    </a:p>
-                    <a:p>
-                      <a:r>
-                        <a:rPr lang="en-US" sz="1400" dirty="0"/>
-                        <a:t>Configure automatic build</a:t>
-                      </a:r>
-                    </a:p>
-                  </a:txBody>
-                  <a:tcPr/>
-                </a:tc>
-                <a:extLst>
-                  <a:ext uri="{0D108BD9-81ED-4DB2-BD59-A6C34878D82A}">
-                    <a16:rowId xmlns:a16="http://schemas.microsoft.com/office/drawing/2014/main" val="625708750"/>
-                  </a:ext>
-                </a:extLst>
-              </a:tr>
-              <a:tr h="370840">
-                <a:tc>
-                  <a:txBody>
-                    <a:bodyPr/>
-                    <a:lstStyle/>
-                    <a:p>
-                      <a:r>
-                        <a:rPr lang="en-US" sz="1400" dirty="0"/>
-                        <a:t>Azure config – build with portal</a:t>
-                      </a:r>
-                    </a:p>
-                  </a:txBody>
-                  <a:tcPr/>
-                </a:tc>
-                <a:tc>
-                  <a:txBody>
-                    <a:bodyPr/>
-                    <a:lstStyle/>
-                    <a:p>
-                      <a:r>
-                        <a:rPr lang="en-US" sz="1400" dirty="0"/>
-                        <a:t>Resource groups</a:t>
-                      </a:r>
-                    </a:p>
-                    <a:p>
-                      <a:r>
-                        <a:rPr lang="en-US" sz="1400" dirty="0"/>
-                        <a:t>Key vault</a:t>
-                      </a:r>
-                    </a:p>
-                    <a:p>
-                      <a:r>
-                        <a:rPr lang="en-US" sz="1400" dirty="0"/>
-                        <a:t>AD</a:t>
-                      </a:r>
-                    </a:p>
-                  </a:txBody>
-                  <a:tcPr/>
-                </a:tc>
-                <a:extLst>
-                  <a:ext uri="{0D108BD9-81ED-4DB2-BD59-A6C34878D82A}">
-                    <a16:rowId xmlns:a16="http://schemas.microsoft.com/office/drawing/2014/main" val="4137220368"/>
-                  </a:ext>
-                </a:extLst>
-              </a:tr>
-              <a:tr h="370840">
-                <a:tc>
-                  <a:txBody>
-                    <a:bodyPr/>
-                    <a:lstStyle/>
-                    <a:p>
-                      <a:pPr marL="0" marR="0" lvl="0" indent="0" algn="l" defTabSz="914400" rtl="0" eaLnBrk="1" fontAlgn="auto" latinLnBrk="0" hangingPunct="1">
-                        <a:lnSpc>
-                          <a:spcPct val="100000"/>
-                        </a:lnSpc>
-                        <a:spcBef>
-                          <a:spcPts val="0"/>
-                        </a:spcBef>
-                        <a:spcAft>
-                          <a:spcPts val="0"/>
-                        </a:spcAft>
-                        <a:buClrTx/>
-                        <a:buSzTx/>
-                        <a:buFontTx/>
-                        <a:buNone/>
-                        <a:tabLst/>
-                        <a:defRPr/>
-                      </a:pPr>
-                      <a:r>
-                        <a:rPr lang="en-US" sz="1400" dirty="0"/>
-                        <a:t>CD</a:t>
-                      </a:r>
-                    </a:p>
-                  </a:txBody>
-                  <a:tcPr/>
-                </a:tc>
-                <a:tc>
-                  <a:txBody>
-                    <a:bodyPr/>
-                    <a:lstStyle/>
-                    <a:p>
-                      <a:r>
-                        <a:rPr lang="en-US" sz="1400" dirty="0"/>
-                        <a:t>Create deploy task</a:t>
-                      </a:r>
-                    </a:p>
-                    <a:p>
-                      <a:r>
-                        <a:rPr lang="en-US" sz="1400" dirty="0"/>
-                        <a:t>Update and auto deploy</a:t>
-                      </a:r>
-                    </a:p>
-                  </a:txBody>
-                  <a:tcPr/>
-                </a:tc>
-                <a:extLst>
-                  <a:ext uri="{0D108BD9-81ED-4DB2-BD59-A6C34878D82A}">
-                    <a16:rowId xmlns:a16="http://schemas.microsoft.com/office/drawing/2014/main" val="1337902631"/>
-                  </a:ext>
-                </a:extLst>
-              </a:tr>
-              <a:tr h="370840">
-                <a:tc>
-                  <a:txBody>
-                    <a:bodyPr/>
-                    <a:lstStyle/>
-                    <a:p>
-                      <a:pPr marL="0" marR="0" lvl="0" indent="0" algn="l" defTabSz="914400" rtl="0" eaLnBrk="1" fontAlgn="auto" latinLnBrk="0" hangingPunct="1">
-                        <a:lnSpc>
-                          <a:spcPct val="100000"/>
-                        </a:lnSpc>
-                        <a:spcBef>
-                          <a:spcPts val="0"/>
-                        </a:spcBef>
-                        <a:spcAft>
-                          <a:spcPts val="0"/>
-                        </a:spcAft>
-                        <a:buClrTx/>
-                        <a:buSzTx/>
-                        <a:buFontTx/>
-                        <a:buNone/>
-                        <a:tabLst/>
-                        <a:defRPr/>
-                      </a:pPr>
-                      <a:r>
-                        <a:rPr lang="en-US" sz="1400" dirty="0"/>
-                        <a:t>Automate</a:t>
-                      </a:r>
-                    </a:p>
-                  </a:txBody>
-                  <a:tcPr/>
-                </a:tc>
-                <a:tc>
-                  <a:txBody>
-                    <a:bodyPr/>
-                    <a:lstStyle/>
-                    <a:p>
-                      <a:r>
-                        <a:rPr lang="en-US" sz="1400" dirty="0"/>
-                        <a:t>Create cluster with PS / ARM</a:t>
-                      </a:r>
-                    </a:p>
-                  </a:txBody>
-                  <a:tcPr/>
-                </a:tc>
-                <a:extLst>
-                  <a:ext uri="{0D108BD9-81ED-4DB2-BD59-A6C34878D82A}">
-                    <a16:rowId xmlns:a16="http://schemas.microsoft.com/office/drawing/2014/main" val="1059010081"/>
-                  </a:ext>
-                </a:extLst>
-              </a:tr>
-            </a:tbl>
-          </a:graphicData>
-        </a:graphic>
-      </p:graphicFrame>
+          </p:nvPr>
+        </p:nvSpPr>
+        <p:spPr/>
+        <p:txBody>
+          <a:bodyPr>
+            <a:normAutofit fontScale="55000" lnSpcReduction="20000"/>
+          </a:bodyPr>
+          <a:lstStyle/>
+          <a:p>
+            <a:pPr lvl="0"/>
+            <a:r>
+              <a:rPr lang="en-US" dirty="0"/>
+              <a:t>Tools installation (vs.net, </a:t>
+            </a:r>
+            <a:r>
+              <a:rPr lang="en-US" dirty="0" err="1"/>
+              <a:t>powershell</a:t>
+            </a:r>
+            <a:r>
+              <a:rPr lang="en-US" dirty="0"/>
+              <a:t>, …)</a:t>
+            </a:r>
+          </a:p>
+          <a:p>
+            <a:pPr lvl="0"/>
+            <a:r>
+              <a:rPr lang="en-US" dirty="0"/>
+              <a:t>Overview of the portal for service fabric</a:t>
+            </a:r>
+          </a:p>
+          <a:p>
+            <a:pPr lvl="0"/>
+            <a:r>
+              <a:rPr lang="en-US" dirty="0"/>
+              <a:t>Create cluster with portal</a:t>
+            </a:r>
+          </a:p>
+          <a:p>
+            <a:pPr lvl="0"/>
+            <a:r>
+              <a:rPr lang="en-US" dirty="0"/>
+              <a:t>Create a service fabric app in vs.net</a:t>
+            </a:r>
+          </a:p>
+          <a:p>
+            <a:pPr lvl="0"/>
+            <a:r>
+              <a:rPr lang="en-US" dirty="0"/>
+              <a:t>Deploy to cluster with vs.net</a:t>
+            </a:r>
+          </a:p>
+          <a:p>
+            <a:pPr lvl="0"/>
+            <a:r>
+              <a:rPr lang="en-US" dirty="0"/>
+              <a:t>Create </a:t>
+            </a:r>
+            <a:r>
+              <a:rPr lang="en-US" dirty="0" err="1"/>
+              <a:t>github</a:t>
+            </a:r>
+            <a:r>
+              <a:rPr lang="en-US" dirty="0"/>
+              <a:t> repository and check in code</a:t>
+            </a:r>
+          </a:p>
+          <a:p>
+            <a:pPr lvl="0"/>
+            <a:r>
+              <a:rPr lang="en-US" dirty="0"/>
+              <a:t>Create visual studio online account</a:t>
+            </a:r>
+          </a:p>
+          <a:p>
+            <a:pPr lvl="0"/>
+            <a:r>
+              <a:rPr lang="en-US" dirty="0"/>
+              <a:t>Create build definition</a:t>
+            </a:r>
+          </a:p>
+          <a:p>
+            <a:pPr lvl="0"/>
+            <a:r>
+              <a:rPr lang="en-US" dirty="0"/>
+              <a:t>Build in visual studio online </a:t>
+            </a:r>
+          </a:p>
+          <a:p>
+            <a:pPr lvl="0"/>
+            <a:r>
+              <a:rPr lang="en-US" dirty="0"/>
+              <a:t>Create release definition</a:t>
+            </a:r>
+          </a:p>
+          <a:p>
+            <a:pPr lvl="0"/>
+            <a:r>
+              <a:rPr lang="en-US" dirty="0"/>
+              <a:t>Release from visual studio online a software update</a:t>
+            </a:r>
+          </a:p>
+          <a:p>
+            <a:pPr lvl="0"/>
+            <a:r>
+              <a:rPr lang="en-US" dirty="0"/>
+              <a:t>Securing access to a cluster</a:t>
+            </a:r>
+          </a:p>
+          <a:p>
+            <a:pPr lvl="0"/>
+            <a:r>
+              <a:rPr lang="en-US" dirty="0"/>
+              <a:t>Create a certificates and a key vault with </a:t>
+            </a:r>
+            <a:r>
+              <a:rPr lang="en-US" dirty="0" err="1"/>
+              <a:t>powershell</a:t>
+            </a:r>
+            <a:endParaRPr lang="en-US" dirty="0"/>
+          </a:p>
+          <a:p>
+            <a:pPr lvl="0"/>
+            <a:r>
+              <a:rPr lang="en-US" dirty="0"/>
+              <a:t>Create a cluster with </a:t>
+            </a:r>
+            <a:r>
+              <a:rPr lang="en-US" dirty="0" err="1"/>
+              <a:t>powershell</a:t>
+            </a:r>
+            <a:endParaRPr lang="en-US" dirty="0"/>
+          </a:p>
+          <a:p>
+            <a:r>
+              <a:rPr lang="en-US" dirty="0"/>
+              <a:t>Deploy to cluster with </a:t>
+            </a:r>
+            <a:r>
+              <a:rPr lang="en-US" dirty="0" err="1"/>
+              <a:t>powershell</a:t>
+            </a:r>
+            <a:endParaRPr lang="en-US" dirty="0"/>
+          </a:p>
+        </p:txBody>
+      </p:sp>
     </p:spTree>
     <p:extLst>
       <p:ext uri="{BB962C8B-B14F-4D97-AF65-F5344CB8AC3E}">
-        <p14:creationId xmlns:p14="http://schemas.microsoft.com/office/powerpoint/2010/main" val="3195207331"/>
-      </p:ext>
-    </p:extLst>
-  </p:cSld>
-  <p:clrMapOvr>
-    <a:masterClrMapping/>
-  </p:clrMapOvr>
-</p:sld>
-</file>
-
-<file path=ppt/slides/slide20.xml><?xml version="1.0" encoding="utf-8"?>
-<p:sld xmlns:a="http://schemas.openxmlformats.org/drawingml/2006/main" xmlns:r="http://schemas.openxmlformats.org/officeDocument/2006/relationships" xmlns:p="http://schemas.openxmlformats.org/presentationml/2006/main">
-  <p:cSld>
-    <p:spTree>
-      <p:nvGrpSpPr>
-        <p:cNvPr id="1" name=""/>
-        <p:cNvGrpSpPr/>
-        <p:nvPr/>
-      </p:nvGrpSpPr>
-      <p:grpSpPr>
-        <a:xfrm>
-          <a:off x="0" y="0"/>
-          <a:ext cx="0" cy="0"/>
-          <a:chOff x="0" y="0"/>
-          <a:chExt cx="0" cy="0"/>
-        </a:xfrm>
-      </p:grpSpPr>
-      <p:sp>
-        <p:nvSpPr>
-          <p:cNvPr id="2" name="Title 1"/>
-          <p:cNvSpPr>
-            <a:spLocks noGrp="1"/>
-          </p:cNvSpPr>
-          <p:nvPr>
-            <p:ph type="title"/>
-          </p:nvPr>
-        </p:nvSpPr>
-        <p:spPr/>
-        <p:txBody>
-          <a:bodyPr/>
-          <a:lstStyle/>
-          <a:p>
-            <a:endParaRPr lang="en-US"/>
-          </a:p>
-        </p:txBody>
-      </p:sp>
-      <p:sp>
-        <p:nvSpPr>
-          <p:cNvPr id="3" name="Content Placeholder 2"/>
-          <p:cNvSpPr>
-            <a:spLocks noGrp="1"/>
-          </p:cNvSpPr>
-          <p:nvPr>
-            <p:ph idx="1"/>
-          </p:nvPr>
-        </p:nvSpPr>
-        <p:spPr>
-          <a:xfrm>
-            <a:off x="838200" y="1825625"/>
-            <a:ext cx="3607966" cy="4351338"/>
-          </a:xfrm>
-        </p:spPr>
-        <p:txBody>
-          <a:bodyPr/>
-          <a:lstStyle/>
-          <a:p>
-            <a:endParaRPr lang="en-US" dirty="0"/>
-          </a:p>
-        </p:txBody>
-      </p:sp>
-      <p:pic>
-        <p:nvPicPr>
-          <p:cNvPr id="4" name="Picture 3"/>
-          <p:cNvPicPr>
-            <a:picLocks noChangeAspect="1"/>
-          </p:cNvPicPr>
-          <p:nvPr/>
-        </p:nvPicPr>
-        <p:blipFill>
-          <a:blip r:embed="rId2"/>
-          <a:stretch>
-            <a:fillRect/>
-          </a:stretch>
-        </p:blipFill>
-        <p:spPr>
-          <a:xfrm>
-            <a:off x="5670201" y="1288511"/>
-            <a:ext cx="4880568" cy="5425565"/>
-          </a:xfrm>
-          <a:prstGeom prst="rect">
-            <a:avLst/>
-          </a:prstGeom>
-        </p:spPr>
-      </p:pic>
-    </p:spTree>
-    <p:extLst>
-      <p:ext uri="{BB962C8B-B14F-4D97-AF65-F5344CB8AC3E}">
-        <p14:creationId xmlns:p14="http://schemas.microsoft.com/office/powerpoint/2010/main" val="843739479"/>
-      </p:ext>
-    </p:extLst>
-  </p:cSld>
-  <p:clrMapOvr>
-    <a:masterClrMapping/>
-  </p:clrMapOvr>
-</p:sld>
-</file>
-
-<file path=ppt/slides/slide21.xml><?xml version="1.0" encoding="utf-8"?>
-<p:sld xmlns:a="http://schemas.openxmlformats.org/drawingml/2006/main" xmlns:r="http://schemas.openxmlformats.org/officeDocument/2006/relationships" xmlns:p="http://schemas.openxmlformats.org/presentationml/2006/main">
-  <p:cSld>
-    <p:spTree>
-      <p:nvGrpSpPr>
-        <p:cNvPr id="1" name=""/>
-        <p:cNvGrpSpPr/>
-        <p:nvPr/>
-      </p:nvGrpSpPr>
-      <p:grpSpPr>
-        <a:xfrm>
-          <a:off x="0" y="0"/>
-          <a:ext cx="0" cy="0"/>
-          <a:chOff x="0" y="0"/>
-          <a:chExt cx="0" cy="0"/>
-        </a:xfrm>
-      </p:grpSpPr>
-      <p:sp>
-        <p:nvSpPr>
-          <p:cNvPr id="2" name="Title 1"/>
-          <p:cNvSpPr>
-            <a:spLocks noGrp="1"/>
-          </p:cNvSpPr>
-          <p:nvPr>
-            <p:ph type="title"/>
-          </p:nvPr>
-        </p:nvSpPr>
-        <p:spPr/>
-        <p:txBody>
-          <a:bodyPr/>
-          <a:lstStyle/>
-          <a:p>
-            <a:endParaRPr lang="en-US"/>
-          </a:p>
-        </p:txBody>
-      </p:sp>
-      <p:sp>
-        <p:nvSpPr>
-          <p:cNvPr id="3" name="Content Placeholder 2"/>
-          <p:cNvSpPr>
-            <a:spLocks noGrp="1"/>
-          </p:cNvSpPr>
-          <p:nvPr>
-            <p:ph idx="1"/>
-          </p:nvPr>
-        </p:nvSpPr>
-        <p:spPr>
-          <a:xfrm>
-            <a:off x="838200" y="1825625"/>
-            <a:ext cx="3993859" cy="4351338"/>
-          </a:xfrm>
-        </p:spPr>
-        <p:txBody>
-          <a:bodyPr/>
-          <a:lstStyle/>
-          <a:p>
-            <a:endParaRPr lang="en-US"/>
-          </a:p>
-        </p:txBody>
-      </p:sp>
-      <p:pic>
-        <p:nvPicPr>
-          <p:cNvPr id="4" name="Picture 3"/>
-          <p:cNvPicPr>
-            <a:picLocks noChangeAspect="1"/>
-          </p:cNvPicPr>
-          <p:nvPr/>
-        </p:nvPicPr>
-        <p:blipFill>
-          <a:blip r:embed="rId2"/>
-          <a:stretch>
-            <a:fillRect/>
-          </a:stretch>
-        </p:blipFill>
-        <p:spPr>
-          <a:xfrm>
-            <a:off x="3238500" y="252412"/>
-            <a:ext cx="5715000" cy="6353175"/>
-          </a:xfrm>
-          <a:prstGeom prst="rect">
-            <a:avLst/>
-          </a:prstGeom>
-        </p:spPr>
-      </p:pic>
-    </p:spTree>
-    <p:extLst>
-      <p:ext uri="{BB962C8B-B14F-4D97-AF65-F5344CB8AC3E}">
-        <p14:creationId xmlns:p14="http://schemas.microsoft.com/office/powerpoint/2010/main" val="268891948"/>
-      </p:ext>
-    </p:extLst>
-  </p:cSld>
-  <p:clrMapOvr>
-    <a:masterClrMapping/>
-  </p:clrMapOvr>
-</p:sld>
-</file>
-
-<file path=ppt/slides/slide22.xml><?xml version="1.0" encoding="utf-8"?>
-<p:sld xmlns:a="http://schemas.openxmlformats.org/drawingml/2006/main" xmlns:r="http://schemas.openxmlformats.org/officeDocument/2006/relationships" xmlns:p="http://schemas.openxmlformats.org/presentationml/2006/main">
-  <p:cSld>
-    <p:spTree>
-      <p:nvGrpSpPr>
-        <p:cNvPr id="1" name=""/>
-        <p:cNvGrpSpPr/>
-        <p:nvPr/>
-      </p:nvGrpSpPr>
-      <p:grpSpPr>
-        <a:xfrm>
-          <a:off x="0" y="0"/>
-          <a:ext cx="0" cy="0"/>
-          <a:chOff x="0" y="0"/>
-          <a:chExt cx="0" cy="0"/>
-        </a:xfrm>
-      </p:grpSpPr>
-      <p:sp>
-        <p:nvSpPr>
-          <p:cNvPr id="2" name="Title 1"/>
-          <p:cNvSpPr>
-            <a:spLocks noGrp="1"/>
-          </p:cNvSpPr>
-          <p:nvPr>
-            <p:ph type="title"/>
-          </p:nvPr>
-        </p:nvSpPr>
-        <p:spPr/>
-        <p:txBody>
-          <a:bodyPr/>
-          <a:lstStyle/>
-          <a:p>
-            <a:endParaRPr lang="en-US"/>
-          </a:p>
-        </p:txBody>
-      </p:sp>
-      <p:sp>
-        <p:nvSpPr>
-          <p:cNvPr id="3" name="Content Placeholder 2"/>
-          <p:cNvSpPr>
-            <a:spLocks noGrp="1"/>
-          </p:cNvSpPr>
-          <p:nvPr>
-            <p:ph idx="1"/>
-          </p:nvPr>
-        </p:nvSpPr>
-        <p:spPr>
-          <a:xfrm>
-            <a:off x="838200" y="1825625"/>
-            <a:ext cx="4069360" cy="4351338"/>
-          </a:xfrm>
-        </p:spPr>
-        <p:txBody>
-          <a:bodyPr/>
-          <a:lstStyle/>
-          <a:p>
-            <a:endParaRPr lang="en-US" dirty="0"/>
-          </a:p>
-        </p:txBody>
-      </p:sp>
-      <p:pic>
-        <p:nvPicPr>
-          <p:cNvPr id="4" name="Picture 3"/>
-          <p:cNvPicPr>
-            <a:picLocks noChangeAspect="1"/>
-          </p:cNvPicPr>
-          <p:nvPr/>
-        </p:nvPicPr>
-        <p:blipFill>
-          <a:blip r:embed="rId2"/>
-          <a:stretch>
-            <a:fillRect/>
-          </a:stretch>
-        </p:blipFill>
-        <p:spPr>
-          <a:xfrm>
-            <a:off x="1871296" y="1690688"/>
-            <a:ext cx="9715500" cy="4676775"/>
-          </a:xfrm>
-          <a:prstGeom prst="rect">
-            <a:avLst/>
-          </a:prstGeom>
-        </p:spPr>
-      </p:pic>
-    </p:spTree>
-    <p:extLst>
-      <p:ext uri="{BB962C8B-B14F-4D97-AF65-F5344CB8AC3E}">
-        <p14:creationId xmlns:p14="http://schemas.microsoft.com/office/powerpoint/2010/main" val="1606493875"/>
-      </p:ext>
-    </p:extLst>
-  </p:cSld>
-  <p:clrMapOvr>
-    <a:masterClrMapping/>
-  </p:clrMapOvr>
-</p:sld>
-</file>
-
-<file path=ppt/slides/slide23.xml><?xml version="1.0" encoding="utf-8"?>
-<p:sld xmlns:a="http://schemas.openxmlformats.org/drawingml/2006/main" xmlns:r="http://schemas.openxmlformats.org/officeDocument/2006/relationships" xmlns:p="http://schemas.openxmlformats.org/presentationml/2006/main">
-  <p:cSld>
-    <p:spTree>
-      <p:nvGrpSpPr>
-        <p:cNvPr id="1" name=""/>
-        <p:cNvGrpSpPr/>
-        <p:nvPr/>
-      </p:nvGrpSpPr>
-      <p:grpSpPr>
-        <a:xfrm>
-          <a:off x="0" y="0"/>
-          <a:ext cx="0" cy="0"/>
-          <a:chOff x="0" y="0"/>
-          <a:chExt cx="0" cy="0"/>
-        </a:xfrm>
-      </p:grpSpPr>
-      <p:sp>
-        <p:nvSpPr>
-          <p:cNvPr id="2" name="Title 1"/>
-          <p:cNvSpPr>
-            <a:spLocks noGrp="1"/>
-          </p:cNvSpPr>
-          <p:nvPr>
-            <p:ph type="title"/>
-          </p:nvPr>
-        </p:nvSpPr>
-        <p:spPr/>
-        <p:txBody>
-          <a:bodyPr/>
-          <a:lstStyle/>
-          <a:p>
-            <a:endParaRPr lang="en-US"/>
-          </a:p>
-        </p:txBody>
-      </p:sp>
-      <p:sp>
-        <p:nvSpPr>
-          <p:cNvPr id="3" name="Content Placeholder 2"/>
-          <p:cNvSpPr>
-            <a:spLocks noGrp="1"/>
-          </p:cNvSpPr>
-          <p:nvPr>
-            <p:ph idx="1"/>
-          </p:nvPr>
-        </p:nvSpPr>
-        <p:spPr/>
-        <p:txBody>
-          <a:bodyPr/>
-          <a:lstStyle/>
-          <a:p>
-            <a:endParaRPr lang="en-US"/>
-          </a:p>
-        </p:txBody>
-      </p:sp>
-      <p:pic>
-        <p:nvPicPr>
-          <p:cNvPr id="4" name="Picture 3"/>
-          <p:cNvPicPr>
-            <a:picLocks noChangeAspect="1"/>
-          </p:cNvPicPr>
-          <p:nvPr/>
-        </p:nvPicPr>
-        <p:blipFill>
-          <a:blip r:embed="rId2"/>
-          <a:stretch>
-            <a:fillRect/>
-          </a:stretch>
-        </p:blipFill>
-        <p:spPr>
-          <a:xfrm>
-            <a:off x="1238250" y="2152650"/>
-            <a:ext cx="9715500" cy="2552700"/>
-          </a:xfrm>
-          <a:prstGeom prst="rect">
-            <a:avLst/>
-          </a:prstGeom>
-        </p:spPr>
-      </p:pic>
-    </p:spTree>
-    <p:extLst>
-      <p:ext uri="{BB962C8B-B14F-4D97-AF65-F5344CB8AC3E}">
-        <p14:creationId xmlns:p14="http://schemas.microsoft.com/office/powerpoint/2010/main" val="2685838392"/>
-      </p:ext>
-    </p:extLst>
-  </p:cSld>
-  <p:clrMapOvr>
-    <a:masterClrMapping/>
-  </p:clrMapOvr>
-</p:sld>
-</file>
-
-<file path=ppt/slides/slide24.xml><?xml version="1.0" encoding="utf-8"?>
-<p:sld xmlns:a="http://schemas.openxmlformats.org/drawingml/2006/main" xmlns:r="http://schemas.openxmlformats.org/officeDocument/2006/relationships" xmlns:p="http://schemas.openxmlformats.org/presentationml/2006/main">
-  <p:cSld>
-    <p:spTree>
-      <p:nvGrpSpPr>
-        <p:cNvPr id="1" name=""/>
-        <p:cNvGrpSpPr/>
-        <p:nvPr/>
-      </p:nvGrpSpPr>
-      <p:grpSpPr>
-        <a:xfrm>
-          <a:off x="0" y="0"/>
-          <a:ext cx="0" cy="0"/>
-          <a:chOff x="0" y="0"/>
-          <a:chExt cx="0" cy="0"/>
-        </a:xfrm>
-      </p:grpSpPr>
-      <p:sp>
-        <p:nvSpPr>
-          <p:cNvPr id="2" name="Title 1"/>
-          <p:cNvSpPr>
-            <a:spLocks noGrp="1"/>
-          </p:cNvSpPr>
-          <p:nvPr>
-            <p:ph type="title"/>
-          </p:nvPr>
-        </p:nvSpPr>
-        <p:spPr/>
-        <p:txBody>
-          <a:bodyPr/>
-          <a:lstStyle/>
-          <a:p>
-            <a:endParaRPr lang="en-US"/>
-          </a:p>
-        </p:txBody>
-      </p:sp>
-      <p:sp>
-        <p:nvSpPr>
-          <p:cNvPr id="3" name="Content Placeholder 2"/>
-          <p:cNvSpPr>
-            <a:spLocks noGrp="1"/>
-          </p:cNvSpPr>
-          <p:nvPr>
-            <p:ph idx="1"/>
-          </p:nvPr>
-        </p:nvSpPr>
-        <p:spPr/>
-        <p:txBody>
-          <a:bodyPr/>
-          <a:lstStyle/>
-          <a:p>
-            <a:endParaRPr lang="en-US" dirty="0"/>
-          </a:p>
-        </p:txBody>
-      </p:sp>
-      <p:pic>
-        <p:nvPicPr>
-          <p:cNvPr id="5" name="Picture 4"/>
-          <p:cNvPicPr>
-            <a:picLocks noChangeAspect="1"/>
-          </p:cNvPicPr>
-          <p:nvPr/>
-        </p:nvPicPr>
-        <p:blipFill>
-          <a:blip r:embed="rId2"/>
-          <a:stretch>
-            <a:fillRect/>
-          </a:stretch>
-        </p:blipFill>
-        <p:spPr>
-          <a:xfrm>
-            <a:off x="3252787" y="1738312"/>
-            <a:ext cx="5686425" cy="3381375"/>
-          </a:xfrm>
-          <a:prstGeom prst="rect">
-            <a:avLst/>
-          </a:prstGeom>
-        </p:spPr>
-      </p:pic>
-    </p:spTree>
-    <p:extLst>
-      <p:ext uri="{BB962C8B-B14F-4D97-AF65-F5344CB8AC3E}">
-        <p14:creationId xmlns:p14="http://schemas.microsoft.com/office/powerpoint/2010/main" val="928821187"/>
-      </p:ext>
-    </p:extLst>
-  </p:cSld>
-  <p:clrMapOvr>
-    <a:masterClrMapping/>
-  </p:clrMapOvr>
-</p:sld>
-</file>
-
-<file path=ppt/slides/slide25.xml><?xml version="1.0" encoding="utf-8"?>
-<p:sld xmlns:a="http://schemas.openxmlformats.org/drawingml/2006/main" xmlns:r="http://schemas.openxmlformats.org/officeDocument/2006/relationships" xmlns:p="http://schemas.openxmlformats.org/presentationml/2006/main">
-  <p:cSld>
-    <p:spTree>
-      <p:nvGrpSpPr>
-        <p:cNvPr id="1" name=""/>
-        <p:cNvGrpSpPr/>
-        <p:nvPr/>
-      </p:nvGrpSpPr>
-      <p:grpSpPr>
-        <a:xfrm>
-          <a:off x="0" y="0"/>
-          <a:ext cx="0" cy="0"/>
-          <a:chOff x="0" y="0"/>
-          <a:chExt cx="0" cy="0"/>
-        </a:xfrm>
-      </p:grpSpPr>
-      <p:sp>
-        <p:nvSpPr>
-          <p:cNvPr id="2" name="Title 1"/>
-          <p:cNvSpPr>
-            <a:spLocks noGrp="1"/>
-          </p:cNvSpPr>
-          <p:nvPr>
-            <p:ph type="title"/>
-          </p:nvPr>
-        </p:nvSpPr>
-        <p:spPr/>
-        <p:txBody>
-          <a:bodyPr/>
-          <a:lstStyle/>
-          <a:p>
-            <a:endParaRPr lang="en-US"/>
-          </a:p>
-        </p:txBody>
-      </p:sp>
-      <p:sp>
-        <p:nvSpPr>
-          <p:cNvPr id="3" name="Content Placeholder 2"/>
-          <p:cNvSpPr>
-            <a:spLocks noGrp="1"/>
-          </p:cNvSpPr>
-          <p:nvPr>
-            <p:ph idx="1"/>
-          </p:nvPr>
-        </p:nvSpPr>
-        <p:spPr/>
-        <p:txBody>
-          <a:bodyPr/>
-          <a:lstStyle/>
-          <a:p>
-            <a:endParaRPr lang="en-US"/>
-          </a:p>
-        </p:txBody>
-      </p:sp>
-      <p:pic>
-        <p:nvPicPr>
-          <p:cNvPr id="5" name="Picture 4"/>
-          <p:cNvPicPr>
-            <a:picLocks noChangeAspect="1"/>
-          </p:cNvPicPr>
-          <p:nvPr/>
-        </p:nvPicPr>
-        <p:blipFill>
-          <a:blip r:embed="rId2"/>
-          <a:stretch>
-            <a:fillRect/>
-          </a:stretch>
-        </p:blipFill>
-        <p:spPr>
-          <a:xfrm>
-            <a:off x="1524000" y="447675"/>
-            <a:ext cx="9144000" cy="5962650"/>
-          </a:xfrm>
-          <a:prstGeom prst="rect">
-            <a:avLst/>
-          </a:prstGeom>
-        </p:spPr>
-      </p:pic>
-    </p:spTree>
-    <p:extLst>
-      <p:ext uri="{BB962C8B-B14F-4D97-AF65-F5344CB8AC3E}">
-        <p14:creationId xmlns:p14="http://schemas.microsoft.com/office/powerpoint/2010/main" val="3531727076"/>
-      </p:ext>
-    </p:extLst>
-  </p:cSld>
-  <p:clrMapOvr>
-    <a:masterClrMapping/>
-  </p:clrMapOvr>
-</p:sld>
-</file>
-
-<file path=ppt/slides/slide26.xml><?xml version="1.0" encoding="utf-8"?>
-<p:sld xmlns:a="http://schemas.openxmlformats.org/drawingml/2006/main" xmlns:r="http://schemas.openxmlformats.org/officeDocument/2006/relationships" xmlns:p="http://schemas.openxmlformats.org/presentationml/2006/main">
-  <p:cSld>
-    <p:spTree>
-      <p:nvGrpSpPr>
-        <p:cNvPr id="1" name=""/>
-        <p:cNvGrpSpPr/>
-        <p:nvPr/>
-      </p:nvGrpSpPr>
-      <p:grpSpPr>
-        <a:xfrm>
-          <a:off x="0" y="0"/>
-          <a:ext cx="0" cy="0"/>
-          <a:chOff x="0" y="0"/>
-          <a:chExt cx="0" cy="0"/>
-        </a:xfrm>
-      </p:grpSpPr>
-      <p:sp>
-        <p:nvSpPr>
-          <p:cNvPr id="2" name="Title 1"/>
-          <p:cNvSpPr>
-            <a:spLocks noGrp="1"/>
-          </p:cNvSpPr>
-          <p:nvPr>
-            <p:ph type="title"/>
-          </p:nvPr>
-        </p:nvSpPr>
-        <p:spPr/>
-        <p:txBody>
-          <a:bodyPr/>
-          <a:lstStyle/>
-          <a:p>
-            <a:endParaRPr lang="en-US"/>
-          </a:p>
-        </p:txBody>
-      </p:sp>
-      <p:sp>
-        <p:nvSpPr>
-          <p:cNvPr id="3" name="Content Placeholder 2"/>
-          <p:cNvSpPr>
-            <a:spLocks noGrp="1"/>
-          </p:cNvSpPr>
-          <p:nvPr>
-            <p:ph idx="1"/>
-          </p:nvPr>
-        </p:nvSpPr>
-        <p:spPr/>
-        <p:txBody>
-          <a:bodyPr/>
-          <a:lstStyle/>
-          <a:p>
-            <a:endParaRPr lang="en-US"/>
-          </a:p>
-        </p:txBody>
-      </p:sp>
-      <p:pic>
-        <p:nvPicPr>
-          <p:cNvPr id="4" name="Picture 3"/>
-          <p:cNvPicPr>
-            <a:picLocks noChangeAspect="1"/>
-          </p:cNvPicPr>
-          <p:nvPr/>
-        </p:nvPicPr>
-        <p:blipFill>
-          <a:blip r:embed="rId2"/>
-          <a:stretch>
-            <a:fillRect/>
-          </a:stretch>
-        </p:blipFill>
-        <p:spPr>
-          <a:xfrm>
-            <a:off x="1247775" y="1023937"/>
-            <a:ext cx="9696450" cy="4810125"/>
-          </a:xfrm>
-          <a:prstGeom prst="rect">
-            <a:avLst/>
-          </a:prstGeom>
-        </p:spPr>
-      </p:pic>
-    </p:spTree>
-    <p:extLst>
-      <p:ext uri="{BB962C8B-B14F-4D97-AF65-F5344CB8AC3E}">
-        <p14:creationId xmlns:p14="http://schemas.microsoft.com/office/powerpoint/2010/main" val="235155747"/>
-      </p:ext>
-    </p:extLst>
-  </p:cSld>
-  <p:clrMapOvr>
-    <a:masterClrMapping/>
-  </p:clrMapOvr>
-</p:sld>
-</file>
-
-<file path=ppt/slides/slide27.xml><?xml version="1.0" encoding="utf-8"?>
-<p:sld xmlns:a="http://schemas.openxmlformats.org/drawingml/2006/main" xmlns:r="http://schemas.openxmlformats.org/officeDocument/2006/relationships" xmlns:p="http://schemas.openxmlformats.org/presentationml/2006/main">
-  <p:cSld>
-    <p:spTree>
-      <p:nvGrpSpPr>
-        <p:cNvPr id="1" name=""/>
-        <p:cNvGrpSpPr/>
-        <p:nvPr/>
-      </p:nvGrpSpPr>
-      <p:grpSpPr>
-        <a:xfrm>
-          <a:off x="0" y="0"/>
-          <a:ext cx="0" cy="0"/>
-          <a:chOff x="0" y="0"/>
-          <a:chExt cx="0" cy="0"/>
-        </a:xfrm>
-      </p:grpSpPr>
-      <p:sp>
-        <p:nvSpPr>
-          <p:cNvPr id="2" name="Title 1"/>
-          <p:cNvSpPr>
-            <a:spLocks noGrp="1"/>
-          </p:cNvSpPr>
-          <p:nvPr>
-            <p:ph type="title"/>
-          </p:nvPr>
-        </p:nvSpPr>
-        <p:spPr/>
-        <p:txBody>
-          <a:bodyPr/>
-          <a:lstStyle/>
-          <a:p>
-            <a:endParaRPr lang="en-US"/>
-          </a:p>
-        </p:txBody>
-      </p:sp>
-      <p:sp>
-        <p:nvSpPr>
-          <p:cNvPr id="3" name="Content Placeholder 2"/>
-          <p:cNvSpPr>
-            <a:spLocks noGrp="1"/>
-          </p:cNvSpPr>
-          <p:nvPr>
-            <p:ph idx="1"/>
-          </p:nvPr>
-        </p:nvSpPr>
-        <p:spPr/>
-        <p:txBody>
-          <a:bodyPr/>
-          <a:lstStyle/>
-          <a:p>
-            <a:endParaRPr lang="en-US"/>
-          </a:p>
-        </p:txBody>
-      </p:sp>
-      <p:pic>
-        <p:nvPicPr>
-          <p:cNvPr id="4" name="Picture 3"/>
-          <p:cNvPicPr>
-            <a:picLocks noChangeAspect="1"/>
-          </p:cNvPicPr>
-          <p:nvPr/>
-        </p:nvPicPr>
-        <p:blipFill>
-          <a:blip r:embed="rId2"/>
-          <a:stretch>
-            <a:fillRect/>
-          </a:stretch>
-        </p:blipFill>
-        <p:spPr>
-          <a:xfrm>
-            <a:off x="5179531" y="1690688"/>
-            <a:ext cx="6358946" cy="5032375"/>
-          </a:xfrm>
-          <a:prstGeom prst="rect">
-            <a:avLst/>
-          </a:prstGeom>
-        </p:spPr>
-      </p:pic>
-    </p:spTree>
-    <p:extLst>
-      <p:ext uri="{BB962C8B-B14F-4D97-AF65-F5344CB8AC3E}">
-        <p14:creationId xmlns:p14="http://schemas.microsoft.com/office/powerpoint/2010/main" val="665462225"/>
-      </p:ext>
-    </p:extLst>
-  </p:cSld>
-  <p:clrMapOvr>
-    <a:masterClrMapping/>
-  </p:clrMapOvr>
-</p:sld>
-</file>
-
-<file path=ppt/slides/slide28.xml><?xml version="1.0" encoding="utf-8"?>
-<p:sld xmlns:a="http://schemas.openxmlformats.org/drawingml/2006/main" xmlns:r="http://schemas.openxmlformats.org/officeDocument/2006/relationships" xmlns:p="http://schemas.openxmlformats.org/presentationml/2006/main">
-  <p:cSld>
-    <p:spTree>
-      <p:nvGrpSpPr>
-        <p:cNvPr id="1" name=""/>
-        <p:cNvGrpSpPr/>
-        <p:nvPr/>
-      </p:nvGrpSpPr>
-      <p:grpSpPr>
-        <a:xfrm>
-          <a:off x="0" y="0"/>
-          <a:ext cx="0" cy="0"/>
-          <a:chOff x="0" y="0"/>
-          <a:chExt cx="0" cy="0"/>
-        </a:xfrm>
-      </p:grpSpPr>
-      <p:sp>
-        <p:nvSpPr>
-          <p:cNvPr id="2" name="Title 1"/>
-          <p:cNvSpPr>
-            <a:spLocks noGrp="1"/>
-          </p:cNvSpPr>
-          <p:nvPr>
-            <p:ph type="title"/>
-          </p:nvPr>
-        </p:nvSpPr>
-        <p:spPr/>
-        <p:txBody>
-          <a:bodyPr/>
-          <a:lstStyle/>
-          <a:p>
-            <a:endParaRPr lang="en-US"/>
-          </a:p>
-        </p:txBody>
-      </p:sp>
-      <p:sp>
-        <p:nvSpPr>
-          <p:cNvPr id="3" name="Content Placeholder 2"/>
-          <p:cNvSpPr>
-            <a:spLocks noGrp="1"/>
-          </p:cNvSpPr>
-          <p:nvPr>
-            <p:ph idx="1"/>
-          </p:nvPr>
-        </p:nvSpPr>
-        <p:spPr/>
-        <p:txBody>
-          <a:bodyPr/>
-          <a:lstStyle/>
-          <a:p>
-            <a:endParaRPr lang="en-US"/>
-          </a:p>
-        </p:txBody>
-      </p:sp>
-      <p:pic>
-        <p:nvPicPr>
-          <p:cNvPr id="4" name="Picture 3"/>
-          <p:cNvPicPr>
-            <a:picLocks noChangeAspect="1"/>
-          </p:cNvPicPr>
-          <p:nvPr/>
-        </p:nvPicPr>
-        <p:blipFill>
-          <a:blip r:embed="rId2"/>
-          <a:stretch>
-            <a:fillRect/>
-          </a:stretch>
-        </p:blipFill>
-        <p:spPr>
-          <a:xfrm>
-            <a:off x="466725" y="509587"/>
-            <a:ext cx="11258550" cy="5838825"/>
-          </a:xfrm>
-          <a:prstGeom prst="rect">
-            <a:avLst/>
-          </a:prstGeom>
-        </p:spPr>
-      </p:pic>
-    </p:spTree>
-    <p:extLst>
-      <p:ext uri="{BB962C8B-B14F-4D97-AF65-F5344CB8AC3E}">
-        <p14:creationId xmlns:p14="http://schemas.microsoft.com/office/powerpoint/2010/main" val="1290345578"/>
+        <p14:creationId xmlns:p14="http://schemas.microsoft.com/office/powerpoint/2010/main" val="3221800426"/>
       </p:ext>
     </p:extLst>
   </p:cSld>
@@ -5415,103 +3243,6 @@
           <a:bodyPr/>
           <a:lstStyle/>
           <a:p>
-            <a:endParaRPr lang="en-US"/>
-          </a:p>
-        </p:txBody>
-      </p:sp>
-      <p:sp>
-        <p:nvSpPr>
-          <p:cNvPr id="3" name="Content Placeholder 2"/>
-          <p:cNvSpPr>
-            <a:spLocks noGrp="1"/>
-          </p:cNvSpPr>
-          <p:nvPr>
-            <p:ph idx="1"/>
-          </p:nvPr>
-        </p:nvSpPr>
-        <p:spPr>
-          <a:xfrm>
-            <a:off x="838200" y="1825625"/>
-            <a:ext cx="3356295" cy="4351338"/>
-          </a:xfrm>
-        </p:spPr>
-        <p:txBody>
-          <a:bodyPr/>
-          <a:lstStyle/>
-          <a:p>
-            <a:endParaRPr lang="en-US" dirty="0"/>
-          </a:p>
-        </p:txBody>
-      </p:sp>
-      <p:pic>
-        <p:nvPicPr>
-          <p:cNvPr id="6" name="Picture 5"/>
-          <p:cNvPicPr>
-            <a:picLocks noChangeAspect="1"/>
-          </p:cNvPicPr>
-          <p:nvPr/>
-        </p:nvPicPr>
-        <p:blipFill>
-          <a:blip r:embed="rId2"/>
-          <a:stretch>
-            <a:fillRect/>
-          </a:stretch>
-        </p:blipFill>
-        <p:spPr>
-          <a:xfrm>
-            <a:off x="5978194" y="2191668"/>
-            <a:ext cx="3929482" cy="4122613"/>
-          </a:xfrm>
-          <a:prstGeom prst="rect">
-            <a:avLst/>
-          </a:prstGeom>
-        </p:spPr>
-      </p:pic>
-    </p:spTree>
-    <p:extLst>
-      <p:ext uri="{BB962C8B-B14F-4D97-AF65-F5344CB8AC3E}">
-        <p14:creationId xmlns:p14="http://schemas.microsoft.com/office/powerpoint/2010/main" val="1288297030"/>
-      </p:ext>
-    </p:extLst>
-  </p:cSld>
-  <p:clrMapOvr>
-    <a:masterClrMapping/>
-  </p:clrMapOvr>
-</p:sld>
-</file>
-
-<file path=ppt/slides/slide4.xml><?xml version="1.0" encoding="utf-8"?>
-<p:sld xmlns:a="http://schemas.openxmlformats.org/drawingml/2006/main" xmlns:r="http://schemas.openxmlformats.org/officeDocument/2006/relationships" xmlns:p="http://schemas.openxmlformats.org/presentationml/2006/main">
-  <p:cSld>
-    <p:spTree>
-      <p:nvGrpSpPr>
-        <p:cNvPr id="1" name=""/>
-        <p:cNvGrpSpPr/>
-        <p:nvPr/>
-      </p:nvGrpSpPr>
-      <p:grpSpPr>
-        <a:xfrm>
-          <a:off x="0" y="0"/>
-          <a:ext cx="0" cy="0"/>
-          <a:chOff x="0" y="0"/>
-          <a:chExt cx="0" cy="0"/>
-        </a:xfrm>
-      </p:grpSpPr>
-      <p:sp>
-        <p:nvSpPr>
-          <p:cNvPr id="2" name="Title 1"/>
-          <p:cNvSpPr>
-            <a:spLocks noGrp="1"/>
-          </p:cNvSpPr>
-          <p:nvPr>
-            <p:ph type="title"/>
-          </p:nvPr>
-        </p:nvSpPr>
-        <p:spPr/>
-        <p:txBody>
-          <a:bodyPr/>
-          <a:lstStyle/>
-          <a:p>
             <a:r>
               <a:rPr lang="en-US" dirty="0"/>
               <a:t>References</a:t>
@@ -5529,14 +3260,14 @@
             <p:ph idx="1"/>
             <p:extLst>
               <p:ext uri="{D42A27DB-BD31-4B8C-83A1-F6EECF244321}">
-                <p14:modId xmlns:p14="http://schemas.microsoft.com/office/powerpoint/2010/main" val="2901062528"/>
+                <p14:modId xmlns:p14="http://schemas.microsoft.com/office/powerpoint/2010/main" val="779800664"/>
               </p:ext>
             </p:extLst>
           </p:nvPr>
         </p:nvGraphicFramePr>
         <p:xfrm>
           <a:off x="838200" y="1825625"/>
-          <a:ext cx="10515600" cy="4871720"/>
+          <a:ext cx="10515600" cy="4617720"/>
         </p:xfrm>
         <a:graphic>
           <a:graphicData uri="http://schemas.openxmlformats.org/drawingml/2006/table">
@@ -5587,40 +3318,7 @@
                   </a:ext>
                 </a:extLst>
               </a:tr>
-              <a:tr h="370840">
-                <a:tc>
-                  <a:txBody>
-                    <a:bodyPr/>
-                    <a:lstStyle/>
-                    <a:p>
-                      <a:endParaRPr lang="en-US" sz="1000" dirty="0"/>
-                    </a:p>
-                  </a:txBody>
-                  <a:tcPr/>
-                </a:tc>
-                <a:tc>
-                  <a:txBody>
-                    <a:bodyPr/>
-                    <a:lstStyle/>
-                    <a:p>
-                      <a:r>
-                        <a:rPr lang="en-US" sz="1000" dirty="0">
-                          <a:hlinkClick r:id="rId2"/>
-                        </a:rPr>
-                        <a:t>https://docs.microsoft.com/en-us/azure/service-fabric/service-fabric-cluster-creation-for-windows-server</a:t>
-                      </a:r>
-                      <a:endParaRPr lang="en-US" sz="1000" dirty="0"/>
-                    </a:p>
-                  </a:txBody>
-                  <a:tcPr/>
-                </a:tc>
-                <a:extLst>
-                  <a:ext uri="{0D108BD9-81ED-4DB2-BD59-A6C34878D82A}">
-                    <a16:rowId xmlns:a16="http://schemas.microsoft.com/office/drawing/2014/main" val="2923135702"/>
-                  </a:ext>
-                </a:extLst>
-              </a:tr>
-              <a:tr h="370840">
+              <a:tr h="185420">
                 <a:tc>
                   <a:txBody>
                     <a:bodyPr/>
@@ -5628,24 +3326,21 @@
                     <a:p>
                       <a:r>
                         <a:rPr lang="en-US" sz="1000" dirty="0"/>
-                        <a:t>Setup CI</a:t>
-                      </a:r>
-                    </a:p>
-                  </a:txBody>
-                  <a:tcPr/>
-                </a:tc>
-                <a:tc>
-                  <a:txBody>
-                    <a:bodyPr/>
-                    <a:lstStyle/>
-                    <a:p>
-                      <a:r>
-                        <a:rPr lang="en-US" sz="1000" dirty="0">
-                          <a:hlinkClick r:id="rId3"/>
-                        </a:rPr>
-                        <a:t>https://docs.microsoft.com/en-us/azure/service-fabric/service-fabric-set-up-continuous-integration</a:t>
-                      </a:r>
-                      <a:endParaRPr lang="en-US" sz="1000" dirty="0"/>
+                        <a:t>Samples</a:t>
+                      </a:r>
+                    </a:p>
+                  </a:txBody>
+                  <a:tcPr/>
+                </a:tc>
+                <a:tc>
+                  <a:txBody>
+                    <a:bodyPr/>
+                    <a:lstStyle/>
+                    <a:p>
+                      <a:r>
+                        <a:rPr lang="en-US" sz="1000" dirty="0"/>
+                        <a:t>https://azure.microsoft.com/en-us/resources/samples/service-fabric-dotnet-getting-started/</a:t>
+                      </a:r>
                     </a:p>
                   </a:txBody>
                   <a:tcPr/>
@@ -5656,6 +3351,42 @@
                   </a:ext>
                 </a:extLst>
               </a:tr>
+              <a:tr h="185420">
+                <a:tc>
+                  <a:txBody>
+                    <a:bodyPr/>
+                    <a:lstStyle/>
+                    <a:p>
+                      <a:r>
+                        <a:rPr lang="en-US" sz="1000" dirty="0"/>
+                        <a:t>Setup CI</a:t>
+                      </a:r>
+                    </a:p>
+                  </a:txBody>
+                  <a:tcPr/>
+                </a:tc>
+                <a:tc>
+                  <a:txBody>
+                    <a:bodyPr/>
+                    <a:lstStyle/>
+                    <a:p>
+                      <a:r>
+                        <a:rPr lang="en-US" sz="1000" dirty="0">
+                          <a:hlinkClick r:id="rId2"/>
+                        </a:rPr>
+                        <a:t>https://docs.microsoft.com/en-us/azure/service-fabric/service-fabric-set-up-continuous-integration</a:t>
+                      </a:r>
+                      <a:endParaRPr lang="en-US" sz="1000" dirty="0"/>
+                    </a:p>
+                  </a:txBody>
+                  <a:tcPr/>
+                </a:tc>
+                <a:extLst>
+                  <a:ext uri="{0D108BD9-81ED-4DB2-BD59-A6C34878D82A}">
+                    <a16:rowId xmlns:a16="http://schemas.microsoft.com/office/drawing/2014/main" val="3385852154"/>
+                  </a:ext>
+                </a:extLst>
+              </a:tr>
               <a:tr h="370840">
                 <a:tc>
                   <a:txBody>
@@ -5677,7 +3408,7 @@
                     <a:p>
                       <a:r>
                         <a:rPr lang="en-US" sz="1000" dirty="0">
-                          <a:hlinkClick r:id="rId4"/>
+                          <a:hlinkClick r:id="rId3"/>
                         </a:rPr>
                         <a:t>https://docs.microsoft.com/en-us/azure/service-fabric/service-fabric-cluster-creation-via-arm</a:t>
                       </a:r>
@@ -5713,7 +3444,7 @@
                     <a:p>
                       <a:r>
                         <a:rPr lang="en-US" sz="1000" dirty="0">
-                          <a:hlinkClick r:id="rId5"/>
+                          <a:hlinkClick r:id="rId4"/>
                         </a:rPr>
                         <a:t>https://github.com/Azure/azure-quickstart-templates/tree/master/service-fabric-secure-cluster-5-node-1-nodetype</a:t>
                       </a:r>
@@ -5749,7 +3480,7 @@
                     <a:p>
                       <a:r>
                         <a:rPr lang="en-US" sz="1000" dirty="0">
-                          <a:hlinkClick r:id="rId6"/>
+                          <a:hlinkClick r:id="rId5"/>
                         </a:rPr>
                         <a:t>https://opbuildstorageprod.blob.core.windows.net/output-pdf-files/en-us/Azure.azure-documents/live/service-fabric.pdf</a:t>
                       </a:r>
@@ -5785,7 +3516,7 @@
                     <a:p>
                       <a:r>
                         <a:rPr lang="en-US" sz="1000" dirty="0">
-                          <a:hlinkClick r:id="rId7"/>
+                          <a:hlinkClick r:id="rId6"/>
                         </a:rPr>
                         <a:t>http://www.microsoft.com/web/handlers/webpi.ashx?command=getinstallerredirect&amp;appid=MicrosoftAzure-ServiceFabric-CoreSDK</a:t>
                       </a:r>
@@ -5821,7 +3552,7 @@
                     <a:p>
                       <a:r>
                         <a:rPr lang="en-US" sz="1000" dirty="0">
-                          <a:hlinkClick r:id="rId8"/>
+                          <a:hlinkClick r:id="rId7"/>
                         </a:rPr>
                         <a:t>https://docs.microsoft.com/en-us/azure/service-fabric/service-fabric-cluster-capacity</a:t>
                       </a:r>
@@ -5857,7 +3588,7 @@
                     <a:p>
                       <a:r>
                         <a:rPr lang="en-US" sz="1000" dirty="0">
-                          <a:hlinkClick r:id="rId9"/>
+                          <a:hlinkClick r:id="rId8"/>
                         </a:rPr>
                         <a:t>https://github.com/Microsoft/azure-docs/blob/master/articles/service-fabric/service-fabric-get-started-with-a-local-cluster.md</a:t>
                       </a:r>
@@ -5893,7 +3624,7 @@
                     <a:p>
                       <a:r>
                         <a:rPr lang="en-US" sz="1000" dirty="0">
-                          <a:hlinkClick r:id="rId10"/>
+                          <a:hlinkClick r:id="rId9"/>
                         </a:rPr>
                         <a:t>https://github.com/Microsoft/azure-docs/blob/master/articles/service-fabric/service-fabric-cluster-creation-via-portal.md</a:t>
                       </a:r>
@@ -5929,7 +3660,7 @@
                     <a:p>
                       <a:r>
                         <a:rPr lang="en-US" sz="1000" dirty="0">
-                          <a:hlinkClick r:id="rId11"/>
+                          <a:hlinkClick r:id="rId10"/>
                         </a:rPr>
                         <a:t>https://github.com/Microsoft/azure-docs/blob/master/articles/service-fabric/service-fabric-application-upgrade.md</a:t>
                       </a:r>
@@ -5965,7 +3696,7 @@
                     <a:p>
                       <a:r>
                         <a:rPr lang="en-US" sz="1000" dirty="0">
-                          <a:hlinkClick r:id="rId3"/>
+                          <a:hlinkClick r:id="rId2"/>
                         </a:rPr>
                         <a:t>https://docs.microsoft.com/en-us/azure/service-fabric/service-fabric-set-up-continuous-integration</a:t>
                       </a:r>
@@ -5973,16 +3704,15 @@
                     </a:p>
                     <a:p>
                       <a:r>
-                        <a:rPr lang="en-US" sz="1000">
-                          <a:hlinkClick r:id="rId12"/>
+                        <a:rPr lang="en-US" sz="1000" dirty="0">
+                          <a:hlinkClick r:id="rId11"/>
                         </a:rPr>
                         <a:t>https://github.com/Microsoft/azure-docs/blob/master/articles/service-fabric/service-fabric-set-up-continuous-integration.md</a:t>
                       </a:r>
                       <a:r>
-                        <a:rPr lang="en-US" sz="1000"/>
+                        <a:rPr lang="en-US" sz="1000" dirty="0"/>
                         <a:t> </a:t>
                       </a:r>
-                      <a:endParaRPr lang="en-US" sz="1000" dirty="0"/>
                     </a:p>
                   </a:txBody>
                   <a:tcPr/>
@@ -5999,16 +3729,25 @@
                     <a:bodyPr/>
                     <a:lstStyle/>
                     <a:p>
-                      <a:endParaRPr lang="en-US" sz="1000" dirty="0"/>
-                    </a:p>
-                  </a:txBody>
-                  <a:tcPr/>
-                </a:tc>
-                <a:tc>
-                  <a:txBody>
-                    <a:bodyPr/>
-                    <a:lstStyle/>
-                    <a:p>
+                      <a:r>
+                        <a:rPr lang="en-US" sz="1000" dirty="0"/>
+                        <a:t>Add Web API Service</a:t>
+                      </a:r>
+                    </a:p>
+                  </a:txBody>
+                  <a:tcPr/>
+                </a:tc>
+                <a:tc>
+                  <a:txBody>
+                    <a:bodyPr/>
+                    <a:lstStyle/>
+                    <a:p>
+                      <a:r>
+                        <a:rPr lang="en-US" sz="1000" dirty="0">
+                          <a:hlinkClick r:id="rId12"/>
+                        </a:rPr>
+                        <a:t>https://docs.microsoft.com/en-us/azure/service-fabric/service-fabric-add-a-web-frontend</a:t>
+                      </a:r>
                       <a:endParaRPr lang="en-US" sz="1000" dirty="0"/>
                     </a:p>
                   </a:txBody>
@@ -6016,7 +3755,7 @@
                 </a:tc>
                 <a:extLst>
                   <a:ext uri="{0D108BD9-81ED-4DB2-BD59-A6C34878D82A}">
-                    <a16:rowId xmlns:a16="http://schemas.microsoft.com/office/drawing/2014/main" val="4160633276"/>
+                    <a16:rowId xmlns:a16="http://schemas.microsoft.com/office/drawing/2014/main" val="2872061820"/>
                   </a:ext>
                 </a:extLst>
               </a:tr>
@@ -6037,7 +3776,7 @@
 </p:sld>
 </file>
 
-<file path=ppt/slides/slide5.xml><?xml version="1.0" encoding="utf-8"?>
+<file path=ppt/slides/slide4.xml><?xml version="1.0" encoding="utf-8"?>
 <p:sld xmlns:a="http://schemas.openxmlformats.org/drawingml/2006/main" xmlns:r="http://schemas.openxmlformats.org/officeDocument/2006/relationships" xmlns:p="http://schemas.openxmlformats.org/presentationml/2006/main">
   <p:cSld>
     <p:spTree>
@@ -6323,7 +4062,7 @@
 </p:sld>
 </file>
 
-<file path=ppt/slides/slide6.xml><?xml version="1.0" encoding="utf-8"?>
+<file path=ppt/slides/slide5.xml><?xml version="1.0" encoding="utf-8"?>
 <p:sld xmlns:a="http://schemas.openxmlformats.org/drawingml/2006/main" xmlns:r="http://schemas.openxmlformats.org/officeDocument/2006/relationships" xmlns:p="http://schemas.openxmlformats.org/presentationml/2006/main">
   <p:cSld>
     <p:spTree>
@@ -6777,440 +4516,6 @@
     <p:extLst>
       <p:ext uri="{BB962C8B-B14F-4D97-AF65-F5344CB8AC3E}">
         <p14:creationId xmlns:p14="http://schemas.microsoft.com/office/powerpoint/2010/main" val="2770582083"/>
-      </p:ext>
-    </p:extLst>
-  </p:cSld>
-  <p:clrMapOvr>
-    <a:masterClrMapping/>
-  </p:clrMapOvr>
-</p:sld>
-</file>
-
-<file path=ppt/slides/slide7.xml><?xml version="1.0" encoding="utf-8"?>
-<p:sld xmlns:a="http://schemas.openxmlformats.org/drawingml/2006/main" xmlns:r="http://schemas.openxmlformats.org/officeDocument/2006/relationships" xmlns:p="http://schemas.openxmlformats.org/presentationml/2006/main">
-  <p:cSld>
-    <p:spTree>
-      <p:nvGrpSpPr>
-        <p:cNvPr id="1" name=""/>
-        <p:cNvGrpSpPr/>
-        <p:nvPr/>
-      </p:nvGrpSpPr>
-      <p:grpSpPr>
-        <a:xfrm>
-          <a:off x="0" y="0"/>
-          <a:ext cx="0" cy="0"/>
-          <a:chOff x="0" y="0"/>
-          <a:chExt cx="0" cy="0"/>
-        </a:xfrm>
-      </p:grpSpPr>
-      <p:sp>
-        <p:nvSpPr>
-          <p:cNvPr id="2" name="Title 1"/>
-          <p:cNvSpPr>
-            <a:spLocks noGrp="1"/>
-          </p:cNvSpPr>
-          <p:nvPr>
-            <p:ph type="title"/>
-          </p:nvPr>
-        </p:nvSpPr>
-        <p:spPr/>
-        <p:txBody>
-          <a:bodyPr/>
-          <a:lstStyle/>
-          <a:p>
-            <a:r>
-              <a:rPr lang="en-US" dirty="0"/>
-              <a:t>Deploy application</a:t>
-            </a:r>
-          </a:p>
-        </p:txBody>
-      </p:sp>
-      <p:graphicFrame>
-        <p:nvGraphicFramePr>
-          <p:cNvPr id="4" name="Content Placeholder 3"/>
-          <p:cNvGraphicFramePr>
-            <a:graphicFrameLocks noGrp="1"/>
-          </p:cNvGraphicFramePr>
-          <p:nvPr>
-            <p:ph idx="1"/>
-            <p:extLst>
-              <p:ext uri="{D42A27DB-BD31-4B8C-83A1-F6EECF244321}">
-                <p14:modId xmlns:p14="http://schemas.microsoft.com/office/powerpoint/2010/main" val="884895253"/>
-              </p:ext>
-            </p:extLst>
-          </p:nvPr>
-        </p:nvGraphicFramePr>
-        <p:xfrm>
-          <a:off x="838200" y="1825625"/>
-          <a:ext cx="10515600" cy="1112520"/>
-        </p:xfrm>
-        <a:graphic>
-          <a:graphicData uri="http://schemas.openxmlformats.org/drawingml/2006/table">
-            <a:tbl>
-              <a:tblPr firstRow="1" bandRow="1">
-                <a:tableStyleId>{5C22544A-7EE6-4342-B048-85BDC9FD1C3A}</a:tableStyleId>
-              </a:tblPr>
-              <a:tblGrid>
-                <a:gridCol w="5257800">
-                  <a:extLst>
-                    <a:ext uri="{9D8B030D-6E8A-4147-A177-3AD203B41FA5}">
-                      <a16:colId xmlns:a16="http://schemas.microsoft.com/office/drawing/2014/main" val="624913864"/>
-                    </a:ext>
-                  </a:extLst>
-                </a:gridCol>
-                <a:gridCol w="5257800">
-                  <a:extLst>
-                    <a:ext uri="{9D8B030D-6E8A-4147-A177-3AD203B41FA5}">
-                      <a16:colId xmlns:a16="http://schemas.microsoft.com/office/drawing/2014/main" val="990103002"/>
-                    </a:ext>
-                  </a:extLst>
-                </a:gridCol>
-              </a:tblGrid>
-              <a:tr h="370840">
-                <a:tc>
-                  <a:txBody>
-                    <a:bodyPr/>
-                    <a:lstStyle/>
-                    <a:p>
-                      <a:endParaRPr lang="en-US" dirty="0"/>
-                    </a:p>
-                  </a:txBody>
-                  <a:tcPr/>
-                </a:tc>
-                <a:tc>
-                  <a:txBody>
-                    <a:bodyPr/>
-                    <a:lstStyle/>
-                    <a:p>
-                      <a:endParaRPr lang="en-US" dirty="0"/>
-                    </a:p>
-                  </a:txBody>
-                  <a:tcPr/>
-                </a:tc>
-                <a:extLst>
-                  <a:ext uri="{0D108BD9-81ED-4DB2-BD59-A6C34878D82A}">
-                    <a16:rowId xmlns:a16="http://schemas.microsoft.com/office/drawing/2014/main" val="19837781"/>
-                  </a:ext>
-                </a:extLst>
-              </a:tr>
-              <a:tr h="370840">
-                <a:tc>
-                  <a:txBody>
-                    <a:bodyPr/>
-                    <a:lstStyle/>
-                    <a:p>
-                      <a:endParaRPr lang="en-US" dirty="0"/>
-                    </a:p>
-                  </a:txBody>
-                  <a:tcPr/>
-                </a:tc>
-                <a:tc>
-                  <a:txBody>
-                    <a:bodyPr/>
-                    <a:lstStyle/>
-                    <a:p>
-                      <a:endParaRPr lang="en-US" dirty="0"/>
-                    </a:p>
-                  </a:txBody>
-                  <a:tcPr/>
-                </a:tc>
-                <a:extLst>
-                  <a:ext uri="{0D108BD9-81ED-4DB2-BD59-A6C34878D82A}">
-                    <a16:rowId xmlns:a16="http://schemas.microsoft.com/office/drawing/2014/main" val="77608304"/>
-                  </a:ext>
-                </a:extLst>
-              </a:tr>
-              <a:tr h="370840">
-                <a:tc>
-                  <a:txBody>
-                    <a:bodyPr/>
-                    <a:lstStyle/>
-                    <a:p>
-                      <a:endParaRPr lang="en-US" dirty="0"/>
-                    </a:p>
-                  </a:txBody>
-                  <a:tcPr/>
-                </a:tc>
-                <a:tc>
-                  <a:txBody>
-                    <a:bodyPr/>
-                    <a:lstStyle/>
-                    <a:p>
-                      <a:endParaRPr lang="en-US" dirty="0"/>
-                    </a:p>
-                  </a:txBody>
-                  <a:tcPr/>
-                </a:tc>
-                <a:extLst>
-                  <a:ext uri="{0D108BD9-81ED-4DB2-BD59-A6C34878D82A}">
-                    <a16:rowId xmlns:a16="http://schemas.microsoft.com/office/drawing/2014/main" val="1357295501"/>
-                  </a:ext>
-                </a:extLst>
-              </a:tr>
-            </a:tbl>
-          </a:graphicData>
-        </a:graphic>
-      </p:graphicFrame>
-    </p:spTree>
-    <p:extLst>
-      <p:ext uri="{BB962C8B-B14F-4D97-AF65-F5344CB8AC3E}">
-        <p14:creationId xmlns:p14="http://schemas.microsoft.com/office/powerpoint/2010/main" val="719782524"/>
-      </p:ext>
-    </p:extLst>
-  </p:cSld>
-  <p:clrMapOvr>
-    <a:masterClrMapping/>
-  </p:clrMapOvr>
-</p:sld>
-</file>
-
-<file path=ppt/slides/slide8.xml><?xml version="1.0" encoding="utf-8"?>
-<p:sld xmlns:a="http://schemas.openxmlformats.org/drawingml/2006/main" xmlns:r="http://schemas.openxmlformats.org/officeDocument/2006/relationships" xmlns:p="http://schemas.openxmlformats.org/presentationml/2006/main">
-  <p:cSld>
-    <p:spTree>
-      <p:nvGrpSpPr>
-        <p:cNvPr id="1" name=""/>
-        <p:cNvGrpSpPr/>
-        <p:nvPr/>
-      </p:nvGrpSpPr>
-      <p:grpSpPr>
-        <a:xfrm>
-          <a:off x="0" y="0"/>
-          <a:ext cx="0" cy="0"/>
-          <a:chOff x="0" y="0"/>
-          <a:chExt cx="0" cy="0"/>
-        </a:xfrm>
-      </p:grpSpPr>
-      <p:sp>
-        <p:nvSpPr>
-          <p:cNvPr id="2" name="Title 1"/>
-          <p:cNvSpPr>
-            <a:spLocks noGrp="1"/>
-          </p:cNvSpPr>
-          <p:nvPr>
-            <p:ph type="title"/>
-          </p:nvPr>
-        </p:nvSpPr>
-        <p:spPr/>
-        <p:txBody>
-          <a:bodyPr/>
-          <a:lstStyle/>
-          <a:p>
-            <a:r>
-              <a:rPr lang="en-US" dirty="0"/>
-              <a:t>Upgrade Application</a:t>
-            </a:r>
-          </a:p>
-        </p:txBody>
-      </p:sp>
-      <p:graphicFrame>
-        <p:nvGraphicFramePr>
-          <p:cNvPr id="4" name="Content Placeholder 3"/>
-          <p:cNvGraphicFramePr>
-            <a:graphicFrameLocks noGrp="1"/>
-          </p:cNvGraphicFramePr>
-          <p:nvPr>
-            <p:ph idx="1"/>
-            <p:extLst>
-              <p:ext uri="{D42A27DB-BD31-4B8C-83A1-F6EECF244321}">
-                <p14:modId xmlns:p14="http://schemas.microsoft.com/office/powerpoint/2010/main" val="3561591290"/>
-              </p:ext>
-            </p:extLst>
-          </p:nvPr>
-        </p:nvGraphicFramePr>
-        <p:xfrm>
-          <a:off x="838200" y="1825625"/>
-          <a:ext cx="10515600" cy="741680"/>
-        </p:xfrm>
-        <a:graphic>
-          <a:graphicData uri="http://schemas.openxmlformats.org/drawingml/2006/table">
-            <a:tbl>
-              <a:tblPr firstRow="1" bandRow="1">
-                <a:tableStyleId>{5C22544A-7EE6-4342-B048-85BDC9FD1C3A}</a:tableStyleId>
-              </a:tblPr>
-              <a:tblGrid>
-                <a:gridCol w="5257800">
-                  <a:extLst>
-                    <a:ext uri="{9D8B030D-6E8A-4147-A177-3AD203B41FA5}">
-                      <a16:colId xmlns:a16="http://schemas.microsoft.com/office/drawing/2014/main" val="1411586393"/>
-                    </a:ext>
-                  </a:extLst>
-                </a:gridCol>
-                <a:gridCol w="5257800">
-                  <a:extLst>
-                    <a:ext uri="{9D8B030D-6E8A-4147-A177-3AD203B41FA5}">
-                      <a16:colId xmlns:a16="http://schemas.microsoft.com/office/drawing/2014/main" val="2232345412"/>
-                    </a:ext>
-                  </a:extLst>
-                </a:gridCol>
-              </a:tblGrid>
-              <a:tr h="370840">
-                <a:tc>
-                  <a:txBody>
-                    <a:bodyPr/>
-                    <a:lstStyle/>
-                    <a:p>
-                      <a:endParaRPr lang="en-US" dirty="0"/>
-                    </a:p>
-                  </a:txBody>
-                  <a:tcPr/>
-                </a:tc>
-                <a:tc>
-                  <a:txBody>
-                    <a:bodyPr/>
-                    <a:lstStyle/>
-                    <a:p>
-                      <a:endParaRPr lang="en-US" dirty="0"/>
-                    </a:p>
-                  </a:txBody>
-                  <a:tcPr/>
-                </a:tc>
-                <a:extLst>
-                  <a:ext uri="{0D108BD9-81ED-4DB2-BD59-A6C34878D82A}">
-                    <a16:rowId xmlns:a16="http://schemas.microsoft.com/office/drawing/2014/main" val="664862396"/>
-                  </a:ext>
-                </a:extLst>
-              </a:tr>
-              <a:tr h="370840">
-                <a:tc>
-                  <a:txBody>
-                    <a:bodyPr/>
-                    <a:lstStyle/>
-                    <a:p>
-                      <a:r>
-                        <a:rPr lang="en-US" dirty="0"/>
-                        <a:t>Publish-</a:t>
-                      </a:r>
-                      <a:r>
-                        <a:rPr lang="en-US" dirty="0" err="1"/>
-                        <a:t>UpgradedServiceFabricApplication</a:t>
-                      </a:r>
-                      <a:endParaRPr lang="en-US" dirty="0"/>
-                    </a:p>
-                  </a:txBody>
-                  <a:tcPr/>
-                </a:tc>
-                <a:tc>
-                  <a:txBody>
-                    <a:bodyPr/>
-                    <a:lstStyle/>
-                    <a:p>
-                      <a:endParaRPr lang="en-US" dirty="0"/>
-                    </a:p>
-                  </a:txBody>
-                  <a:tcPr/>
-                </a:tc>
-                <a:extLst>
-                  <a:ext uri="{0D108BD9-81ED-4DB2-BD59-A6C34878D82A}">
-                    <a16:rowId xmlns:a16="http://schemas.microsoft.com/office/drawing/2014/main" val="2306331589"/>
-                  </a:ext>
-                </a:extLst>
-              </a:tr>
-            </a:tbl>
-          </a:graphicData>
-        </a:graphic>
-      </p:graphicFrame>
-    </p:spTree>
-    <p:extLst>
-      <p:ext uri="{BB962C8B-B14F-4D97-AF65-F5344CB8AC3E}">
-        <p14:creationId xmlns:p14="http://schemas.microsoft.com/office/powerpoint/2010/main" val="3907402609"/>
-      </p:ext>
-    </p:extLst>
-  </p:cSld>
-  <p:clrMapOvr>
-    <a:masterClrMapping/>
-  </p:clrMapOvr>
-</p:sld>
-</file>
-
-<file path=ppt/slides/slide9.xml><?xml version="1.0" encoding="utf-8"?>
-<p:sld xmlns:a="http://schemas.openxmlformats.org/drawingml/2006/main" xmlns:r="http://schemas.openxmlformats.org/officeDocument/2006/relationships" xmlns:p="http://schemas.openxmlformats.org/presentationml/2006/main">
-  <p:cSld>
-    <p:spTree>
-      <p:nvGrpSpPr>
-        <p:cNvPr id="1" name=""/>
-        <p:cNvGrpSpPr/>
-        <p:nvPr/>
-      </p:nvGrpSpPr>
-      <p:grpSpPr>
-        <a:xfrm>
-          <a:off x="0" y="0"/>
-          <a:ext cx="0" cy="0"/>
-          <a:chOff x="0" y="0"/>
-          <a:chExt cx="0" cy="0"/>
-        </a:xfrm>
-      </p:grpSpPr>
-      <p:sp>
-        <p:nvSpPr>
-          <p:cNvPr id="2" name="Title 1"/>
-          <p:cNvSpPr>
-            <a:spLocks noGrp="1"/>
-          </p:cNvSpPr>
-          <p:nvPr>
-            <p:ph type="title"/>
-          </p:nvPr>
-        </p:nvSpPr>
-        <p:spPr/>
-        <p:txBody>
-          <a:bodyPr/>
-          <a:lstStyle/>
-          <a:p>
-            <a:endParaRPr lang="en-US"/>
-          </a:p>
-        </p:txBody>
-      </p:sp>
-      <p:sp>
-        <p:nvSpPr>
-          <p:cNvPr id="3" name="Content Placeholder 2"/>
-          <p:cNvSpPr>
-            <a:spLocks noGrp="1"/>
-          </p:cNvSpPr>
-          <p:nvPr>
-            <p:ph idx="1"/>
-          </p:nvPr>
-        </p:nvSpPr>
-        <p:spPr>
-          <a:xfrm>
-            <a:off x="838200" y="1825625"/>
-            <a:ext cx="3683466" cy="4351338"/>
-          </a:xfrm>
-        </p:spPr>
-        <p:txBody>
-          <a:bodyPr/>
-          <a:lstStyle/>
-          <a:p>
-            <a:endParaRPr lang="en-US" dirty="0"/>
-          </a:p>
-        </p:txBody>
-      </p:sp>
-      <p:pic>
-        <p:nvPicPr>
-          <p:cNvPr id="6" name="Picture 5"/>
-          <p:cNvPicPr>
-            <a:picLocks noChangeAspect="1"/>
-          </p:cNvPicPr>
-          <p:nvPr/>
-        </p:nvPicPr>
-        <p:blipFill>
-          <a:blip r:embed="rId2"/>
-          <a:stretch>
-            <a:fillRect/>
-          </a:stretch>
-        </p:blipFill>
-        <p:spPr>
-          <a:xfrm>
-            <a:off x="6025780" y="1909186"/>
-            <a:ext cx="4626309" cy="4777991"/>
-          </a:xfrm>
-          <a:prstGeom prst="rect">
-            <a:avLst/>
-          </a:prstGeom>
-        </p:spPr>
-      </p:pic>
-    </p:spTree>
-    <p:extLst>
-      <p:ext uri="{BB962C8B-B14F-4D97-AF65-F5344CB8AC3E}">
-        <p14:creationId xmlns:p14="http://schemas.microsoft.com/office/powerpoint/2010/main" val="2804591246"/>
       </p:ext>
     </p:extLst>
   </p:cSld>

</xml_diff>